<commit_message>
Praesentation begonnen. Ergaenzungen durch buch
</commit_message>
<xml_diff>
--- a/Praesentation.pptx
+++ b/Praesentation.pptx
@@ -253,7 +253,7 @@
               <a:pPr>
                 <a:defRPr/>
               </a:pPr>
-              <a:t>22.05.2013</a:t>
+              <a:t>23.05.2013</a:t>
             </a:fld>
             <a:endParaRPr lang="de-DE"/>
           </a:p>
@@ -1735,15 +1735,12 @@
               </a:spcAft>
               <a:defRPr/>
             </a:pPr>
-            <a:r>
-              <a:rPr lang="de-DE" sz="1000" dirty="0">
-                <a:solidFill>
-                  <a:schemeClr val="bg1"/>
-                </a:solidFill>
-                <a:ea typeface="ＭＳ Ｐゴシック" pitchFamily="34" charset="-128"/>
-              </a:rPr>
-              <a:t>http://portal.imn.htwk-leipzig.de</a:t>
-            </a:r>
+            <a:endParaRPr lang="de-DE" sz="1000" dirty="0">
+              <a:solidFill>
+                <a:schemeClr val="bg1"/>
+              </a:solidFill>
+              <a:ea typeface="ＭＳ Ｐゴシック" pitchFamily="34" charset="-128"/>
+            </a:endParaRPr>
           </a:p>
         </p:txBody>
       </p:sp>
@@ -1793,8 +1790,13 @@
                   <a:schemeClr val="bg1"/>
                 </a:solidFill>
               </a:rPr>
-              <a:t>Prof. Dr. Referent</a:t>
-            </a:r>
+              <a:t>B. Sc. Kurt Junghanns</a:t>
+            </a:r>
+            <a:endParaRPr lang="de-DE" sz="1000" dirty="0" smtClean="0">
+              <a:solidFill>
+                <a:schemeClr val="bg1"/>
+              </a:solidFill>
+            </a:endParaRPr>
           </a:p>
           <a:p>
             <a:pPr algn="ctr" fontAlgn="auto">
@@ -1812,7 +1814,7 @@
                   <a:schemeClr val="bg1"/>
                 </a:solidFill>
               </a:rPr>
-              <a:t>Fakultät, Bereich</a:t>
+              <a:t>12-INM</a:t>
             </a:r>
             <a:endParaRPr lang="de-DE" sz="1000" dirty="0">
               <a:solidFill>
@@ -1864,7 +1866,7 @@
                 </a:solidFill>
                 <a:ea typeface="ＭＳ Ｐゴシック" pitchFamily="34" charset="-128"/>
               </a:rPr>
-              <a:t>22.05.2013</a:t>
+              <a:t>23.05.2013</a:t>
             </a:fld>
             <a:endParaRPr lang="de-DE" sz="1000" dirty="0">
               <a:solidFill>
@@ -2648,7 +2650,7 @@
         <p:spPr>
           <a:xfrm>
             <a:off x="3671888" y="6324600"/>
-            <a:ext cx="1800225" cy="400050"/>
+            <a:ext cx="1800225" cy="400110"/>
           </a:xfrm>
           <a:prstGeom prst="rect">
             <a:avLst/>
@@ -2671,32 +2673,33 @@
               <a:defRPr/>
             </a:pPr>
             <a:r>
-              <a:rPr lang="de-DE" sz="1000" dirty="0">
+              <a:rPr lang="de-DE" sz="1000" dirty="0" smtClean="0">
                 <a:solidFill>
                   <a:srgbClr val="2347A0"/>
                 </a:solidFill>
               </a:rPr>
-              <a:t>Prof. Dr. Referent</a:t>
-            </a:r>
-          </a:p>
-          <a:p>
-            <a:pPr algn="ctr" fontAlgn="auto">
-              <a:spcBef>
-                <a:spcPts val="0"/>
-              </a:spcBef>
-              <a:spcAft>
-                <a:spcPts val="0"/>
-              </a:spcAft>
-              <a:defRPr/>
-            </a:pPr>
-            <a:r>
-              <a:rPr lang="de-DE" sz="1000" dirty="0">
+              <a:t>B. Sc. Kurt Junghanns</a:t>
+            </a:r>
+            <a:br>
+              <a:rPr lang="de-DE" sz="1000" dirty="0" smtClean="0">
                 <a:solidFill>
                   <a:srgbClr val="2347A0"/>
                 </a:solidFill>
               </a:rPr>
-              <a:t>Fakultät, Bereich</a:t>
-            </a:r>
+            </a:br>
+            <a:r>
+              <a:rPr lang="de-DE" sz="1000" dirty="0" smtClean="0">
+                <a:solidFill>
+                  <a:srgbClr val="2347A0"/>
+                </a:solidFill>
+              </a:rPr>
+              <a:t>12-INM</a:t>
+            </a:r>
+            <a:endParaRPr lang="de-DE" sz="1000" dirty="0">
+              <a:solidFill>
+                <a:srgbClr val="2347A0"/>
+              </a:solidFill>
+            </a:endParaRPr>
           </a:p>
         </p:txBody>
       </p:sp>
@@ -3141,7 +3144,11 @@
                 <a:spcPct val="0"/>
               </a:spcAft>
             </a:pPr>
-            <a:endParaRPr lang="de-DE" smtClean="0"/>
+            <a:r>
+              <a:rPr lang="de-DE" dirty="0" smtClean="0"/>
+              <a:t>Oberseminar „Datenbanksysteme – Aktuelle Trends“</a:t>
+            </a:r>
+            <a:endParaRPr lang="de-DE" dirty="0" smtClean="0"/>
           </a:p>
         </p:txBody>
       </p:sp>
@@ -3160,7 +3167,11 @@
           <a:bodyPr/>
           <a:lstStyle/>
           <a:p>
-            <a:endParaRPr lang="de-DE" smtClean="0"/>
+            <a:r>
+              <a:rPr lang="de-DE" dirty="0" err="1" smtClean="0"/>
+              <a:t>NoSQL</a:t>
+            </a:r>
+            <a:endParaRPr lang="de-DE" dirty="0" smtClean="0"/>
           </a:p>
         </p:txBody>
       </p:sp>
@@ -3216,7 +3227,11 @@
           <a:bodyPr/>
           <a:lstStyle/>
           <a:p>
-            <a:endParaRPr lang="de-DE" smtClean="0"/>
+            <a:r>
+              <a:rPr lang="de-DE" dirty="0" smtClean="0"/>
+              <a:t>Agenda</a:t>
+            </a:r>
+            <a:endParaRPr lang="de-DE" dirty="0" smtClean="0"/>
           </a:p>
         </p:txBody>
       </p:sp>
@@ -3240,7 +3255,55 @@
           <a:bodyPr/>
           <a:lstStyle/>
           <a:p>
-            <a:endParaRPr lang="de-DE" smtClean="0"/>
+            <a:pPr marL="457200" indent="-457200">
+              <a:buFont typeface="+mj-lt"/>
+              <a:buAutoNum type="arabicPeriod"/>
+            </a:pPr>
+            <a:r>
+              <a:rPr lang="de-DE" dirty="0" smtClean="0"/>
+              <a:t>Einleitung</a:t>
+            </a:r>
+          </a:p>
+          <a:p>
+            <a:pPr marL="457200" indent="-457200">
+              <a:buFont typeface="+mj-lt"/>
+              <a:buAutoNum type="arabicPeriod"/>
+            </a:pPr>
+            <a:r>
+              <a:rPr lang="de-DE" dirty="0" smtClean="0"/>
+              <a:t>Historie</a:t>
+            </a:r>
+          </a:p>
+          <a:p>
+            <a:pPr marL="457200" indent="-457200">
+              <a:buFont typeface="+mj-lt"/>
+              <a:buAutoNum type="arabicPeriod"/>
+            </a:pPr>
+            <a:r>
+              <a:rPr lang="de-DE" dirty="0" smtClean="0"/>
+              <a:t>Bewegung</a:t>
+            </a:r>
+          </a:p>
+          <a:p>
+            <a:pPr marL="457200" indent="-457200">
+              <a:buFont typeface="+mj-lt"/>
+              <a:buAutoNum type="arabicPeriod"/>
+            </a:pPr>
+            <a:r>
+              <a:rPr lang="de-DE" dirty="0" smtClean="0"/>
+              <a:t>theoretische Grundlagen</a:t>
+            </a:r>
+          </a:p>
+          <a:p>
+            <a:pPr marL="457200" indent="-457200">
+              <a:buFont typeface="+mj-lt"/>
+              <a:buAutoNum type="arabicPeriod"/>
+            </a:pPr>
+            <a:r>
+              <a:rPr lang="de-DE" dirty="0" smtClean="0"/>
+              <a:t>Kategorisierung</a:t>
+            </a:r>
+            <a:endParaRPr lang="de-DE" dirty="0" smtClean="0"/>
           </a:p>
         </p:txBody>
       </p:sp>
@@ -3310,55 +3373,7 @@
       </p:grpSpPr>
       <p:sp>
         <p:nvSpPr>
-          <p:cNvPr id="6146" name="Inhaltsplatzhalter 6"/>
-          <p:cNvSpPr>
-            <a:spLocks noGrp="1"/>
-          </p:cNvSpPr>
-          <p:nvPr>
-            <p:ph sz="half" idx="1"/>
-          </p:nvPr>
-        </p:nvSpPr>
-        <p:spPr>
-          <a:xfrm>
-            <a:off x="684213" y="1600200"/>
-            <a:ext cx="3811587" cy="4525963"/>
-          </a:xfrm>
-        </p:spPr>
-        <p:txBody>
-          <a:bodyPr/>
-          <a:lstStyle/>
-          <a:p>
-            <a:endParaRPr lang="de-DE" smtClean="0"/>
-          </a:p>
-        </p:txBody>
-      </p:sp>
-      <p:sp>
-        <p:nvSpPr>
-          <p:cNvPr id="6147" name="Inhaltsplatzhalter 7"/>
-          <p:cNvSpPr>
-            <a:spLocks noGrp="1"/>
-          </p:cNvSpPr>
-          <p:nvPr>
-            <p:ph sz="half" idx="2"/>
-          </p:nvPr>
-        </p:nvSpPr>
-        <p:spPr>
-          <a:xfrm>
-            <a:off x="4648200" y="1600200"/>
-            <a:ext cx="3946525" cy="4525963"/>
-          </a:xfrm>
-        </p:spPr>
-        <p:txBody>
-          <a:bodyPr/>
-          <a:lstStyle/>
-          <a:p>
-            <a:endParaRPr lang="de-DE" smtClean="0"/>
-          </a:p>
-        </p:txBody>
-      </p:sp>
-      <p:sp>
-        <p:nvSpPr>
-          <p:cNvPr id="9" name="Inhaltsplatzhalter 8"/>
+          <p:cNvPr id="2" name="Inhaltsplatzhalter 1"/>
           <p:cNvSpPr>
             <a:spLocks noGrp="1"/>
           </p:cNvSpPr>
@@ -3366,24 +3381,11 @@
             <p:ph sz="quarter" idx="13"/>
           </p:nvPr>
         </p:nvSpPr>
-        <p:spPr>
-          <a:xfrm>
-            <a:off x="657225" y="333375"/>
-            <a:ext cx="6651625" cy="215900"/>
-          </a:xfrm>
-        </p:spPr>
+        <p:spPr/>
         <p:txBody>
-          <a:bodyPr rtlCol="0">
-            <a:normAutofit fontScale="85000" lnSpcReduction="20000"/>
-          </a:bodyPr>
+          <a:bodyPr/>
           <a:lstStyle/>
           <a:p>
-            <a:pPr fontAlgn="auto">
-              <a:spcAft>
-                <a:spcPts val="0"/>
-              </a:spcAft>
-              <a:defRPr/>
-            </a:pPr>
             <a:endParaRPr lang="de-DE"/>
           </a:p>
         </p:txBody>
@@ -3398,17 +3400,16 @@
             <p:ph type="title"/>
           </p:nvPr>
         </p:nvSpPr>
-        <p:spPr>
-          <a:xfrm>
-            <a:off x="684213" y="831850"/>
-            <a:ext cx="7920037" cy="652463"/>
-          </a:xfrm>
-        </p:spPr>
+        <p:spPr/>
         <p:txBody>
           <a:bodyPr/>
           <a:lstStyle/>
           <a:p>
-            <a:endParaRPr lang="de-DE" smtClean="0"/>
+            <a:r>
+              <a:rPr lang="de-DE" dirty="0" smtClean="0"/>
+              <a:t>1. Einleitung</a:t>
+            </a:r>
+            <a:endParaRPr lang="de-DE" dirty="0" smtClean="0"/>
           </a:p>
         </p:txBody>
       </p:sp>

</xml_diff>

<commit_message>
kleine Verbesserung. Fortgesetzt zu 5.3
</commit_message>
<xml_diff>
--- a/Praesentation.pptx
+++ b/Praesentation.pptx
@@ -6,7 +6,7 @@
     <p:sldMasterId id="2147483650" r:id="rId2"/>
   </p:sldMasterIdLst>
   <p:notesMasterIdLst>
-    <p:notesMasterId r:id="rId31"/>
+    <p:notesMasterId r:id="rId37"/>
   </p:notesMasterIdLst>
   <p:sldIdLst>
     <p:sldId id="256" r:id="rId3"/>
@@ -17,9 +17,9 @@
     <p:sldId id="262" r:id="rId8"/>
     <p:sldId id="263" r:id="rId9"/>
     <p:sldId id="264" r:id="rId10"/>
-    <p:sldId id="265" r:id="rId11"/>
-    <p:sldId id="266" r:id="rId12"/>
-    <p:sldId id="272" r:id="rId13"/>
+    <p:sldId id="272" r:id="rId11"/>
+    <p:sldId id="265" r:id="rId12"/>
+    <p:sldId id="266" r:id="rId13"/>
     <p:sldId id="267" r:id="rId14"/>
     <p:sldId id="268" r:id="rId15"/>
     <p:sldId id="269" r:id="rId16"/>
@@ -37,6 +37,12 @@
     <p:sldId id="282" r:id="rId28"/>
     <p:sldId id="283" r:id="rId29"/>
     <p:sldId id="284" r:id="rId30"/>
+    <p:sldId id="285" r:id="rId31"/>
+    <p:sldId id="286" r:id="rId32"/>
+    <p:sldId id="287" r:id="rId33"/>
+    <p:sldId id="288" r:id="rId34"/>
+    <p:sldId id="289" r:id="rId35"/>
+    <p:sldId id="290" r:id="rId36"/>
   </p:sldIdLst>
   <p:sldSz cx="9144000" cy="6858000" type="screen4x3"/>
   <p:notesSz cx="6858000" cy="9144000"/>
@@ -277,7 +283,7 @@
               <a:pPr>
                 <a:defRPr/>
               </a:pPr>
-              <a:t>26.05.2013</a:t>
+              <a:t>01.06.2013</a:t>
             </a:fld>
             <a:endParaRPr lang="de-DE"/>
           </a:p>
@@ -672,7 +678,21 @@
             </a:r>
             <a:r>
               <a:rPr lang="de-DE" baseline="0" dirty="0" smtClean="0"/>
-              <a:t> Key/Value</a:t>
+              <a:t> </a:t>
+            </a:r>
+            <a:r>
+              <a:rPr lang="de-DE" baseline="0" dirty="0" smtClean="0"/>
+              <a:t>Key/Value</a:t>
+            </a:r>
+          </a:p>
+          <a:p>
+            <a:r>
+              <a:rPr lang="de-DE" baseline="0" dirty="0" err="1" smtClean="0"/>
+              <a:t>BigTable</a:t>
+            </a:r>
+            <a:r>
+              <a:rPr lang="de-DE" baseline="0" dirty="0" smtClean="0"/>
+              <a:t>: Nur Paper veröffentlicht; siehe Kategorisierung</a:t>
             </a:r>
             <a:endParaRPr lang="de-DE" dirty="0"/>
           </a:p>
@@ -766,7 +786,17 @@
           <a:p>
             <a:r>
               <a:rPr lang="de-DE" dirty="0" smtClean="0"/>
-              <a:t>Optimistischer Ansatz</a:t>
+              <a:t>Geht über Idee hinaus - &gt; Framework</a:t>
+            </a:r>
+          </a:p>
+          <a:p>
+            <a:r>
+              <a:rPr lang="de-DE" dirty="0" smtClean="0"/>
+              <a:t>Für</a:t>
+            </a:r>
+            <a:r>
+              <a:rPr lang="de-DE" baseline="0" dirty="0" smtClean="0"/>
+              <a:t> Standardhardware gedacht</a:t>
             </a:r>
             <a:endParaRPr lang="de-DE" dirty="0"/>
           </a:p>
@@ -795,7 +825,7 @@
               <a:pPr>
                 <a:defRPr/>
               </a:pPr>
-              <a:t>22</a:t>
+              <a:t>17</a:t>
             </a:fld>
             <a:endParaRPr lang="de-DE"/>
           </a:p>
@@ -804,7 +834,7 @@
     </p:spTree>
     <p:extLst>
       <p:ext uri="{BB962C8B-B14F-4D97-AF65-F5344CB8AC3E}">
-        <p14:creationId xmlns:p14="http://schemas.microsoft.com/office/powerpoint/2010/main" val="3160698408"/>
+        <p14:creationId xmlns:p14="http://schemas.microsoft.com/office/powerpoint/2010/main" val="443745272"/>
       </p:ext>
     </p:extLst>
   </p:cSld>
@@ -860,8 +890,38 @@
           <a:p>
             <a:r>
               <a:rPr lang="de-DE" dirty="0" smtClean="0"/>
-              <a:t>Zuordnung auch über Leistungsfähigkeit möglich</a:t>
-            </a:r>
+              <a:t>Neue Anforderungen: verteilt,</a:t>
+            </a:r>
+            <a:r>
+              <a:rPr lang="de-DE" baseline="0" dirty="0" smtClean="0"/>
+              <a:t> verfügbar</a:t>
+            </a:r>
+            <a:endParaRPr lang="de-DE" dirty="0" smtClean="0"/>
+          </a:p>
+          <a:p>
+            <a:endParaRPr lang="de-DE" dirty="0" smtClean="0"/>
+          </a:p>
+          <a:p>
+            <a:r>
+              <a:rPr lang="de-DE" dirty="0" err="1" smtClean="0"/>
+              <a:t>By</a:t>
+            </a:r>
+            <a:r>
+              <a:rPr lang="de-DE" dirty="0" smtClean="0"/>
+              <a:t> </a:t>
+            </a:r>
+            <a:r>
+              <a:rPr lang="de-DE" dirty="0" smtClean="0"/>
+              <a:t>Brewer</a:t>
+            </a:r>
+          </a:p>
+          <a:p>
+            <a:r>
+              <a:rPr lang="de-DE" dirty="0" smtClean="0"/>
+              <a:t>Verfügbarkeit und akzeptable Reaktionszeit ist gegeben (auch bei Ausfall einzelner Knoten) mit 100% Datenverfügbarkeit</a:t>
+            </a:r>
+          </a:p>
+          <a:p>
             <a:endParaRPr lang="de-DE" dirty="0"/>
           </a:p>
         </p:txBody>
@@ -889,7 +949,7 @@
               <a:pPr>
                 <a:defRPr/>
               </a:pPr>
-              <a:t>23</a:t>
+              <a:t>18</a:t>
             </a:fld>
             <a:endParaRPr lang="de-DE"/>
           </a:p>
@@ -898,7 +958,7 @@
     </p:spTree>
     <p:extLst>
       <p:ext uri="{BB962C8B-B14F-4D97-AF65-F5344CB8AC3E}">
-        <p14:creationId xmlns:p14="http://schemas.microsoft.com/office/powerpoint/2010/main" val="3160698408"/>
+        <p14:creationId xmlns:p14="http://schemas.microsoft.com/office/powerpoint/2010/main" val="1239445446"/>
       </p:ext>
     </p:extLst>
   </p:cSld>
@@ -954,17 +1014,7 @@
           <a:p>
             <a:r>
               <a:rPr lang="de-DE" dirty="0" smtClean="0"/>
-              <a:t>Hinzufügen/entfernen:</a:t>
-            </a:r>
-            <a:r>
-              <a:rPr lang="de-DE" baseline="0" dirty="0" smtClean="0"/>
-              <a:t> Redundanz vorhanden und automatische Verteilung anhand Hashwerte</a:t>
-            </a:r>
-          </a:p>
-          <a:p>
-            <a:r>
-              <a:rPr lang="de-DE" dirty="0" smtClean="0"/>
-              <a:t>Zugriff über Hashwert der Daten -&gt; Hashwert des Servers</a:t>
+              <a:t>Nur 2 Eigenschaften gleichzeitig</a:t>
             </a:r>
             <a:endParaRPr lang="de-DE" dirty="0"/>
           </a:p>
@@ -993,7 +1043,7 @@
               <a:pPr>
                 <a:defRPr/>
               </a:pPr>
-              <a:t>25</a:t>
+              <a:t>20</a:t>
             </a:fld>
             <a:endParaRPr lang="de-DE"/>
           </a:p>
@@ -1002,7 +1052,7 @@
     </p:spTree>
     <p:extLst>
       <p:ext uri="{BB962C8B-B14F-4D97-AF65-F5344CB8AC3E}">
-        <p14:creationId xmlns:p14="http://schemas.microsoft.com/office/powerpoint/2010/main" val="3403636299"/>
+        <p14:creationId xmlns:p14="http://schemas.microsoft.com/office/powerpoint/2010/main" val="1438683183"/>
       </p:ext>
     </p:extLst>
   </p:cSld>
@@ -1058,11 +1108,30 @@
           <a:p>
             <a:r>
               <a:rPr lang="de-DE" dirty="0" smtClean="0"/>
-              <a:t>Änderung</a:t>
+              <a:t>ACID: </a:t>
+            </a:r>
+            <a:r>
+              <a:rPr lang="de-DE" dirty="0" err="1" smtClean="0"/>
+              <a:t>Atomarität</a:t>
+            </a:r>
+            <a:r>
+              <a:rPr lang="de-DE" dirty="0" smtClean="0"/>
+              <a:t>,</a:t>
             </a:r>
             <a:r>
               <a:rPr lang="de-DE" baseline="0" dirty="0" smtClean="0"/>
-              <a:t> an Zeitstempel erkennbar</a:t>
+              <a:t> Konsistenzerhaltung, Isolation, Dauerhaftigkeit</a:t>
+            </a:r>
+            <a:endParaRPr lang="de-DE" dirty="0" smtClean="0"/>
+          </a:p>
+          <a:p>
+            <a:r>
+              <a:rPr lang="de-DE" dirty="0" smtClean="0"/>
+              <a:t>Optimistischer </a:t>
+            </a:r>
+            <a:r>
+              <a:rPr lang="de-DE" dirty="0" smtClean="0"/>
+              <a:t>Ansatz</a:t>
             </a:r>
             <a:endParaRPr lang="de-DE" dirty="0"/>
           </a:p>
@@ -1091,7 +1160,7 @@
               <a:pPr>
                 <a:defRPr/>
               </a:pPr>
-              <a:t>26</a:t>
+              <a:t>21</a:t>
             </a:fld>
             <a:endParaRPr lang="de-DE"/>
           </a:p>
@@ -1154,6 +1223,10 @@
           <a:bodyPr/>
           <a:lstStyle/>
           <a:p>
+            <a:r>
+              <a:rPr lang="de-DE" dirty="0" smtClean="0"/>
+              <a:t>Optimistischer Ansatz</a:t>
+            </a:r>
             <a:endParaRPr lang="de-DE" dirty="0"/>
           </a:p>
         </p:txBody>
@@ -1181,7 +1254,7 @@
               <a:pPr>
                 <a:defRPr/>
               </a:pPr>
-              <a:t>27</a:t>
+              <a:t>22</a:t>
             </a:fld>
             <a:endParaRPr lang="de-DE"/>
           </a:p>
@@ -1190,7 +1263,7 @@
     </p:spTree>
     <p:extLst>
       <p:ext uri="{BB962C8B-B14F-4D97-AF65-F5344CB8AC3E}">
-        <p14:creationId xmlns:p14="http://schemas.microsoft.com/office/powerpoint/2010/main" val="3403636299"/>
+        <p14:creationId xmlns:p14="http://schemas.microsoft.com/office/powerpoint/2010/main" val="3160698408"/>
       </p:ext>
     </p:extLst>
   </p:cSld>
@@ -1244,6 +1317,511 @@
           <a:bodyPr/>
           <a:lstStyle/>
           <a:p>
+            <a:r>
+              <a:rPr lang="de-DE" dirty="0" smtClean="0"/>
+              <a:t>Zuordnung auch über Leistungsfähigkeit möglich</a:t>
+            </a:r>
+            <a:endParaRPr lang="de-DE" dirty="0"/>
+          </a:p>
+        </p:txBody>
+      </p:sp>
+      <p:sp>
+        <p:nvSpPr>
+          <p:cNvPr id="4" name="Foliennummernplatzhalter 3"/>
+          <p:cNvSpPr>
+            <a:spLocks noGrp="1"/>
+          </p:cNvSpPr>
+          <p:nvPr>
+            <p:ph type="sldNum" sz="quarter" idx="10"/>
+          </p:nvPr>
+        </p:nvSpPr>
+        <p:spPr/>
+        <p:txBody>
+          <a:bodyPr/>
+          <a:lstStyle/>
+          <a:p>
+            <a:pPr>
+              <a:defRPr/>
+            </a:pPr>
+            <a:fld id="{70C331BD-16AB-4BE2-A12B-855C5D76B38C}" type="slidenum">
+              <a:rPr lang="de-DE" smtClean="0"/>
+              <a:pPr>
+                <a:defRPr/>
+              </a:pPr>
+              <a:t>23</a:t>
+            </a:fld>
+            <a:endParaRPr lang="de-DE"/>
+          </a:p>
+        </p:txBody>
+      </p:sp>
+    </p:spTree>
+    <p:extLst>
+      <p:ext uri="{BB962C8B-B14F-4D97-AF65-F5344CB8AC3E}">
+        <p14:creationId xmlns:p14="http://schemas.microsoft.com/office/powerpoint/2010/main" val="3160698408"/>
+      </p:ext>
+    </p:extLst>
+  </p:cSld>
+  <p:clrMapOvr>
+    <a:masterClrMapping/>
+  </p:clrMapOvr>
+</p:notes>
+</file>
+
+<file path=ppt/notesSlides/notesSlide16.xml><?xml version="1.0" encoding="utf-8"?>
+<p:notes xmlns:a="http://schemas.openxmlformats.org/drawingml/2006/main" xmlns:r="http://schemas.openxmlformats.org/officeDocument/2006/relationships" xmlns:p="http://schemas.openxmlformats.org/presentationml/2006/main">
+  <p:cSld>
+    <p:spTree>
+      <p:nvGrpSpPr>
+        <p:cNvPr id="1" name=""/>
+        <p:cNvGrpSpPr/>
+        <p:nvPr/>
+      </p:nvGrpSpPr>
+      <p:grpSpPr>
+        <a:xfrm>
+          <a:off x="0" y="0"/>
+          <a:ext cx="0" cy="0"/>
+          <a:chOff x="0" y="0"/>
+          <a:chExt cx="0" cy="0"/>
+        </a:xfrm>
+      </p:grpSpPr>
+      <p:sp>
+        <p:nvSpPr>
+          <p:cNvPr id="2" name="Folienbildplatzhalter 1"/>
+          <p:cNvSpPr>
+            <a:spLocks noGrp="1" noRot="1" noChangeAspect="1"/>
+          </p:cNvSpPr>
+          <p:nvPr>
+            <p:ph type="sldImg"/>
+          </p:nvPr>
+        </p:nvSpPr>
+        <p:spPr/>
+      </p:sp>
+      <p:sp>
+        <p:nvSpPr>
+          <p:cNvPr id="3" name="Notizenplatzhalter 2"/>
+          <p:cNvSpPr>
+            <a:spLocks noGrp="1"/>
+          </p:cNvSpPr>
+          <p:nvPr>
+            <p:ph type="body" idx="1"/>
+          </p:nvPr>
+        </p:nvSpPr>
+        <p:spPr/>
+        <p:txBody>
+          <a:bodyPr/>
+          <a:lstStyle/>
+          <a:p>
+            <a:r>
+              <a:rPr lang="de-DE" dirty="0" smtClean="0"/>
+              <a:t>Hinzufügen/entfernen:</a:t>
+            </a:r>
+            <a:r>
+              <a:rPr lang="de-DE" baseline="0" dirty="0" smtClean="0"/>
+              <a:t> Redundanz vorhanden und automatische Verteilung anhand Hashwerte</a:t>
+            </a:r>
+          </a:p>
+          <a:p>
+            <a:r>
+              <a:rPr lang="de-DE" dirty="0" smtClean="0"/>
+              <a:t>Zugriff über Hashwert der Daten -&gt; Hashwert des Servers</a:t>
+            </a:r>
+            <a:endParaRPr lang="de-DE" dirty="0"/>
+          </a:p>
+        </p:txBody>
+      </p:sp>
+      <p:sp>
+        <p:nvSpPr>
+          <p:cNvPr id="4" name="Foliennummernplatzhalter 3"/>
+          <p:cNvSpPr>
+            <a:spLocks noGrp="1"/>
+          </p:cNvSpPr>
+          <p:nvPr>
+            <p:ph type="sldNum" sz="quarter" idx="10"/>
+          </p:nvPr>
+        </p:nvSpPr>
+        <p:spPr/>
+        <p:txBody>
+          <a:bodyPr/>
+          <a:lstStyle/>
+          <a:p>
+            <a:pPr>
+              <a:defRPr/>
+            </a:pPr>
+            <a:fld id="{70C331BD-16AB-4BE2-A12B-855C5D76B38C}" type="slidenum">
+              <a:rPr lang="de-DE" smtClean="0"/>
+              <a:pPr>
+                <a:defRPr/>
+              </a:pPr>
+              <a:t>25</a:t>
+            </a:fld>
+            <a:endParaRPr lang="de-DE"/>
+          </a:p>
+        </p:txBody>
+      </p:sp>
+    </p:spTree>
+    <p:extLst>
+      <p:ext uri="{BB962C8B-B14F-4D97-AF65-F5344CB8AC3E}">
+        <p14:creationId xmlns:p14="http://schemas.microsoft.com/office/powerpoint/2010/main" val="3403636299"/>
+      </p:ext>
+    </p:extLst>
+  </p:cSld>
+  <p:clrMapOvr>
+    <a:masterClrMapping/>
+  </p:clrMapOvr>
+</p:notes>
+</file>
+
+<file path=ppt/notesSlides/notesSlide17.xml><?xml version="1.0" encoding="utf-8"?>
+<p:notes xmlns:a="http://schemas.openxmlformats.org/drawingml/2006/main" xmlns:r="http://schemas.openxmlformats.org/officeDocument/2006/relationships" xmlns:p="http://schemas.openxmlformats.org/presentationml/2006/main">
+  <p:cSld>
+    <p:spTree>
+      <p:nvGrpSpPr>
+        <p:cNvPr id="1" name=""/>
+        <p:cNvGrpSpPr/>
+        <p:nvPr/>
+      </p:nvGrpSpPr>
+      <p:grpSpPr>
+        <a:xfrm>
+          <a:off x="0" y="0"/>
+          <a:ext cx="0" cy="0"/>
+          <a:chOff x="0" y="0"/>
+          <a:chExt cx="0" cy="0"/>
+        </a:xfrm>
+      </p:grpSpPr>
+      <p:sp>
+        <p:nvSpPr>
+          <p:cNvPr id="2" name="Folienbildplatzhalter 1"/>
+          <p:cNvSpPr>
+            <a:spLocks noGrp="1" noRot="1" noChangeAspect="1"/>
+          </p:cNvSpPr>
+          <p:nvPr>
+            <p:ph type="sldImg"/>
+          </p:nvPr>
+        </p:nvSpPr>
+        <p:spPr/>
+      </p:sp>
+      <p:sp>
+        <p:nvSpPr>
+          <p:cNvPr id="3" name="Notizenplatzhalter 2"/>
+          <p:cNvSpPr>
+            <a:spLocks noGrp="1"/>
+          </p:cNvSpPr>
+          <p:nvPr>
+            <p:ph type="body" idx="1"/>
+          </p:nvPr>
+        </p:nvSpPr>
+        <p:spPr/>
+        <p:txBody>
+          <a:bodyPr/>
+          <a:lstStyle/>
+          <a:p>
+            <a:r>
+              <a:rPr lang="de-DE" baseline="0" dirty="0" smtClean="0"/>
+              <a:t>Transaktionen müssen nie warten</a:t>
+            </a:r>
+            <a:endParaRPr lang="de-DE" dirty="0" smtClean="0"/>
+          </a:p>
+          <a:p>
+            <a:r>
+              <a:rPr lang="de-DE" dirty="0" smtClean="0"/>
+              <a:t>Änderung</a:t>
+            </a:r>
+            <a:r>
+              <a:rPr lang="de-DE" baseline="0" dirty="0" smtClean="0"/>
+              <a:t> </a:t>
+            </a:r>
+            <a:r>
+              <a:rPr lang="de-DE" baseline="0" dirty="0" smtClean="0"/>
+              <a:t>an Zeitstempel </a:t>
+            </a:r>
+            <a:r>
+              <a:rPr lang="de-DE" baseline="0" dirty="0" smtClean="0"/>
+              <a:t>erkennbar</a:t>
+            </a:r>
+            <a:endParaRPr lang="de-DE" dirty="0"/>
+          </a:p>
+        </p:txBody>
+      </p:sp>
+      <p:sp>
+        <p:nvSpPr>
+          <p:cNvPr id="4" name="Foliennummernplatzhalter 3"/>
+          <p:cNvSpPr>
+            <a:spLocks noGrp="1"/>
+          </p:cNvSpPr>
+          <p:nvPr>
+            <p:ph type="sldNum" sz="quarter" idx="10"/>
+          </p:nvPr>
+        </p:nvSpPr>
+        <p:spPr/>
+        <p:txBody>
+          <a:bodyPr/>
+          <a:lstStyle/>
+          <a:p>
+            <a:pPr>
+              <a:defRPr/>
+            </a:pPr>
+            <a:fld id="{70C331BD-16AB-4BE2-A12B-855C5D76B38C}" type="slidenum">
+              <a:rPr lang="de-DE" smtClean="0"/>
+              <a:pPr>
+                <a:defRPr/>
+              </a:pPr>
+              <a:t>26</a:t>
+            </a:fld>
+            <a:endParaRPr lang="de-DE"/>
+          </a:p>
+        </p:txBody>
+      </p:sp>
+    </p:spTree>
+    <p:extLst>
+      <p:ext uri="{BB962C8B-B14F-4D97-AF65-F5344CB8AC3E}">
+        <p14:creationId xmlns:p14="http://schemas.microsoft.com/office/powerpoint/2010/main" val="3160698408"/>
+      </p:ext>
+    </p:extLst>
+  </p:cSld>
+  <p:clrMapOvr>
+    <a:masterClrMapping/>
+  </p:clrMapOvr>
+</p:notes>
+</file>
+
+<file path=ppt/notesSlides/notesSlide18.xml><?xml version="1.0" encoding="utf-8"?>
+<p:notes xmlns:a="http://schemas.openxmlformats.org/drawingml/2006/main" xmlns:r="http://schemas.openxmlformats.org/officeDocument/2006/relationships" xmlns:p="http://schemas.openxmlformats.org/presentationml/2006/main">
+  <p:cSld>
+    <p:spTree>
+      <p:nvGrpSpPr>
+        <p:cNvPr id="1" name=""/>
+        <p:cNvGrpSpPr/>
+        <p:nvPr/>
+      </p:nvGrpSpPr>
+      <p:grpSpPr>
+        <a:xfrm>
+          <a:off x="0" y="0"/>
+          <a:ext cx="0" cy="0"/>
+          <a:chOff x="0" y="0"/>
+          <a:chExt cx="0" cy="0"/>
+        </a:xfrm>
+      </p:grpSpPr>
+      <p:sp>
+        <p:nvSpPr>
+          <p:cNvPr id="2" name="Folienbildplatzhalter 1"/>
+          <p:cNvSpPr>
+            <a:spLocks noGrp="1" noRot="1" noChangeAspect="1"/>
+          </p:cNvSpPr>
+          <p:nvPr>
+            <p:ph type="sldImg"/>
+          </p:nvPr>
+        </p:nvSpPr>
+        <p:spPr/>
+      </p:sp>
+      <p:sp>
+        <p:nvSpPr>
+          <p:cNvPr id="3" name="Notizenplatzhalter 2"/>
+          <p:cNvSpPr>
+            <a:spLocks noGrp="1"/>
+          </p:cNvSpPr>
+          <p:nvPr>
+            <p:ph type="body" idx="1"/>
+          </p:nvPr>
+        </p:nvSpPr>
+        <p:spPr/>
+        <p:txBody>
+          <a:bodyPr/>
+          <a:lstStyle/>
+          <a:p>
+            <a:r>
+              <a:rPr lang="de-DE" dirty="0" smtClean="0"/>
+              <a:t>Alte Dateiversionen</a:t>
+            </a:r>
+            <a:r>
+              <a:rPr lang="de-DE" baseline="0" dirty="0" smtClean="0"/>
+              <a:t> können gelesen werden</a:t>
+            </a:r>
+            <a:endParaRPr lang="de-DE" dirty="0"/>
+          </a:p>
+        </p:txBody>
+      </p:sp>
+      <p:sp>
+        <p:nvSpPr>
+          <p:cNvPr id="4" name="Foliennummernplatzhalter 3"/>
+          <p:cNvSpPr>
+            <a:spLocks noGrp="1"/>
+          </p:cNvSpPr>
+          <p:nvPr>
+            <p:ph type="sldNum" sz="quarter" idx="10"/>
+          </p:nvPr>
+        </p:nvSpPr>
+        <p:spPr/>
+        <p:txBody>
+          <a:bodyPr/>
+          <a:lstStyle/>
+          <a:p>
+            <a:pPr>
+              <a:defRPr/>
+            </a:pPr>
+            <a:fld id="{70C331BD-16AB-4BE2-A12B-855C5D76B38C}" type="slidenum">
+              <a:rPr lang="de-DE" smtClean="0"/>
+              <a:pPr>
+                <a:defRPr/>
+              </a:pPr>
+              <a:t>27</a:t>
+            </a:fld>
+            <a:endParaRPr lang="de-DE"/>
+          </a:p>
+        </p:txBody>
+      </p:sp>
+    </p:spTree>
+    <p:extLst>
+      <p:ext uri="{BB962C8B-B14F-4D97-AF65-F5344CB8AC3E}">
+        <p14:creationId xmlns:p14="http://schemas.microsoft.com/office/powerpoint/2010/main" val="3403636299"/>
+      </p:ext>
+    </p:extLst>
+  </p:cSld>
+  <p:clrMapOvr>
+    <a:masterClrMapping/>
+  </p:clrMapOvr>
+</p:notes>
+</file>
+
+<file path=ppt/notesSlides/notesSlide19.xml><?xml version="1.0" encoding="utf-8"?>
+<p:notes xmlns:a="http://schemas.openxmlformats.org/drawingml/2006/main" xmlns:r="http://schemas.openxmlformats.org/officeDocument/2006/relationships" xmlns:p="http://schemas.openxmlformats.org/presentationml/2006/main">
+  <p:cSld>
+    <p:spTree>
+      <p:nvGrpSpPr>
+        <p:cNvPr id="1" name=""/>
+        <p:cNvGrpSpPr/>
+        <p:nvPr/>
+      </p:nvGrpSpPr>
+      <p:grpSpPr>
+        <a:xfrm>
+          <a:off x="0" y="0"/>
+          <a:ext cx="0" cy="0"/>
+          <a:chOff x="0" y="0"/>
+          <a:chExt cx="0" cy="0"/>
+        </a:xfrm>
+      </p:grpSpPr>
+      <p:sp>
+        <p:nvSpPr>
+          <p:cNvPr id="2" name="Folienbildplatzhalter 1"/>
+          <p:cNvSpPr>
+            <a:spLocks noGrp="1" noRot="1" noChangeAspect="1"/>
+          </p:cNvSpPr>
+          <p:nvPr>
+            <p:ph type="sldImg"/>
+          </p:nvPr>
+        </p:nvSpPr>
+        <p:spPr/>
+      </p:sp>
+      <p:sp>
+        <p:nvSpPr>
+          <p:cNvPr id="3" name="Notizenplatzhalter 2"/>
+          <p:cNvSpPr>
+            <a:spLocks noGrp="1"/>
+          </p:cNvSpPr>
+          <p:nvPr>
+            <p:ph type="body" idx="1"/>
+          </p:nvPr>
+        </p:nvSpPr>
+        <p:spPr/>
+        <p:txBody>
+          <a:bodyPr/>
+          <a:lstStyle/>
+          <a:p>
+            <a:r>
+              <a:rPr lang="de-DE" dirty="0" smtClean="0"/>
+              <a:t>GET: lese </a:t>
+            </a:r>
+            <a:r>
+              <a:rPr lang="de-DE" dirty="0" err="1" smtClean="0"/>
+              <a:t>ressource</a:t>
+            </a:r>
+            <a:r>
+              <a:rPr lang="de-DE" dirty="0" smtClean="0"/>
+              <a:t>  - immer gleiche Rückgabe</a:t>
+            </a:r>
+          </a:p>
+          <a:p>
+            <a:r>
+              <a:rPr lang="de-DE" dirty="0" smtClean="0"/>
+              <a:t>HEAD: lese Information zu </a:t>
+            </a:r>
+            <a:r>
+              <a:rPr lang="de-DE" dirty="0" err="1" smtClean="0"/>
+              <a:t>ressourcen</a:t>
+            </a:r>
+            <a:r>
+              <a:rPr lang="de-DE" dirty="0" smtClean="0"/>
+              <a:t> - immer gleiche Rückgabe</a:t>
+            </a:r>
+          </a:p>
+          <a:p>
+            <a:r>
+              <a:rPr lang="de-DE" dirty="0" smtClean="0"/>
+              <a:t>PUT: schreibe </a:t>
+            </a:r>
+            <a:r>
+              <a:rPr lang="de-DE" dirty="0" err="1" smtClean="0"/>
+              <a:t>Resource</a:t>
+            </a:r>
+            <a:r>
+              <a:rPr lang="de-DE" dirty="0" smtClean="0"/>
+              <a:t> - doppelter gleicher PUT hat selben </a:t>
+            </a:r>
+            <a:r>
+              <a:rPr lang="de-DE" dirty="0" smtClean="0"/>
+              <a:t>Effekt </a:t>
+            </a:r>
+            <a:r>
+              <a:rPr lang="de-DE" dirty="0" smtClean="0"/>
+              <a:t>wie einer</a:t>
+            </a:r>
+          </a:p>
+          <a:p>
+            <a:r>
+              <a:rPr lang="de-DE" dirty="0" smtClean="0"/>
+              <a:t>DELETE: entferne </a:t>
+            </a:r>
+            <a:r>
+              <a:rPr lang="de-DE" dirty="0" err="1" smtClean="0"/>
+              <a:t>Resource</a:t>
+            </a:r>
+            <a:r>
+              <a:rPr lang="de-DE" dirty="0" smtClean="0"/>
+              <a:t> - doppelter </a:t>
+            </a:r>
+            <a:r>
+              <a:rPr lang="de-DE" dirty="0" err="1" smtClean="0"/>
+              <a:t>aufruf</a:t>
+            </a:r>
+            <a:r>
+              <a:rPr lang="de-DE" dirty="0" smtClean="0"/>
+              <a:t> wie einer</a:t>
+            </a:r>
+          </a:p>
+          <a:p>
+            <a:r>
+              <a:rPr lang="de-DE" dirty="0" smtClean="0"/>
+              <a:t>POST: Senden von Informationen um </a:t>
+            </a:r>
+            <a:r>
+              <a:rPr lang="de-DE" dirty="0" err="1" smtClean="0"/>
+              <a:t>resourcen</a:t>
+            </a:r>
+            <a:r>
+              <a:rPr lang="de-DE" dirty="0" smtClean="0"/>
+              <a:t> zu ändern oder zu erzeugen oder ohne </a:t>
+            </a:r>
+            <a:r>
+              <a:rPr lang="de-DE" dirty="0" err="1" smtClean="0"/>
+              <a:t>nebeneffect</a:t>
+            </a:r>
+            <a:r>
+              <a:rPr lang="de-DE" dirty="0" smtClean="0"/>
+              <a:t> - nicht </a:t>
+            </a:r>
+            <a:r>
+              <a:rPr lang="de-DE" dirty="0" err="1" smtClean="0"/>
+              <a:t>idempotent</a:t>
+            </a:r>
             <a:endParaRPr lang="de-DE" dirty="0"/>
           </a:p>
         </p:txBody>
@@ -1400,6 +1978,524 @@
 </p:notes>
 </file>
 
+<file path=ppt/notesSlides/notesSlide20.xml><?xml version="1.0" encoding="utf-8"?>
+<p:notes xmlns:a="http://schemas.openxmlformats.org/drawingml/2006/main" xmlns:r="http://schemas.openxmlformats.org/officeDocument/2006/relationships" xmlns:p="http://schemas.openxmlformats.org/presentationml/2006/main">
+  <p:cSld>
+    <p:spTree>
+      <p:nvGrpSpPr>
+        <p:cNvPr id="1" name=""/>
+        <p:cNvGrpSpPr/>
+        <p:nvPr/>
+      </p:nvGrpSpPr>
+      <p:grpSpPr>
+        <a:xfrm>
+          <a:off x="0" y="0"/>
+          <a:ext cx="0" cy="0"/>
+          <a:chOff x="0" y="0"/>
+          <a:chExt cx="0" cy="0"/>
+        </a:xfrm>
+      </p:grpSpPr>
+      <p:sp>
+        <p:nvSpPr>
+          <p:cNvPr id="2" name="Folienbildplatzhalter 1"/>
+          <p:cNvSpPr>
+            <a:spLocks noGrp="1" noRot="1" noChangeAspect="1"/>
+          </p:cNvSpPr>
+          <p:nvPr>
+            <p:ph type="sldImg"/>
+          </p:nvPr>
+        </p:nvSpPr>
+        <p:spPr/>
+      </p:sp>
+      <p:sp>
+        <p:nvSpPr>
+          <p:cNvPr id="3" name="Notizenplatzhalter 2"/>
+          <p:cNvSpPr>
+            <a:spLocks noGrp="1"/>
+          </p:cNvSpPr>
+          <p:nvPr>
+            <p:ph type="body" idx="1"/>
+          </p:nvPr>
+        </p:nvSpPr>
+        <p:spPr/>
+        <p:txBody>
+          <a:bodyPr/>
+          <a:lstStyle/>
+          <a:p>
+            <a:endParaRPr lang="de-DE" dirty="0"/>
+          </a:p>
+        </p:txBody>
+      </p:sp>
+      <p:sp>
+        <p:nvSpPr>
+          <p:cNvPr id="4" name="Foliennummernplatzhalter 3"/>
+          <p:cNvSpPr>
+            <a:spLocks noGrp="1"/>
+          </p:cNvSpPr>
+          <p:nvPr>
+            <p:ph type="sldNum" sz="quarter" idx="10"/>
+          </p:nvPr>
+        </p:nvSpPr>
+        <p:spPr/>
+        <p:txBody>
+          <a:bodyPr/>
+          <a:lstStyle/>
+          <a:p>
+            <a:pPr>
+              <a:defRPr/>
+            </a:pPr>
+            <a:fld id="{70C331BD-16AB-4BE2-A12B-855C5D76B38C}" type="slidenum">
+              <a:rPr lang="de-DE" smtClean="0"/>
+              <a:pPr>
+                <a:defRPr/>
+              </a:pPr>
+              <a:t>30</a:t>
+            </a:fld>
+            <a:endParaRPr lang="de-DE"/>
+          </a:p>
+        </p:txBody>
+      </p:sp>
+    </p:spTree>
+    <p:extLst>
+      <p:ext uri="{BB962C8B-B14F-4D97-AF65-F5344CB8AC3E}">
+        <p14:creationId xmlns:p14="http://schemas.microsoft.com/office/powerpoint/2010/main" val="298209940"/>
+      </p:ext>
+    </p:extLst>
+  </p:cSld>
+  <p:clrMapOvr>
+    <a:masterClrMapping/>
+  </p:clrMapOvr>
+</p:notes>
+</file>
+
+<file path=ppt/notesSlides/notesSlide21.xml><?xml version="1.0" encoding="utf-8"?>
+<p:notes xmlns:a="http://schemas.openxmlformats.org/drawingml/2006/main" xmlns:r="http://schemas.openxmlformats.org/officeDocument/2006/relationships" xmlns:p="http://schemas.openxmlformats.org/presentationml/2006/main">
+  <p:cSld>
+    <p:spTree>
+      <p:nvGrpSpPr>
+        <p:cNvPr id="1" name=""/>
+        <p:cNvGrpSpPr/>
+        <p:nvPr/>
+      </p:nvGrpSpPr>
+      <p:grpSpPr>
+        <a:xfrm>
+          <a:off x="0" y="0"/>
+          <a:ext cx="0" cy="0"/>
+          <a:chOff x="0" y="0"/>
+          <a:chExt cx="0" cy="0"/>
+        </a:xfrm>
+      </p:grpSpPr>
+      <p:sp>
+        <p:nvSpPr>
+          <p:cNvPr id="2" name="Folienbildplatzhalter 1"/>
+          <p:cNvSpPr>
+            <a:spLocks noGrp="1" noRot="1" noChangeAspect="1"/>
+          </p:cNvSpPr>
+          <p:nvPr>
+            <p:ph type="sldImg"/>
+          </p:nvPr>
+        </p:nvSpPr>
+        <p:spPr/>
+      </p:sp>
+      <p:sp>
+        <p:nvSpPr>
+          <p:cNvPr id="3" name="Notizenplatzhalter 2"/>
+          <p:cNvSpPr>
+            <a:spLocks noGrp="1"/>
+          </p:cNvSpPr>
+          <p:nvPr>
+            <p:ph type="body" idx="1"/>
+          </p:nvPr>
+        </p:nvSpPr>
+        <p:spPr/>
+        <p:txBody>
+          <a:bodyPr/>
+          <a:lstStyle/>
+          <a:p>
+            <a:r>
+              <a:rPr lang="de-DE" dirty="0" smtClean="0"/>
+              <a:t>Beispiele:</a:t>
+            </a:r>
+            <a:r>
+              <a:rPr lang="de-DE" baseline="0" dirty="0" smtClean="0"/>
+              <a:t> </a:t>
+            </a:r>
+            <a:r>
+              <a:rPr lang="de-DE" baseline="0" dirty="0" err="1" smtClean="0"/>
+              <a:t>Redis</a:t>
+            </a:r>
+            <a:r>
+              <a:rPr lang="de-DE" baseline="0" dirty="0" smtClean="0"/>
+              <a:t>, </a:t>
+            </a:r>
+            <a:r>
+              <a:rPr lang="de-DE" baseline="0" dirty="0" err="1" smtClean="0"/>
+              <a:t>Chrordless</a:t>
+            </a:r>
+            <a:r>
+              <a:rPr lang="de-DE" baseline="0" dirty="0" smtClean="0"/>
+              <a:t>, </a:t>
+            </a:r>
+            <a:r>
+              <a:rPr lang="de-DE" baseline="0" dirty="0" err="1" smtClean="0"/>
+              <a:t>Riak</a:t>
+            </a:r>
+            <a:r>
+              <a:rPr lang="de-DE" baseline="0" dirty="0" smtClean="0"/>
+              <a:t>, MEMBASE, </a:t>
+            </a:r>
+            <a:r>
+              <a:rPr lang="de-DE" baseline="0" dirty="0" err="1" smtClean="0"/>
+              <a:t>Voldemort</a:t>
+            </a:r>
+            <a:r>
+              <a:rPr lang="de-DE" baseline="0" dirty="0" smtClean="0"/>
+              <a:t>, Amazon Dynamo</a:t>
+            </a:r>
+            <a:endParaRPr lang="de-DE" dirty="0"/>
+          </a:p>
+        </p:txBody>
+      </p:sp>
+      <p:sp>
+        <p:nvSpPr>
+          <p:cNvPr id="4" name="Foliennummernplatzhalter 3"/>
+          <p:cNvSpPr>
+            <a:spLocks noGrp="1"/>
+          </p:cNvSpPr>
+          <p:nvPr>
+            <p:ph type="sldNum" sz="quarter" idx="10"/>
+          </p:nvPr>
+        </p:nvSpPr>
+        <p:spPr/>
+        <p:txBody>
+          <a:bodyPr/>
+          <a:lstStyle/>
+          <a:p>
+            <a:pPr>
+              <a:defRPr/>
+            </a:pPr>
+            <a:fld id="{70C331BD-16AB-4BE2-A12B-855C5D76B38C}" type="slidenum">
+              <a:rPr lang="de-DE" smtClean="0"/>
+              <a:pPr>
+                <a:defRPr/>
+              </a:pPr>
+              <a:t>31</a:t>
+            </a:fld>
+            <a:endParaRPr lang="de-DE"/>
+          </a:p>
+        </p:txBody>
+      </p:sp>
+    </p:spTree>
+    <p:extLst>
+      <p:ext uri="{BB962C8B-B14F-4D97-AF65-F5344CB8AC3E}">
+        <p14:creationId xmlns:p14="http://schemas.microsoft.com/office/powerpoint/2010/main" val="298209940"/>
+      </p:ext>
+    </p:extLst>
+  </p:cSld>
+  <p:clrMapOvr>
+    <a:masterClrMapping/>
+  </p:clrMapOvr>
+</p:notes>
+</file>
+
+<file path=ppt/notesSlides/notesSlide22.xml><?xml version="1.0" encoding="utf-8"?>
+<p:notes xmlns:a="http://schemas.openxmlformats.org/drawingml/2006/main" xmlns:r="http://schemas.openxmlformats.org/officeDocument/2006/relationships" xmlns:p="http://schemas.openxmlformats.org/presentationml/2006/main">
+  <p:cSld>
+    <p:spTree>
+      <p:nvGrpSpPr>
+        <p:cNvPr id="1" name=""/>
+        <p:cNvGrpSpPr/>
+        <p:nvPr/>
+      </p:nvGrpSpPr>
+      <p:grpSpPr>
+        <a:xfrm>
+          <a:off x="0" y="0"/>
+          <a:ext cx="0" cy="0"/>
+          <a:chOff x="0" y="0"/>
+          <a:chExt cx="0" cy="0"/>
+        </a:xfrm>
+      </p:grpSpPr>
+      <p:sp>
+        <p:nvSpPr>
+          <p:cNvPr id="2" name="Folienbildplatzhalter 1"/>
+          <p:cNvSpPr>
+            <a:spLocks noGrp="1" noRot="1" noChangeAspect="1"/>
+          </p:cNvSpPr>
+          <p:nvPr>
+            <p:ph type="sldImg"/>
+          </p:nvPr>
+        </p:nvSpPr>
+        <p:spPr/>
+      </p:sp>
+      <p:sp>
+        <p:nvSpPr>
+          <p:cNvPr id="3" name="Notizenplatzhalter 2"/>
+          <p:cNvSpPr>
+            <a:spLocks noGrp="1"/>
+          </p:cNvSpPr>
+          <p:nvPr>
+            <p:ph type="body" idx="1"/>
+          </p:nvPr>
+        </p:nvSpPr>
+        <p:spPr/>
+        <p:txBody>
+          <a:bodyPr/>
+          <a:lstStyle/>
+          <a:p>
+            <a:r>
+              <a:rPr lang="de-DE" dirty="0" smtClean="0"/>
+              <a:t>Beispiele: </a:t>
+            </a:r>
+            <a:r>
+              <a:rPr lang="de-DE" dirty="0" err="1" smtClean="0"/>
+              <a:t>MongoDB</a:t>
+            </a:r>
+            <a:r>
+              <a:rPr lang="de-DE" dirty="0" smtClean="0"/>
+              <a:t>, </a:t>
+            </a:r>
+            <a:r>
+              <a:rPr lang="de-DE" dirty="0" err="1" smtClean="0"/>
+              <a:t>CouchDB</a:t>
+            </a:r>
+            <a:r>
+              <a:rPr lang="de-DE" dirty="0" smtClean="0"/>
+              <a:t>, Amazon </a:t>
+            </a:r>
+            <a:r>
+              <a:rPr lang="de-DE" dirty="0" err="1" smtClean="0"/>
+              <a:t>SimpleDB</a:t>
+            </a:r>
+            <a:r>
+              <a:rPr lang="de-DE" dirty="0" smtClean="0"/>
+              <a:t>, Terrastore</a:t>
+            </a:r>
+            <a:endParaRPr lang="de-DE" dirty="0"/>
+          </a:p>
+        </p:txBody>
+      </p:sp>
+      <p:sp>
+        <p:nvSpPr>
+          <p:cNvPr id="4" name="Foliennummernplatzhalter 3"/>
+          <p:cNvSpPr>
+            <a:spLocks noGrp="1"/>
+          </p:cNvSpPr>
+          <p:nvPr>
+            <p:ph type="sldNum" sz="quarter" idx="10"/>
+          </p:nvPr>
+        </p:nvSpPr>
+        <p:spPr/>
+        <p:txBody>
+          <a:bodyPr/>
+          <a:lstStyle/>
+          <a:p>
+            <a:pPr>
+              <a:defRPr/>
+            </a:pPr>
+            <a:fld id="{70C331BD-16AB-4BE2-A12B-855C5D76B38C}" type="slidenum">
+              <a:rPr lang="de-DE" smtClean="0"/>
+              <a:pPr>
+                <a:defRPr/>
+              </a:pPr>
+              <a:t>32</a:t>
+            </a:fld>
+            <a:endParaRPr lang="de-DE"/>
+          </a:p>
+        </p:txBody>
+      </p:sp>
+    </p:spTree>
+    <p:extLst>
+      <p:ext uri="{BB962C8B-B14F-4D97-AF65-F5344CB8AC3E}">
+        <p14:creationId xmlns:p14="http://schemas.microsoft.com/office/powerpoint/2010/main" val="298209940"/>
+      </p:ext>
+    </p:extLst>
+  </p:cSld>
+  <p:clrMapOvr>
+    <a:masterClrMapping/>
+  </p:clrMapOvr>
+</p:notes>
+</file>
+
+<file path=ppt/notesSlides/notesSlide23.xml><?xml version="1.0" encoding="utf-8"?>
+<p:notes xmlns:a="http://schemas.openxmlformats.org/drawingml/2006/main" xmlns:r="http://schemas.openxmlformats.org/officeDocument/2006/relationships" xmlns:p="http://schemas.openxmlformats.org/presentationml/2006/main">
+  <p:cSld>
+    <p:spTree>
+      <p:nvGrpSpPr>
+        <p:cNvPr id="1" name=""/>
+        <p:cNvGrpSpPr/>
+        <p:nvPr/>
+      </p:nvGrpSpPr>
+      <p:grpSpPr>
+        <a:xfrm>
+          <a:off x="0" y="0"/>
+          <a:ext cx="0" cy="0"/>
+          <a:chOff x="0" y="0"/>
+          <a:chExt cx="0" cy="0"/>
+        </a:xfrm>
+      </p:grpSpPr>
+      <p:sp>
+        <p:nvSpPr>
+          <p:cNvPr id="2" name="Folienbildplatzhalter 1"/>
+          <p:cNvSpPr>
+            <a:spLocks noGrp="1" noRot="1" noChangeAspect="1"/>
+          </p:cNvSpPr>
+          <p:nvPr>
+            <p:ph type="sldImg"/>
+          </p:nvPr>
+        </p:nvSpPr>
+        <p:spPr/>
+      </p:sp>
+      <p:sp>
+        <p:nvSpPr>
+          <p:cNvPr id="3" name="Notizenplatzhalter 2"/>
+          <p:cNvSpPr>
+            <a:spLocks noGrp="1"/>
+          </p:cNvSpPr>
+          <p:nvPr>
+            <p:ph type="body" idx="1"/>
+          </p:nvPr>
+        </p:nvSpPr>
+        <p:spPr/>
+        <p:txBody>
+          <a:bodyPr/>
+          <a:lstStyle/>
+          <a:p>
+            <a:endParaRPr lang="de-DE" dirty="0"/>
+          </a:p>
+        </p:txBody>
+      </p:sp>
+      <p:sp>
+        <p:nvSpPr>
+          <p:cNvPr id="4" name="Foliennummernplatzhalter 3"/>
+          <p:cNvSpPr>
+            <a:spLocks noGrp="1"/>
+          </p:cNvSpPr>
+          <p:nvPr>
+            <p:ph type="sldNum" sz="quarter" idx="10"/>
+          </p:nvPr>
+        </p:nvSpPr>
+        <p:spPr/>
+        <p:txBody>
+          <a:bodyPr/>
+          <a:lstStyle/>
+          <a:p>
+            <a:pPr>
+              <a:defRPr/>
+            </a:pPr>
+            <a:fld id="{70C331BD-16AB-4BE2-A12B-855C5D76B38C}" type="slidenum">
+              <a:rPr lang="de-DE" smtClean="0"/>
+              <a:pPr>
+                <a:defRPr/>
+              </a:pPr>
+              <a:t>33</a:t>
+            </a:fld>
+            <a:endParaRPr lang="de-DE"/>
+          </a:p>
+        </p:txBody>
+      </p:sp>
+    </p:spTree>
+    <p:extLst>
+      <p:ext uri="{BB962C8B-B14F-4D97-AF65-F5344CB8AC3E}">
+        <p14:creationId xmlns:p14="http://schemas.microsoft.com/office/powerpoint/2010/main" val="298209940"/>
+      </p:ext>
+    </p:extLst>
+  </p:cSld>
+  <p:clrMapOvr>
+    <a:masterClrMapping/>
+  </p:clrMapOvr>
+</p:notes>
+</file>
+
+<file path=ppt/notesSlides/notesSlide24.xml><?xml version="1.0" encoding="utf-8"?>
+<p:notes xmlns:a="http://schemas.openxmlformats.org/drawingml/2006/main" xmlns:r="http://schemas.openxmlformats.org/officeDocument/2006/relationships" xmlns:p="http://schemas.openxmlformats.org/presentationml/2006/main">
+  <p:cSld>
+    <p:spTree>
+      <p:nvGrpSpPr>
+        <p:cNvPr id="1" name=""/>
+        <p:cNvGrpSpPr/>
+        <p:nvPr/>
+      </p:nvGrpSpPr>
+      <p:grpSpPr>
+        <a:xfrm>
+          <a:off x="0" y="0"/>
+          <a:ext cx="0" cy="0"/>
+          <a:chOff x="0" y="0"/>
+          <a:chExt cx="0" cy="0"/>
+        </a:xfrm>
+      </p:grpSpPr>
+      <p:sp>
+        <p:nvSpPr>
+          <p:cNvPr id="2" name="Folienbildplatzhalter 1"/>
+          <p:cNvSpPr>
+            <a:spLocks noGrp="1" noRot="1" noChangeAspect="1"/>
+          </p:cNvSpPr>
+          <p:nvPr>
+            <p:ph type="sldImg"/>
+          </p:nvPr>
+        </p:nvSpPr>
+        <p:spPr/>
+      </p:sp>
+      <p:sp>
+        <p:nvSpPr>
+          <p:cNvPr id="3" name="Notizenplatzhalter 2"/>
+          <p:cNvSpPr>
+            <a:spLocks noGrp="1"/>
+          </p:cNvSpPr>
+          <p:nvPr>
+            <p:ph type="body" idx="1"/>
+          </p:nvPr>
+        </p:nvSpPr>
+        <p:spPr/>
+        <p:txBody>
+          <a:bodyPr/>
+          <a:lstStyle/>
+          <a:p>
+            <a:endParaRPr lang="de-DE" dirty="0"/>
+          </a:p>
+        </p:txBody>
+      </p:sp>
+      <p:sp>
+        <p:nvSpPr>
+          <p:cNvPr id="4" name="Foliennummernplatzhalter 3"/>
+          <p:cNvSpPr>
+            <a:spLocks noGrp="1"/>
+          </p:cNvSpPr>
+          <p:nvPr>
+            <p:ph type="sldNum" sz="quarter" idx="10"/>
+          </p:nvPr>
+        </p:nvSpPr>
+        <p:spPr/>
+        <p:txBody>
+          <a:bodyPr/>
+          <a:lstStyle/>
+          <a:p>
+            <a:pPr>
+              <a:defRPr/>
+            </a:pPr>
+            <a:fld id="{70C331BD-16AB-4BE2-A12B-855C5D76B38C}" type="slidenum">
+              <a:rPr lang="de-DE" smtClean="0"/>
+              <a:pPr>
+                <a:defRPr/>
+              </a:pPr>
+              <a:t>34</a:t>
+            </a:fld>
+            <a:endParaRPr lang="de-DE"/>
+          </a:p>
+        </p:txBody>
+      </p:sp>
+    </p:spTree>
+    <p:extLst>
+      <p:ext uri="{BB962C8B-B14F-4D97-AF65-F5344CB8AC3E}">
+        <p14:creationId xmlns:p14="http://schemas.microsoft.com/office/powerpoint/2010/main" val="298209940"/>
+      </p:ext>
+    </p:extLst>
+  </p:cSld>
+  <p:clrMapOvr>
+    <a:masterClrMapping/>
+  </p:clrMapOvr>
+</p:notes>
+</file>
+
 <file path=ppt/notesSlides/notesSlide3.xml><?xml version="1.0" encoding="utf-8"?>
 <p:notes xmlns:a="http://schemas.openxmlformats.org/drawingml/2006/main" xmlns:r="http://schemas.openxmlformats.org/officeDocument/2006/relationships" xmlns:p="http://schemas.openxmlformats.org/presentationml/2006/main">
   <p:cSld>
@@ -1475,7 +2571,7 @@
               <a:pPr>
                 <a:defRPr/>
               </a:pPr>
-              <a:t>10</a:t>
+              <a:t>9</a:t>
             </a:fld>
             <a:endParaRPr lang="de-DE"/>
           </a:p>
@@ -1540,7 +2636,27 @@
           <a:p>
             <a:r>
               <a:rPr lang="de-DE" dirty="0" smtClean="0"/>
-              <a:t>Juni 2011</a:t>
+              <a:t>Nutzt MySQL (</a:t>
+            </a:r>
+            <a:r>
+              <a:rPr lang="de-DE" dirty="0" err="1" smtClean="0"/>
+              <a:t>NewSQL</a:t>
+            </a:r>
+            <a:r>
+              <a:rPr lang="de-DE" dirty="0" smtClean="0"/>
+              <a:t>)</a:t>
+            </a:r>
+            <a:r>
+              <a:rPr lang="de-DE" baseline="0" dirty="0" smtClean="0"/>
+              <a:t> und </a:t>
+            </a:r>
+            <a:r>
+              <a:rPr lang="de-DE" baseline="0" dirty="0" err="1" smtClean="0"/>
+              <a:t>Hbase</a:t>
+            </a:r>
+            <a:r>
+              <a:rPr lang="de-DE" baseline="0" dirty="0" smtClean="0"/>
+              <a:t> (2011)</a:t>
             </a:r>
             <a:endParaRPr lang="de-DE" dirty="0"/>
           </a:p>
@@ -1569,7 +2685,7 @@
               <a:pPr>
                 <a:defRPr/>
               </a:pPr>
-              <a:t>11</a:t>
+              <a:t>10</a:t>
             </a:fld>
             <a:endParaRPr lang="de-DE"/>
           </a:p>
@@ -1578,7 +2694,7 @@
     </p:spTree>
     <p:extLst>
       <p:ext uri="{BB962C8B-B14F-4D97-AF65-F5344CB8AC3E}">
-        <p14:creationId xmlns:p14="http://schemas.microsoft.com/office/powerpoint/2010/main" val="3029554680"/>
+        <p14:creationId xmlns:p14="http://schemas.microsoft.com/office/powerpoint/2010/main" val="828864482"/>
       </p:ext>
     </p:extLst>
   </p:cSld>
@@ -1634,7 +2750,7 @@
           <a:p>
             <a:r>
               <a:rPr lang="de-DE" dirty="0" smtClean="0"/>
-              <a:t>Framework</a:t>
+              <a:t>Juni 2011</a:t>
             </a:r>
             <a:endParaRPr lang="de-DE" dirty="0"/>
           </a:p>
@@ -1663,7 +2779,7 @@
               <a:pPr>
                 <a:defRPr/>
               </a:pPr>
-              <a:t>13</a:t>
+              <a:t>11</a:t>
             </a:fld>
             <a:endParaRPr lang="de-DE"/>
           </a:p>
@@ -1672,7 +2788,7 @@
     </p:spTree>
     <p:extLst>
       <p:ext uri="{BB962C8B-B14F-4D97-AF65-F5344CB8AC3E}">
-        <p14:creationId xmlns:p14="http://schemas.microsoft.com/office/powerpoint/2010/main" val="2020317614"/>
+        <p14:creationId xmlns:p14="http://schemas.microsoft.com/office/powerpoint/2010/main" val="3029554680"/>
       </p:ext>
     </p:extLst>
   </p:cSld>
@@ -1726,6 +2842,20 @@
           <a:bodyPr/>
           <a:lstStyle/>
           <a:p>
+            <a:r>
+              <a:rPr lang="de-DE" dirty="0" smtClean="0"/>
+              <a:t>Bekannte Konzepte</a:t>
+            </a:r>
+          </a:p>
+          <a:p>
+            <a:r>
+              <a:rPr lang="de-DE" dirty="0" smtClean="0"/>
+              <a:t>Nicht</a:t>
+            </a:r>
+            <a:r>
+              <a:rPr lang="de-DE" baseline="0" dirty="0" smtClean="0"/>
+              <a:t> von alles Systemen verwendet</a:t>
+            </a:r>
             <a:endParaRPr lang="de-DE" dirty="0"/>
           </a:p>
         </p:txBody>
@@ -1753,7 +2883,7 @@
               <a:pPr>
                 <a:defRPr/>
               </a:pPr>
-              <a:t>15</a:t>
+              <a:t>12</a:t>
             </a:fld>
             <a:endParaRPr lang="de-DE"/>
           </a:p>
@@ -1762,7 +2892,7 @@
     </p:spTree>
     <p:extLst>
       <p:ext uri="{BB962C8B-B14F-4D97-AF65-F5344CB8AC3E}">
-        <p14:creationId xmlns:p14="http://schemas.microsoft.com/office/powerpoint/2010/main" val="1562577663"/>
+        <p14:creationId xmlns:p14="http://schemas.microsoft.com/office/powerpoint/2010/main" val="2825982645"/>
       </p:ext>
     </p:extLst>
   </p:cSld>
@@ -1817,21 +2947,9 @@
           <a:lstStyle/>
           <a:p>
             <a:r>
-              <a:rPr lang="de-DE" dirty="0" err="1" smtClean="0"/>
-              <a:t>By</a:t>
-            </a:r>
-            <a:r>
-              <a:rPr lang="de-DE" dirty="0" smtClean="0"/>
-              <a:t> Brewer</a:t>
-            </a:r>
-          </a:p>
-          <a:p>
-            <a:r>
-              <a:rPr lang="de-DE" dirty="0" smtClean="0"/>
-              <a:t>Verfügbarkeit und akzeptable Reaktionszeit ist gegeben (auch bei Ausfall einzelner Knoten) mit 100% Datenverfügbarkeit</a:t>
-            </a:r>
-          </a:p>
-          <a:p>
+              <a:rPr lang="de-DE" dirty="0" smtClean="0"/>
+              <a:t>Framework</a:t>
+            </a:r>
             <a:endParaRPr lang="de-DE" dirty="0"/>
           </a:p>
         </p:txBody>
@@ -1859,7 +2977,7 @@
               <a:pPr>
                 <a:defRPr/>
               </a:pPr>
-              <a:t>18</a:t>
+              <a:t>13</a:t>
             </a:fld>
             <a:endParaRPr lang="de-DE"/>
           </a:p>
@@ -1868,7 +2986,7 @@
     </p:spTree>
     <p:extLst>
       <p:ext uri="{BB962C8B-B14F-4D97-AF65-F5344CB8AC3E}">
-        <p14:creationId xmlns:p14="http://schemas.microsoft.com/office/powerpoint/2010/main" val="1239445446"/>
+        <p14:creationId xmlns:p14="http://schemas.microsoft.com/office/powerpoint/2010/main" val="2020317614"/>
       </p:ext>
     </p:extLst>
   </p:cSld>
@@ -1923,8 +3041,12 @@
           <a:lstStyle/>
           <a:p>
             <a:r>
-              <a:rPr lang="de-DE" dirty="0" smtClean="0"/>
-              <a:t>Nur 2 Eigenschaften gleichzeitig</a:t>
+              <a:rPr lang="de-DE" dirty="0" err="1" smtClean="0"/>
+              <a:t>Reduce</a:t>
+            </a:r>
+            <a:r>
+              <a:rPr lang="de-DE" dirty="0" smtClean="0"/>
+              <a:t>: Aggregation (Data Warehouse)</a:t>
             </a:r>
             <a:endParaRPr lang="de-DE" dirty="0"/>
           </a:p>
@@ -1953,7 +3075,7 @@
               <a:pPr>
                 <a:defRPr/>
               </a:pPr>
-              <a:t>20</a:t>
+              <a:t>14</a:t>
             </a:fld>
             <a:endParaRPr lang="de-DE"/>
           </a:p>
@@ -1962,7 +3084,7 @@
     </p:spTree>
     <p:extLst>
       <p:ext uri="{BB962C8B-B14F-4D97-AF65-F5344CB8AC3E}">
-        <p14:creationId xmlns:p14="http://schemas.microsoft.com/office/powerpoint/2010/main" val="1438683183"/>
+        <p14:creationId xmlns:p14="http://schemas.microsoft.com/office/powerpoint/2010/main" val="1548140241"/>
       </p:ext>
     </p:extLst>
   </p:cSld>
@@ -2016,10 +3138,6 @@
           <a:bodyPr/>
           <a:lstStyle/>
           <a:p>
-            <a:r>
-              <a:rPr lang="de-DE" dirty="0" smtClean="0"/>
-              <a:t>Optimistischer Ansatz</a:t>
-            </a:r>
             <a:endParaRPr lang="de-DE" dirty="0"/>
           </a:p>
         </p:txBody>
@@ -2047,7 +3165,7 @@
               <a:pPr>
                 <a:defRPr/>
               </a:pPr>
-              <a:t>21</a:t>
+              <a:t>15</a:t>
             </a:fld>
             <a:endParaRPr lang="de-DE"/>
           </a:p>
@@ -2056,7 +3174,7 @@
     </p:spTree>
     <p:extLst>
       <p:ext uri="{BB962C8B-B14F-4D97-AF65-F5344CB8AC3E}">
-        <p14:creationId xmlns:p14="http://schemas.microsoft.com/office/powerpoint/2010/main" val="3160698408"/>
+        <p14:creationId xmlns:p14="http://schemas.microsoft.com/office/powerpoint/2010/main" val="1562577663"/>
       </p:ext>
     </p:extLst>
   </p:cSld>
@@ -3347,7 +4465,7 @@
                 </a:solidFill>
                 <a:ea typeface="ＭＳ Ｐゴシック" pitchFamily="34" charset="-128"/>
               </a:rPr>
-              <a:t>26.05.2013</a:t>
+              <a:t>01.06.2013</a:t>
             </a:fld>
             <a:endParaRPr lang="de-DE" sz="1000" dirty="0">
               <a:solidFill>
@@ -4710,6 +5828,176 @@
           </a:p>
         </p:txBody>
       </p:sp>
+      <p:sp>
+        <p:nvSpPr>
+          <p:cNvPr id="2" name="Titel 1"/>
+          <p:cNvSpPr>
+            <a:spLocks noGrp="1"/>
+          </p:cNvSpPr>
+          <p:nvPr>
+            <p:ph type="title"/>
+          </p:nvPr>
+        </p:nvSpPr>
+        <p:spPr/>
+        <p:txBody>
+          <a:bodyPr/>
+          <a:lstStyle/>
+          <a:p>
+            <a:r>
+              <a:rPr lang="de-DE" dirty="0" smtClean="0"/>
+              <a:t>Facebook</a:t>
+            </a:r>
+            <a:endParaRPr lang="de-DE" dirty="0"/>
+          </a:p>
+        </p:txBody>
+      </p:sp>
+      <p:sp>
+        <p:nvSpPr>
+          <p:cNvPr id="3" name="Inhaltsplatzhalter 2"/>
+          <p:cNvSpPr>
+            <a:spLocks noGrp="1"/>
+          </p:cNvSpPr>
+          <p:nvPr>
+            <p:ph idx="1"/>
+          </p:nvPr>
+        </p:nvSpPr>
+        <p:spPr/>
+        <p:txBody>
+          <a:bodyPr/>
+          <a:lstStyle/>
+          <a:p>
+            <a:pPr marL="0" indent="0">
+              <a:buNone/>
+            </a:pPr>
+            <a:r>
+              <a:rPr lang="de-DE" u="sng" dirty="0" smtClean="0"/>
+              <a:t>Bericht August 2012:</a:t>
+            </a:r>
+          </a:p>
+          <a:p>
+            <a:r>
+              <a:rPr lang="de-DE" dirty="0" smtClean="0"/>
+              <a:t>500+ Terrabyte an neuen Daten</a:t>
+            </a:r>
+          </a:p>
+          <a:p>
+            <a:r>
+              <a:rPr lang="de-DE" dirty="0" smtClean="0"/>
+              <a:t>2.7 Millionen </a:t>
+            </a:r>
+            <a:r>
+              <a:rPr lang="de-DE" dirty="0" err="1" smtClean="0"/>
+              <a:t>Likes</a:t>
+            </a:r>
+            <a:endParaRPr lang="de-DE" dirty="0" smtClean="0"/>
+          </a:p>
+          <a:p>
+            <a:r>
+              <a:rPr lang="de-DE" dirty="0" smtClean="0"/>
+              <a:t>300 Millionen Fotos</a:t>
+            </a:r>
+          </a:p>
+          <a:p>
+            <a:r>
+              <a:rPr lang="de-DE" dirty="0" smtClean="0"/>
+              <a:t>70000 Suchanfragen</a:t>
+            </a:r>
+          </a:p>
+          <a:p>
+            <a:pPr marL="0" indent="0">
+              <a:buNone/>
+            </a:pPr>
+            <a:r>
+              <a:rPr lang="de-DE" b="1" dirty="0"/>
+              <a:t>	</a:t>
+            </a:r>
+            <a:r>
+              <a:rPr lang="de-DE" b="1" dirty="0" smtClean="0"/>
+              <a:t>			</a:t>
+            </a:r>
+            <a:r>
+              <a:rPr lang="de-DE" b="1" u="sng" dirty="0" smtClean="0"/>
+              <a:t>pro Tag!</a:t>
+            </a:r>
+          </a:p>
+          <a:p>
+            <a:pPr marL="0" indent="0">
+              <a:buNone/>
+            </a:pPr>
+            <a:endParaRPr lang="de-DE" b="1" u="sng" dirty="0"/>
+          </a:p>
+          <a:p>
+            <a:pPr marL="0" indent="0">
+              <a:buNone/>
+            </a:pPr>
+            <a:r>
+              <a:rPr lang="de-DE" dirty="0" smtClean="0"/>
+              <a:t>Mehr als 100 </a:t>
+            </a:r>
+            <a:r>
+              <a:rPr lang="de-DE" dirty="0" err="1" smtClean="0"/>
+              <a:t>Petabytes</a:t>
+            </a:r>
+            <a:r>
+              <a:rPr lang="de-DE" dirty="0" smtClean="0"/>
+              <a:t> in einem Cluster</a:t>
+            </a:r>
+          </a:p>
+        </p:txBody>
+      </p:sp>
+    </p:spTree>
+    <p:extLst>
+      <p:ext uri="{BB962C8B-B14F-4D97-AF65-F5344CB8AC3E}">
+        <p14:creationId xmlns:p14="http://schemas.microsoft.com/office/powerpoint/2010/main" val="1255985777"/>
+      </p:ext>
+    </p:extLst>
+  </p:cSld>
+  <p:clrMapOvr>
+    <a:masterClrMapping/>
+  </p:clrMapOvr>
+</p:sld>
+</file>
+
+<file path=ppt/slides/slide11.xml><?xml version="1.0" encoding="utf-8"?>
+<p:sld xmlns:a="http://schemas.openxmlformats.org/drawingml/2006/main" xmlns:r="http://schemas.openxmlformats.org/officeDocument/2006/relationships" xmlns:p="http://schemas.openxmlformats.org/presentationml/2006/main">
+  <p:cSld>
+    <p:spTree>
+      <p:nvGrpSpPr>
+        <p:cNvPr id="1" name=""/>
+        <p:cNvGrpSpPr/>
+        <p:nvPr/>
+      </p:nvGrpSpPr>
+      <p:grpSpPr>
+        <a:xfrm>
+          <a:off x="0" y="0"/>
+          <a:ext cx="0" cy="0"/>
+          <a:chOff x="0" y="0"/>
+          <a:chExt cx="0" cy="0"/>
+        </a:xfrm>
+      </p:grpSpPr>
+      <p:sp>
+        <p:nvSpPr>
+          <p:cNvPr id="8" name="Inhaltsplatzhalter 7"/>
+          <p:cNvSpPr>
+            <a:spLocks noGrp="1"/>
+          </p:cNvSpPr>
+          <p:nvPr>
+            <p:ph sz="quarter" idx="13"/>
+          </p:nvPr>
+        </p:nvSpPr>
+        <p:spPr/>
+        <p:txBody>
+          <a:bodyPr/>
+          <a:lstStyle/>
+          <a:p>
+            <a:r>
+              <a:rPr lang="de-DE" dirty="0" smtClean="0"/>
+              <a:t>3. Hintergrund</a:t>
+            </a:r>
+            <a:endParaRPr lang="de-DE" dirty="0"/>
+          </a:p>
+        </p:txBody>
+      </p:sp>
       <p:pic>
         <p:nvPicPr>
           <p:cNvPr id="2050" name="Picture 2" descr="C:\Users\TBoonX\Studium\Master\2. Semester\OS-Datenbanken\Abbildungen\60seconds.jpg"/>
@@ -4793,100 +6081,6 @@
 </p:sld>
 </file>
 
-<file path=ppt/slides/slide11.xml><?xml version="1.0" encoding="utf-8"?>
-<p:sld xmlns:a="http://schemas.openxmlformats.org/drawingml/2006/main" xmlns:r="http://schemas.openxmlformats.org/officeDocument/2006/relationships" xmlns:p="http://schemas.openxmlformats.org/presentationml/2006/main">
-  <p:cSld>
-    <p:spTree>
-      <p:nvGrpSpPr>
-        <p:cNvPr id="1" name=""/>
-        <p:cNvGrpSpPr/>
-        <p:nvPr/>
-      </p:nvGrpSpPr>
-      <p:grpSpPr>
-        <a:xfrm>
-          <a:off x="0" y="0"/>
-          <a:ext cx="0" cy="0"/>
-          <a:chOff x="0" y="0"/>
-          <a:chExt cx="0" cy="0"/>
-        </a:xfrm>
-      </p:grpSpPr>
-      <p:sp>
-        <p:nvSpPr>
-          <p:cNvPr id="8" name="Inhaltsplatzhalter 7"/>
-          <p:cNvSpPr>
-            <a:spLocks noGrp="1"/>
-          </p:cNvSpPr>
-          <p:nvPr>
-            <p:ph sz="quarter" idx="13"/>
-          </p:nvPr>
-        </p:nvSpPr>
-        <p:spPr/>
-        <p:txBody>
-          <a:bodyPr/>
-          <a:lstStyle/>
-          <a:p>
-            <a:r>
-              <a:rPr lang="de-DE" dirty="0" smtClean="0"/>
-              <a:t>3. Hintergrund</a:t>
-            </a:r>
-            <a:endParaRPr lang="de-DE" dirty="0"/>
-          </a:p>
-        </p:txBody>
-      </p:sp>
-      <p:pic>
-        <p:nvPicPr>
-          <p:cNvPr id="4098" name="Picture 2" descr="C:\Users\TBoonX\Studium\Master\2. Semester\OS-Datenbanken\Abbildungen\Web20en.png"/>
-          <p:cNvPicPr>
-            <a:picLocks noChangeAspect="1" noChangeArrowheads="1"/>
-          </p:cNvPicPr>
-          <p:nvPr/>
-        </p:nvPicPr>
-        <p:blipFill>
-          <a:blip r:embed="rId3">
-            <a:extLst>
-              <a:ext uri="{28A0092B-C50C-407E-A947-70E740481C1C}">
-                <a14:useLocalDpi xmlns:a14="http://schemas.microsoft.com/office/drawing/2010/main" val="0"/>
-              </a:ext>
-            </a:extLst>
-          </a:blip>
-          <a:srcRect/>
-          <a:stretch>
-            <a:fillRect/>
-          </a:stretch>
-        </p:blipFill>
-        <p:spPr bwMode="auto">
-          <a:xfrm>
-            <a:off x="755576" y="1052736"/>
-            <a:ext cx="7621587" cy="5081587"/>
-          </a:xfrm>
-          <a:prstGeom prst="rect">
-            <a:avLst/>
-          </a:prstGeom>
-          <a:noFill/>
-          <a:extLst>
-            <a:ext uri="{909E8E84-426E-40DD-AFC4-6F175D3DCCD1}">
-              <a14:hiddenFill xmlns:a14="http://schemas.microsoft.com/office/drawing/2010/main">
-                <a:solidFill>
-                  <a:srgbClr val="FFFFFF"/>
-                </a:solidFill>
-              </a14:hiddenFill>
-            </a:ext>
-          </a:extLst>
-        </p:spPr>
-      </p:pic>
-    </p:spTree>
-    <p:extLst>
-      <p:ext uri="{BB962C8B-B14F-4D97-AF65-F5344CB8AC3E}">
-        <p14:creationId xmlns:p14="http://schemas.microsoft.com/office/powerpoint/2010/main" val="466383732"/>
-      </p:ext>
-    </p:extLst>
-  </p:cSld>
-  <p:clrMapOvr>
-    <a:masterClrMapping/>
-  </p:clrMapOvr>
-</p:sld>
-</file>
-
 <file path=ppt/slides/slide12.xml><?xml version="1.0" encoding="utf-8"?>
 <p:sld xmlns:a="http://schemas.openxmlformats.org/drawingml/2006/main" xmlns:r="http://schemas.openxmlformats.org/officeDocument/2006/relationships" xmlns:p="http://schemas.openxmlformats.org/presentationml/2006/main">
   <p:cSld>
@@ -5860,8 +7054,18 @@
             </a:r>
             <a:r>
               <a:rPr lang="de-DE" dirty="0" smtClean="0"/>
-              <a:t> stellt/übernimmt automatisch:</a:t>
-            </a:r>
+              <a:t> stellt/übernimmt automatisch</a:t>
+            </a:r>
+            <a:r>
+              <a:rPr lang="de-DE" dirty="0" smtClean="0"/>
+              <a:t>:</a:t>
+            </a:r>
+          </a:p>
+          <a:p>
+            <a:pPr marL="0" indent="0">
+              <a:buNone/>
+            </a:pPr>
+            <a:endParaRPr lang="de-DE" dirty="0" smtClean="0"/>
           </a:p>
           <a:p>
             <a:pPr lvl="2"/>
@@ -6372,7 +7576,6 @@
               <a:rPr lang="de-DE" dirty="0" smtClean="0"/>
               <a:t>Hintergrund</a:t>
             </a:r>
-            <a:endParaRPr lang="de-DE" dirty="0" smtClean="0"/>
           </a:p>
           <a:p>
             <a:pPr marL="457200" indent="-457200">
@@ -6767,56 +7970,72 @@
             <a:pPr marL="0" indent="0">
               <a:buNone/>
             </a:pPr>
-            <a:r>
-              <a:rPr lang="de-DE" dirty="0" smtClean="0"/>
-              <a:t>Lockerer Konsistenzbegriff</a:t>
-            </a:r>
+            <a:endParaRPr lang="de-DE" dirty="0" smtClean="0"/>
           </a:p>
           <a:p>
             <a:pPr marL="0" indent="0">
               <a:buNone/>
             </a:pPr>
-            <a:endParaRPr lang="de-DE" dirty="0" smtClean="0"/>
+            <a:r>
+              <a:rPr lang="de-DE" dirty="0" smtClean="0"/>
+              <a:t>Lockerer </a:t>
+            </a:r>
+            <a:r>
+              <a:rPr lang="de-DE" dirty="0"/>
+              <a:t>Konsistenzbegriff</a:t>
+            </a:r>
           </a:p>
           <a:p>
             <a:pPr marL="0" indent="0">
               <a:buNone/>
             </a:pPr>
-            <a:r>
-              <a:rPr lang="de-DE" dirty="0" smtClean="0"/>
-              <a:t>Verteilte Daten + Synchronisation</a:t>
-            </a:r>
+            <a:endParaRPr lang="de-DE" dirty="0"/>
           </a:p>
           <a:p>
             <a:pPr marL="0" indent="0">
               <a:buNone/>
             </a:pPr>
             <a:r>
-              <a:rPr lang="de-DE" dirty="0" smtClean="0"/>
-              <a:t>   →	Nodes besitzen unterschiedliche Daten oder 	Datenversionen</a:t>
+              <a:rPr lang="de-DE" dirty="0" err="1"/>
+              <a:t>Inconsistence-Window</a:t>
+            </a:r>
+            <a:r>
+              <a:rPr lang="de-DE" dirty="0"/>
+              <a:t>: Zeitfenster für Synchronisation</a:t>
             </a:r>
           </a:p>
           <a:p>
             <a:pPr marL="0" indent="0">
               <a:buNone/>
             </a:pPr>
-            <a:endParaRPr lang="de-DE" dirty="0"/>
+            <a:endParaRPr lang="de-DE" dirty="0" smtClean="0"/>
           </a:p>
           <a:p>
             <a:pPr marL="0" indent="0">
               <a:buNone/>
             </a:pPr>
-            <a:r>
-              <a:rPr lang="de-DE" dirty="0" err="1" smtClean="0"/>
-              <a:t>Inconsistence-Window</a:t>
-            </a:r>
-            <a:r>
-              <a:rPr lang="de-DE" dirty="0"/>
-              <a:t>: Zeitfenster für </a:t>
-            </a:r>
-            <a:r>
-              <a:rPr lang="de-DE" dirty="0" smtClean="0"/>
-              <a:t>Synchronisation</a:t>
+            <a:endParaRPr lang="de-DE" dirty="0" smtClean="0"/>
+          </a:p>
+          <a:p>
+            <a:pPr marL="0" indent="0">
+              <a:buNone/>
+            </a:pPr>
+            <a:r>
+              <a:rPr lang="de-DE" dirty="0" smtClean="0"/>
+              <a:t>Verteilte Daten + Synchronisation</a:t>
+            </a:r>
+          </a:p>
+          <a:p>
+            <a:pPr marL="0" indent="0">
+              <a:buNone/>
+            </a:pPr>
+            <a:r>
+              <a:rPr lang="de-DE" dirty="0" smtClean="0"/>
+              <a:t>   →	Nodes besitzen unterschiedliche Daten oder 	</a:t>
+            </a:r>
+            <a:r>
+              <a:rPr lang="de-DE" dirty="0" smtClean="0"/>
+              <a:t>Datenversionen</a:t>
             </a:r>
             <a:endParaRPr lang="de-DE" dirty="0"/>
           </a:p>
@@ -7197,8 +8416,18 @@
             </a:pPr>
             <a:r>
               <a:rPr lang="de-DE" dirty="0" smtClean="0"/>
-              <a:t>Vorteile:</a:t>
-            </a:r>
+              <a:t>Vorteile</a:t>
+            </a:r>
+            <a:r>
+              <a:rPr lang="de-DE" dirty="0" smtClean="0"/>
+              <a:t>:</a:t>
+            </a:r>
+          </a:p>
+          <a:p>
+            <a:pPr marL="0" indent="0">
+              <a:buNone/>
+            </a:pPr>
+            <a:endParaRPr lang="de-DE" dirty="0" smtClean="0"/>
           </a:p>
           <a:p>
             <a:r>
@@ -7356,7 +8585,15 @@
             </a:pPr>
             <a:r>
               <a:rPr lang="de-DE" dirty="0" smtClean="0"/>
-              <a:t>Schreibvorgänge erzeugen neues Objekt mit neuem Zeitstempel, eigenen ID und Verweis auf Vorgänger</a:t>
+              <a:t>Schreibvorgänge erzeugen neues Objekt mit neuem Zeitstempel, </a:t>
+            </a:r>
+            <a:r>
+              <a:rPr lang="de-DE" dirty="0" smtClean="0"/>
+              <a:t>ID </a:t>
+            </a:r>
+            <a:r>
+              <a:rPr lang="de-DE" dirty="0" smtClean="0"/>
+              <a:t>und Verweis auf Vorgänger</a:t>
             </a:r>
           </a:p>
           <a:p>
@@ -7615,6 +8852,89 @@
             <a:pPr marL="0" indent="0">
               <a:buNone/>
             </a:pPr>
+            <a:r>
+              <a:rPr lang="de-DE" dirty="0" err="1"/>
+              <a:t>REpresentational</a:t>
+            </a:r>
+            <a:r>
+              <a:rPr lang="de-DE" dirty="0"/>
+              <a:t> State </a:t>
+            </a:r>
+            <a:r>
+              <a:rPr lang="de-DE" dirty="0" smtClean="0"/>
+              <a:t>Transfer</a:t>
+            </a:r>
+          </a:p>
+          <a:p>
+            <a:pPr marL="0" indent="0">
+              <a:buNone/>
+            </a:pPr>
+            <a:endParaRPr lang="de-DE" dirty="0"/>
+          </a:p>
+          <a:p>
+            <a:pPr marL="0" indent="0">
+              <a:buNone/>
+            </a:pPr>
+            <a:r>
+              <a:rPr lang="de-DE" dirty="0" smtClean="0"/>
+              <a:t>Eine Adresse führt immer zum selben Ziel/Ressource</a:t>
+            </a:r>
+          </a:p>
+          <a:p>
+            <a:pPr marL="0" indent="0">
+              <a:buNone/>
+            </a:pPr>
+            <a:endParaRPr lang="de-DE" dirty="0"/>
+          </a:p>
+          <a:p>
+            <a:pPr marL="0" indent="0">
+              <a:buNone/>
+            </a:pPr>
+            <a:r>
+              <a:rPr lang="de-DE" dirty="0" smtClean="0"/>
+              <a:t>HTTP Befehle:</a:t>
+            </a:r>
+            <a:endParaRPr lang="de-DE" dirty="0" smtClean="0"/>
+          </a:p>
+          <a:p>
+            <a:pPr marL="0" indent="0">
+              <a:buNone/>
+            </a:pPr>
+            <a:r>
+              <a:rPr lang="de-DE" dirty="0"/>
+              <a:t>	</a:t>
+            </a:r>
+            <a:r>
+              <a:rPr lang="en-US" dirty="0"/>
+              <a:t>GET, PUT, POST, DELETE und </a:t>
+            </a:r>
+            <a:r>
+              <a:rPr lang="en-US" dirty="0" smtClean="0"/>
+              <a:t>HEAD</a:t>
+            </a:r>
+          </a:p>
+          <a:p>
+            <a:pPr marL="0" indent="0">
+              <a:buNone/>
+            </a:pPr>
+            <a:endParaRPr lang="en-US" dirty="0"/>
+          </a:p>
+          <a:p>
+            <a:pPr marL="0" indent="0">
+              <a:buNone/>
+            </a:pPr>
+            <a:r>
+              <a:rPr lang="de-DE" dirty="0"/>
+              <a:t>Zustandsinformationen zwischen </a:t>
+            </a:r>
+            <a:r>
+              <a:rPr lang="de-DE" dirty="0" smtClean="0"/>
+              <a:t>Anfragen </a:t>
+            </a:r>
+            <a:r>
+              <a:rPr lang="de-DE" dirty="0"/>
+              <a:t>sollen nicht gespeichert werden</a:t>
+            </a:r>
             <a:endParaRPr lang="de-DE" dirty="0" smtClean="0"/>
           </a:p>
         </p:txBody>
@@ -7646,6 +8966,141 @@
     <p:extLst>
       <p:ext uri="{BB962C8B-B14F-4D97-AF65-F5344CB8AC3E}">
         <p14:creationId xmlns:p14="http://schemas.microsoft.com/office/powerpoint/2010/main" val="3895483731"/>
+      </p:ext>
+    </p:extLst>
+  </p:cSld>
+  <p:clrMapOvr>
+    <a:masterClrMapping/>
+  </p:clrMapOvr>
+</p:sld>
+</file>
+
+<file path=ppt/slides/slide29.xml><?xml version="1.0" encoding="utf-8"?>
+<p:sld xmlns:a="http://schemas.openxmlformats.org/drawingml/2006/main" xmlns:r="http://schemas.openxmlformats.org/officeDocument/2006/relationships" xmlns:p="http://schemas.openxmlformats.org/presentationml/2006/main">
+  <p:cSld>
+    <p:spTree>
+      <p:nvGrpSpPr>
+        <p:cNvPr id="1" name=""/>
+        <p:cNvGrpSpPr/>
+        <p:nvPr/>
+      </p:nvGrpSpPr>
+      <p:grpSpPr>
+        <a:xfrm>
+          <a:off x="0" y="0"/>
+          <a:ext cx="0" cy="0"/>
+          <a:chOff x="0" y="0"/>
+          <a:chExt cx="0" cy="0"/>
+        </a:xfrm>
+      </p:grpSpPr>
+      <p:sp>
+        <p:nvSpPr>
+          <p:cNvPr id="6" name="Titel 5"/>
+          <p:cNvSpPr>
+            <a:spLocks noGrp="1"/>
+          </p:cNvSpPr>
+          <p:nvPr>
+            <p:ph type="title"/>
+          </p:nvPr>
+        </p:nvSpPr>
+        <p:spPr/>
+        <p:txBody>
+          <a:bodyPr/>
+          <a:lstStyle/>
+          <a:p>
+            <a:r>
+              <a:rPr lang="de-DE" dirty="0" smtClean="0"/>
+              <a:t>5. Kategorisierung</a:t>
+            </a:r>
+            <a:endParaRPr lang="de-DE" dirty="0"/>
+          </a:p>
+        </p:txBody>
+      </p:sp>
+      <p:sp>
+        <p:nvSpPr>
+          <p:cNvPr id="7" name="Inhaltsplatzhalter 6"/>
+          <p:cNvSpPr>
+            <a:spLocks noGrp="1"/>
+          </p:cNvSpPr>
+          <p:nvPr>
+            <p:ph idx="1"/>
+          </p:nvPr>
+        </p:nvSpPr>
+        <p:spPr/>
+        <p:txBody>
+          <a:bodyPr/>
+          <a:lstStyle/>
+          <a:p>
+            <a:pPr marL="0" indent="0">
+              <a:buNone/>
+            </a:pPr>
+            <a:endParaRPr lang="de-DE" dirty="0" smtClean="0"/>
+          </a:p>
+          <a:p>
+            <a:pPr marL="0" indent="0">
+              <a:buNone/>
+            </a:pPr>
+            <a:r>
+              <a:rPr lang="de-DE" dirty="0" smtClean="0"/>
+              <a:t>5.1 Key/Value</a:t>
+            </a:r>
+          </a:p>
+          <a:p>
+            <a:pPr marL="0" indent="0">
+              <a:buNone/>
+            </a:pPr>
+            <a:r>
+              <a:rPr lang="de-DE" dirty="0" smtClean="0"/>
+              <a:t>5.2 Dokumentorientiert</a:t>
+            </a:r>
+          </a:p>
+          <a:p>
+            <a:pPr marL="0" indent="0">
+              <a:buNone/>
+            </a:pPr>
+            <a:r>
+              <a:rPr lang="de-DE" dirty="0" smtClean="0"/>
+              <a:t>5.3 Spaltenorientiert</a:t>
+            </a:r>
+          </a:p>
+          <a:p>
+            <a:pPr marL="0" indent="0">
+              <a:buNone/>
+            </a:pPr>
+            <a:r>
+              <a:rPr lang="de-DE" dirty="0" smtClean="0"/>
+              <a:t>5.4 </a:t>
+            </a:r>
+            <a:r>
+              <a:rPr lang="de-DE" dirty="0" err="1" smtClean="0"/>
+              <a:t>Graphenorientiert</a:t>
+            </a:r>
+            <a:endParaRPr lang="de-DE" dirty="0"/>
+          </a:p>
+        </p:txBody>
+      </p:sp>
+      <p:sp>
+        <p:nvSpPr>
+          <p:cNvPr id="8" name="Inhaltsplatzhalter 7"/>
+          <p:cNvSpPr>
+            <a:spLocks noGrp="1"/>
+          </p:cNvSpPr>
+          <p:nvPr>
+            <p:ph sz="quarter" idx="13"/>
+          </p:nvPr>
+        </p:nvSpPr>
+        <p:spPr/>
+        <p:txBody>
+          <a:bodyPr/>
+          <a:lstStyle/>
+          <a:p>
+            <a:endParaRPr lang="de-DE"/>
+          </a:p>
+        </p:txBody>
+      </p:sp>
+    </p:spTree>
+    <p:extLst>
+      <p:ext uri="{BB962C8B-B14F-4D97-AF65-F5344CB8AC3E}">
+        <p14:creationId xmlns:p14="http://schemas.microsoft.com/office/powerpoint/2010/main" val="527512323"/>
       </p:ext>
     </p:extLst>
   </p:cSld>
@@ -7795,6 +9250,658 @@
       </p:par>
     </p:tnLst>
   </p:timing>
+</p:sld>
+</file>
+
+<file path=ppt/slides/slide30.xml><?xml version="1.0" encoding="utf-8"?>
+<p:sld xmlns:a="http://schemas.openxmlformats.org/drawingml/2006/main" xmlns:r="http://schemas.openxmlformats.org/officeDocument/2006/relationships" xmlns:p="http://schemas.openxmlformats.org/presentationml/2006/main">
+  <p:cSld>
+    <p:spTree>
+      <p:nvGrpSpPr>
+        <p:cNvPr id="1" name=""/>
+        <p:cNvGrpSpPr/>
+        <p:nvPr/>
+      </p:nvGrpSpPr>
+      <p:grpSpPr>
+        <a:xfrm>
+          <a:off x="0" y="0"/>
+          <a:ext cx="0" cy="0"/>
+          <a:chOff x="0" y="0"/>
+          <a:chExt cx="0" cy="0"/>
+        </a:xfrm>
+      </p:grpSpPr>
+      <p:sp>
+        <p:nvSpPr>
+          <p:cNvPr id="6" name="Titel 5"/>
+          <p:cNvSpPr>
+            <a:spLocks noGrp="1"/>
+          </p:cNvSpPr>
+          <p:nvPr>
+            <p:ph type="title"/>
+          </p:nvPr>
+        </p:nvSpPr>
+        <p:spPr/>
+        <p:txBody>
+          <a:bodyPr/>
+          <a:lstStyle/>
+          <a:p>
+            <a:r>
+              <a:rPr lang="de-DE" dirty="0" smtClean="0"/>
+              <a:t>5.1 Key/Value</a:t>
+            </a:r>
+            <a:endParaRPr lang="de-DE" dirty="0"/>
+          </a:p>
+        </p:txBody>
+      </p:sp>
+      <p:sp>
+        <p:nvSpPr>
+          <p:cNvPr id="7" name="Inhaltsplatzhalter 6"/>
+          <p:cNvSpPr>
+            <a:spLocks noGrp="1"/>
+          </p:cNvSpPr>
+          <p:nvPr>
+            <p:ph idx="1"/>
+          </p:nvPr>
+        </p:nvSpPr>
+        <p:spPr/>
+        <p:txBody>
+          <a:bodyPr/>
+          <a:lstStyle/>
+          <a:p>
+            <a:pPr marL="0" indent="0">
+              <a:buNone/>
+            </a:pPr>
+            <a:r>
+              <a:rPr lang="de-DE" dirty="0" smtClean="0"/>
+              <a:t>Speicherung von </a:t>
+            </a:r>
+            <a:r>
+              <a:rPr lang="de-DE" dirty="0" err="1" smtClean="0"/>
+              <a:t>Tupel</a:t>
+            </a:r>
+            <a:endParaRPr lang="de-DE" dirty="0" smtClean="0"/>
+          </a:p>
+          <a:p>
+            <a:pPr marL="0" indent="0">
+              <a:buNone/>
+            </a:pPr>
+            <a:endParaRPr lang="de-DE" dirty="0" smtClean="0"/>
+          </a:p>
+          <a:p>
+            <a:pPr marL="0" indent="0">
+              <a:buNone/>
+            </a:pPr>
+            <a:r>
+              <a:rPr lang="de-DE" dirty="0" smtClean="0"/>
+              <a:t>Key ist Zeichenkette/Hash</a:t>
+            </a:r>
+          </a:p>
+          <a:p>
+            <a:pPr marL="0" indent="0">
+              <a:buNone/>
+            </a:pPr>
+            <a:r>
+              <a:rPr lang="de-DE" dirty="0" smtClean="0"/>
+              <a:t>Value kann alles sein</a:t>
+            </a:r>
+          </a:p>
+          <a:p>
+            <a:pPr marL="0" indent="0">
+              <a:buNone/>
+            </a:pPr>
+            <a:endParaRPr lang="de-DE" dirty="0"/>
+          </a:p>
+          <a:p>
+            <a:pPr marL="0" indent="0">
+              <a:buNone/>
+            </a:pPr>
+            <a:r>
+              <a:rPr lang="de-DE" dirty="0" smtClean="0"/>
+              <a:t>Zugriff über Key -&gt; Hash</a:t>
+            </a:r>
+          </a:p>
+          <a:p>
+            <a:pPr marL="0" indent="0">
+              <a:buNone/>
+            </a:pPr>
+            <a:endParaRPr lang="de-DE" dirty="0"/>
+          </a:p>
+          <a:p>
+            <a:pPr marL="0" indent="0">
+              <a:buNone/>
+            </a:pPr>
+            <a:r>
+              <a:rPr lang="de-DE" dirty="0" smtClean="0"/>
+              <a:t>Keine einheitliche Abfragesprache</a:t>
+            </a:r>
+            <a:endParaRPr lang="de-DE" dirty="0"/>
+          </a:p>
+        </p:txBody>
+      </p:sp>
+      <p:sp>
+        <p:nvSpPr>
+          <p:cNvPr id="8" name="Inhaltsplatzhalter 7"/>
+          <p:cNvSpPr>
+            <a:spLocks noGrp="1"/>
+          </p:cNvSpPr>
+          <p:nvPr>
+            <p:ph sz="quarter" idx="13"/>
+          </p:nvPr>
+        </p:nvSpPr>
+        <p:spPr/>
+        <p:txBody>
+          <a:bodyPr/>
+          <a:lstStyle/>
+          <a:p>
+            <a:r>
+              <a:rPr lang="de-DE" dirty="0" smtClean="0"/>
+              <a:t>5. Kategorisierung</a:t>
+            </a:r>
+            <a:endParaRPr lang="de-DE" dirty="0"/>
+          </a:p>
+        </p:txBody>
+      </p:sp>
+    </p:spTree>
+    <p:extLst>
+      <p:ext uri="{BB962C8B-B14F-4D97-AF65-F5344CB8AC3E}">
+        <p14:creationId xmlns:p14="http://schemas.microsoft.com/office/powerpoint/2010/main" val="3776746948"/>
+      </p:ext>
+    </p:extLst>
+  </p:cSld>
+  <p:clrMapOvr>
+    <a:masterClrMapping/>
+  </p:clrMapOvr>
+</p:sld>
+</file>
+
+<file path=ppt/slides/slide31.xml><?xml version="1.0" encoding="utf-8"?>
+<p:sld xmlns:a="http://schemas.openxmlformats.org/drawingml/2006/main" xmlns:r="http://schemas.openxmlformats.org/officeDocument/2006/relationships" xmlns:p="http://schemas.openxmlformats.org/presentationml/2006/main">
+  <p:cSld>
+    <p:spTree>
+      <p:nvGrpSpPr>
+        <p:cNvPr id="1" name=""/>
+        <p:cNvGrpSpPr/>
+        <p:nvPr/>
+      </p:nvGrpSpPr>
+      <p:grpSpPr>
+        <a:xfrm>
+          <a:off x="0" y="0"/>
+          <a:ext cx="0" cy="0"/>
+          <a:chOff x="0" y="0"/>
+          <a:chExt cx="0" cy="0"/>
+        </a:xfrm>
+      </p:grpSpPr>
+      <p:sp>
+        <p:nvSpPr>
+          <p:cNvPr id="8" name="Inhaltsplatzhalter 7"/>
+          <p:cNvSpPr>
+            <a:spLocks noGrp="1"/>
+          </p:cNvSpPr>
+          <p:nvPr>
+            <p:ph sz="quarter" idx="13"/>
+          </p:nvPr>
+        </p:nvSpPr>
+        <p:spPr/>
+        <p:txBody>
+          <a:bodyPr/>
+          <a:lstStyle/>
+          <a:p>
+            <a:r>
+              <a:rPr lang="de-DE" dirty="0" smtClean="0"/>
+              <a:t>5.1 Key/Value</a:t>
+            </a:r>
+            <a:endParaRPr lang="de-DE" dirty="0"/>
+          </a:p>
+        </p:txBody>
+      </p:sp>
+      <p:sp>
+        <p:nvSpPr>
+          <p:cNvPr id="3" name="Inhaltsplatzhalter 2"/>
+          <p:cNvSpPr>
+            <a:spLocks noGrp="1"/>
+          </p:cNvSpPr>
+          <p:nvPr>
+            <p:ph idx="1"/>
+          </p:nvPr>
+        </p:nvSpPr>
+        <p:spPr/>
+        <p:txBody>
+          <a:bodyPr/>
+          <a:lstStyle/>
+          <a:p>
+            <a:pPr marL="0" indent="0">
+              <a:buNone/>
+            </a:pPr>
+            <a:r>
+              <a:rPr lang="de-DE" dirty="0" smtClean="0"/>
+              <a:t>Vorteile:</a:t>
+            </a:r>
+          </a:p>
+          <a:p>
+            <a:pPr marL="0" indent="0">
+              <a:buNone/>
+            </a:pPr>
+            <a:endParaRPr lang="de-DE" dirty="0"/>
+          </a:p>
+          <a:p>
+            <a:r>
+              <a:rPr lang="de-DE" dirty="0" smtClean="0"/>
+              <a:t>Einfache Benutzung</a:t>
+            </a:r>
+          </a:p>
+          <a:p>
+            <a:r>
+              <a:rPr lang="de-DE" dirty="0" smtClean="0"/>
+              <a:t>Zugriff ist schnell</a:t>
+            </a:r>
+          </a:p>
+          <a:p>
+            <a:r>
+              <a:rPr lang="de-DE" dirty="0" smtClean="0"/>
+              <a:t>Keine Indexe</a:t>
+            </a:r>
+          </a:p>
+          <a:p>
+            <a:r>
+              <a:rPr lang="de-DE" dirty="0" smtClean="0"/>
+              <a:t>Horizontale Skalierung</a:t>
+            </a:r>
+          </a:p>
+          <a:p>
+            <a:r>
+              <a:rPr lang="de-DE" dirty="0" smtClean="0"/>
+              <a:t>Beliebige Daten</a:t>
+            </a:r>
+          </a:p>
+          <a:p>
+            <a:endParaRPr lang="de-DE" dirty="0"/>
+          </a:p>
+        </p:txBody>
+      </p:sp>
+    </p:spTree>
+    <p:extLst>
+      <p:ext uri="{BB962C8B-B14F-4D97-AF65-F5344CB8AC3E}">
+        <p14:creationId xmlns:p14="http://schemas.microsoft.com/office/powerpoint/2010/main" val="1534354179"/>
+      </p:ext>
+    </p:extLst>
+  </p:cSld>
+  <p:clrMapOvr>
+    <a:masterClrMapping/>
+  </p:clrMapOvr>
+</p:sld>
+</file>
+
+<file path=ppt/slides/slide32.xml><?xml version="1.0" encoding="utf-8"?>
+<p:sld xmlns:a="http://schemas.openxmlformats.org/drawingml/2006/main" xmlns:r="http://schemas.openxmlformats.org/officeDocument/2006/relationships" xmlns:p="http://schemas.openxmlformats.org/presentationml/2006/main">
+  <p:cSld>
+    <p:spTree>
+      <p:nvGrpSpPr>
+        <p:cNvPr id="1" name=""/>
+        <p:cNvGrpSpPr/>
+        <p:nvPr/>
+      </p:nvGrpSpPr>
+      <p:grpSpPr>
+        <a:xfrm>
+          <a:off x="0" y="0"/>
+          <a:ext cx="0" cy="0"/>
+          <a:chOff x="0" y="0"/>
+          <a:chExt cx="0" cy="0"/>
+        </a:xfrm>
+      </p:grpSpPr>
+      <p:sp>
+        <p:nvSpPr>
+          <p:cNvPr id="6" name="Titel 5"/>
+          <p:cNvSpPr>
+            <a:spLocks noGrp="1"/>
+          </p:cNvSpPr>
+          <p:nvPr>
+            <p:ph type="title"/>
+          </p:nvPr>
+        </p:nvSpPr>
+        <p:spPr/>
+        <p:txBody>
+          <a:bodyPr/>
+          <a:lstStyle/>
+          <a:p>
+            <a:r>
+              <a:rPr lang="de-DE" dirty="0" smtClean="0"/>
+              <a:t>5.2 Dokumentorientiert</a:t>
+            </a:r>
+            <a:endParaRPr lang="de-DE" dirty="0"/>
+          </a:p>
+        </p:txBody>
+      </p:sp>
+      <p:sp>
+        <p:nvSpPr>
+          <p:cNvPr id="7" name="Inhaltsplatzhalter 6"/>
+          <p:cNvSpPr>
+            <a:spLocks noGrp="1"/>
+          </p:cNvSpPr>
+          <p:nvPr>
+            <p:ph idx="1"/>
+          </p:nvPr>
+        </p:nvSpPr>
+        <p:spPr/>
+        <p:txBody>
+          <a:bodyPr/>
+          <a:lstStyle/>
+          <a:p>
+            <a:pPr marL="0" indent="0">
+              <a:buNone/>
+            </a:pPr>
+            <a:r>
+              <a:rPr lang="de-DE" dirty="0" smtClean="0"/>
+              <a:t>Speicherung von Dokumenten mit Hashwert</a:t>
+            </a:r>
+          </a:p>
+          <a:p>
+            <a:pPr marL="0" indent="0">
+              <a:buNone/>
+            </a:pPr>
+            <a:endParaRPr lang="de-DE" dirty="0"/>
+          </a:p>
+          <a:p>
+            <a:pPr marL="0" indent="0">
+              <a:buNone/>
+            </a:pPr>
+            <a:r>
+              <a:rPr lang="de-DE" dirty="0" smtClean="0"/>
+              <a:t>Dokumente sind strukturiert und oft </a:t>
+            </a:r>
+            <a:r>
+              <a:rPr lang="de-DE" dirty="0" err="1" smtClean="0"/>
+              <a:t>versioniert</a:t>
+            </a:r>
+            <a:endParaRPr lang="de-DE" dirty="0" smtClean="0"/>
+          </a:p>
+          <a:p>
+            <a:pPr marL="0" indent="0">
+              <a:buNone/>
+            </a:pPr>
+            <a:endParaRPr lang="de-DE" dirty="0"/>
+          </a:p>
+          <a:p>
+            <a:pPr marL="0" indent="0">
+              <a:buNone/>
+            </a:pPr>
+            <a:r>
+              <a:rPr lang="de-DE" dirty="0" smtClean="0"/>
+              <a:t>Formate:	JSON, XML, YAML</a:t>
+            </a:r>
+          </a:p>
+          <a:p>
+            <a:pPr marL="0" indent="0">
+              <a:buNone/>
+            </a:pPr>
+            <a:endParaRPr lang="de-DE" dirty="0"/>
+          </a:p>
+          <a:p>
+            <a:pPr marL="0" indent="0">
+              <a:buNone/>
+            </a:pPr>
+            <a:r>
+              <a:rPr lang="de-DE" dirty="0" smtClean="0"/>
+              <a:t>Meist keine </a:t>
+            </a:r>
+            <a:r>
+              <a:rPr lang="de-DE" dirty="0" err="1" smtClean="0"/>
+              <a:t>Joins</a:t>
+            </a:r>
+            <a:r>
+              <a:rPr lang="de-DE" dirty="0" smtClean="0"/>
+              <a:t> möglich</a:t>
+            </a:r>
+          </a:p>
+          <a:p>
+            <a:pPr marL="0" indent="0">
+              <a:buNone/>
+            </a:pPr>
+            <a:endParaRPr lang="de-DE" dirty="0"/>
+          </a:p>
+          <a:p>
+            <a:pPr marL="0" indent="0">
+              <a:buNone/>
+            </a:pPr>
+            <a:r>
+              <a:rPr lang="de-DE" dirty="0" smtClean="0"/>
+              <a:t>Ziel:	Speicherung unstrukturierter Daten, diese 	skalieren und Zugriff auf diese ermöglichen.</a:t>
+            </a:r>
+          </a:p>
+        </p:txBody>
+      </p:sp>
+      <p:sp>
+        <p:nvSpPr>
+          <p:cNvPr id="8" name="Inhaltsplatzhalter 7"/>
+          <p:cNvSpPr>
+            <a:spLocks noGrp="1"/>
+          </p:cNvSpPr>
+          <p:nvPr>
+            <p:ph sz="quarter" idx="13"/>
+          </p:nvPr>
+        </p:nvSpPr>
+        <p:spPr/>
+        <p:txBody>
+          <a:bodyPr/>
+          <a:lstStyle/>
+          <a:p>
+            <a:r>
+              <a:rPr lang="de-DE" dirty="0" smtClean="0"/>
+              <a:t>5. Kategorisierung</a:t>
+            </a:r>
+            <a:endParaRPr lang="de-DE" dirty="0"/>
+          </a:p>
+        </p:txBody>
+      </p:sp>
+    </p:spTree>
+    <p:extLst>
+      <p:ext uri="{BB962C8B-B14F-4D97-AF65-F5344CB8AC3E}">
+        <p14:creationId xmlns:p14="http://schemas.microsoft.com/office/powerpoint/2010/main" val="647585964"/>
+      </p:ext>
+    </p:extLst>
+  </p:cSld>
+  <p:clrMapOvr>
+    <a:masterClrMapping/>
+  </p:clrMapOvr>
+</p:sld>
+</file>
+
+<file path=ppt/slides/slide33.xml><?xml version="1.0" encoding="utf-8"?>
+<p:sld xmlns:a="http://schemas.openxmlformats.org/drawingml/2006/main" xmlns:r="http://schemas.openxmlformats.org/officeDocument/2006/relationships" xmlns:p="http://schemas.openxmlformats.org/presentationml/2006/main">
+  <p:cSld>
+    <p:spTree>
+      <p:nvGrpSpPr>
+        <p:cNvPr id="1" name=""/>
+        <p:cNvGrpSpPr/>
+        <p:nvPr/>
+      </p:nvGrpSpPr>
+      <p:grpSpPr>
+        <a:xfrm>
+          <a:off x="0" y="0"/>
+          <a:ext cx="0" cy="0"/>
+          <a:chOff x="0" y="0"/>
+          <a:chExt cx="0" cy="0"/>
+        </a:xfrm>
+      </p:grpSpPr>
+      <p:sp>
+        <p:nvSpPr>
+          <p:cNvPr id="6" name="Titel 5"/>
+          <p:cNvSpPr>
+            <a:spLocks noGrp="1"/>
+          </p:cNvSpPr>
+          <p:nvPr>
+            <p:ph type="title"/>
+          </p:nvPr>
+        </p:nvSpPr>
+        <p:spPr/>
+        <p:txBody>
+          <a:bodyPr/>
+          <a:lstStyle/>
+          <a:p>
+            <a:r>
+              <a:rPr lang="de-DE" dirty="0" smtClean="0"/>
+              <a:t>5.3 Spaltenorientiert</a:t>
+            </a:r>
+            <a:endParaRPr lang="de-DE" dirty="0"/>
+          </a:p>
+        </p:txBody>
+      </p:sp>
+      <p:sp>
+        <p:nvSpPr>
+          <p:cNvPr id="7" name="Inhaltsplatzhalter 6"/>
+          <p:cNvSpPr>
+            <a:spLocks noGrp="1"/>
+          </p:cNvSpPr>
+          <p:nvPr>
+            <p:ph idx="1"/>
+          </p:nvPr>
+        </p:nvSpPr>
+        <p:spPr/>
+        <p:txBody>
+          <a:bodyPr/>
+          <a:lstStyle/>
+          <a:p>
+            <a:pPr marL="0" indent="0">
+              <a:buNone/>
+            </a:pPr>
+            <a:endParaRPr lang="de-DE" dirty="0" smtClean="0"/>
+          </a:p>
+        </p:txBody>
+      </p:sp>
+      <p:sp>
+        <p:nvSpPr>
+          <p:cNvPr id="8" name="Inhaltsplatzhalter 7"/>
+          <p:cNvSpPr>
+            <a:spLocks noGrp="1"/>
+          </p:cNvSpPr>
+          <p:nvPr>
+            <p:ph sz="quarter" idx="13"/>
+          </p:nvPr>
+        </p:nvSpPr>
+        <p:spPr/>
+        <p:txBody>
+          <a:bodyPr/>
+          <a:lstStyle/>
+          <a:p>
+            <a:r>
+              <a:rPr lang="de-DE" dirty="0" smtClean="0"/>
+              <a:t>5. Kategorisierung</a:t>
+            </a:r>
+            <a:endParaRPr lang="de-DE" dirty="0"/>
+          </a:p>
+        </p:txBody>
+      </p:sp>
+    </p:spTree>
+    <p:extLst>
+      <p:ext uri="{BB962C8B-B14F-4D97-AF65-F5344CB8AC3E}">
+        <p14:creationId xmlns:p14="http://schemas.microsoft.com/office/powerpoint/2010/main" val="2358900116"/>
+      </p:ext>
+    </p:extLst>
+  </p:cSld>
+  <p:clrMapOvr>
+    <a:masterClrMapping/>
+  </p:clrMapOvr>
+</p:sld>
+</file>
+
+<file path=ppt/slides/slide34.xml><?xml version="1.0" encoding="utf-8"?>
+<p:sld xmlns:a="http://schemas.openxmlformats.org/drawingml/2006/main" xmlns:r="http://schemas.openxmlformats.org/officeDocument/2006/relationships" xmlns:p="http://schemas.openxmlformats.org/presentationml/2006/main">
+  <p:cSld>
+    <p:spTree>
+      <p:nvGrpSpPr>
+        <p:cNvPr id="1" name=""/>
+        <p:cNvGrpSpPr/>
+        <p:nvPr/>
+      </p:nvGrpSpPr>
+      <p:grpSpPr>
+        <a:xfrm>
+          <a:off x="0" y="0"/>
+          <a:ext cx="0" cy="0"/>
+          <a:chOff x="0" y="0"/>
+          <a:chExt cx="0" cy="0"/>
+        </a:xfrm>
+      </p:grpSpPr>
+      <p:sp>
+        <p:nvSpPr>
+          <p:cNvPr id="6" name="Titel 5"/>
+          <p:cNvSpPr>
+            <a:spLocks noGrp="1"/>
+          </p:cNvSpPr>
+          <p:nvPr>
+            <p:ph type="title"/>
+          </p:nvPr>
+        </p:nvSpPr>
+        <p:spPr/>
+        <p:txBody>
+          <a:bodyPr/>
+          <a:lstStyle/>
+          <a:p>
+            <a:r>
+              <a:rPr lang="de-DE" dirty="0" smtClean="0"/>
+              <a:t>5.4 </a:t>
+            </a:r>
+            <a:r>
+              <a:rPr lang="de-DE" dirty="0" err="1" smtClean="0"/>
+              <a:t>Graphenorientiert</a:t>
+            </a:r>
+            <a:endParaRPr lang="de-DE" dirty="0"/>
+          </a:p>
+        </p:txBody>
+      </p:sp>
+      <p:sp>
+        <p:nvSpPr>
+          <p:cNvPr id="7" name="Inhaltsplatzhalter 6"/>
+          <p:cNvSpPr>
+            <a:spLocks noGrp="1"/>
+          </p:cNvSpPr>
+          <p:nvPr>
+            <p:ph idx="1"/>
+          </p:nvPr>
+        </p:nvSpPr>
+        <p:spPr/>
+        <p:txBody>
+          <a:bodyPr/>
+          <a:lstStyle/>
+          <a:p>
+            <a:pPr marL="0" indent="0">
+              <a:buNone/>
+            </a:pPr>
+            <a:endParaRPr lang="de-DE" dirty="0" smtClean="0"/>
+          </a:p>
+        </p:txBody>
+      </p:sp>
+      <p:sp>
+        <p:nvSpPr>
+          <p:cNvPr id="8" name="Inhaltsplatzhalter 7"/>
+          <p:cNvSpPr>
+            <a:spLocks noGrp="1"/>
+          </p:cNvSpPr>
+          <p:nvPr>
+            <p:ph sz="quarter" idx="13"/>
+          </p:nvPr>
+        </p:nvSpPr>
+        <p:spPr/>
+        <p:txBody>
+          <a:bodyPr/>
+          <a:lstStyle/>
+          <a:p>
+            <a:r>
+              <a:rPr lang="de-DE" dirty="0" smtClean="0"/>
+              <a:t>5. Kategorisierung</a:t>
+            </a:r>
+            <a:endParaRPr lang="de-DE" dirty="0"/>
+          </a:p>
+        </p:txBody>
+      </p:sp>
+    </p:spTree>
+    <p:extLst>
+      <p:ext uri="{BB962C8B-B14F-4D97-AF65-F5344CB8AC3E}">
+        <p14:creationId xmlns:p14="http://schemas.microsoft.com/office/powerpoint/2010/main" val="2677443183"/>
+      </p:ext>
+    </p:extLst>
+  </p:cSld>
+  <p:clrMapOvr>
+    <a:masterClrMapping/>
+  </p:clrMapOvr>
 </p:sld>
 </file>
 
@@ -8646,7 +10753,15 @@
             </a:r>
             <a:r>
               <a:rPr lang="de-DE" dirty="0" smtClean="0"/>
-              <a:t> (spaltenorientiert)</a:t>
+              <a:t> </a:t>
+            </a:r>
+            <a:r>
+              <a:rPr lang="de-DE" dirty="0" smtClean="0"/>
+              <a:t>(Paper, spaltenorientiert</a:t>
+            </a:r>
+            <a:r>
+              <a:rPr lang="de-DE" dirty="0" smtClean="0"/>
+              <a:t>)</a:t>
             </a:r>
           </a:p>
           <a:p>
@@ -8957,22 +11072,24 @@
             <a:pPr lvl="1"/>
             <a:r>
               <a:rPr lang="de-DE" dirty="0"/>
-              <a:t>Horizontale Skalierung</a:t>
+              <a:t>Horizontale </a:t>
+            </a:r>
+            <a:r>
+              <a:rPr lang="de-DE" dirty="0"/>
+              <a:t>Skalierung</a:t>
             </a:r>
           </a:p>
           <a:p>
             <a:pPr lvl="1"/>
             <a:r>
               <a:rPr lang="de-DE" dirty="0"/>
-              <a:t>Schnelles Read/Write</a:t>
-            </a:r>
-          </a:p>
-          <a:p>
-            <a:pPr lvl="1"/>
-            <a:r>
-              <a:rPr lang="de-DE" dirty="0"/>
-              <a:t>Schemafreiheit</a:t>
-            </a:r>
+              <a:t>Verteilte </a:t>
+            </a:r>
+            <a:r>
+              <a:rPr lang="de-DE" dirty="0" smtClean="0"/>
+              <a:t>Systeme</a:t>
+            </a:r>
+            <a:endParaRPr lang="de-DE" dirty="0" smtClean="0"/>
           </a:p>
           <a:p>
             <a:pPr lvl="1"/>
@@ -8986,6 +11103,18 @@
             <a:pPr lvl="1"/>
             <a:r>
               <a:rPr lang="de-DE" dirty="0"/>
+              <a:t>Schnelles </a:t>
+            </a:r>
+            <a:r>
+              <a:rPr lang="de-DE" dirty="0" smtClean="0"/>
+              <a:t>Read/Write</a:t>
+            </a:r>
+            <a:endParaRPr lang="de-DE" dirty="0"/>
+          </a:p>
+          <a:p>
+            <a:pPr lvl="1"/>
+            <a:r>
+              <a:rPr lang="de-DE" dirty="0"/>
               <a:t>Hochverfügbarkeit</a:t>
             </a:r>
           </a:p>
@@ -8993,8 +11122,20 @@
             <a:pPr lvl="1"/>
             <a:r>
               <a:rPr lang="de-DE" dirty="0"/>
-              <a:t>Kostengünstig und geringer Wartungsaufwand</a:t>
-            </a:r>
+              <a:t>Kostengünstig und geringer </a:t>
+            </a:r>
+            <a:r>
+              <a:rPr lang="de-DE" dirty="0"/>
+              <a:t>Wartungsaufwand</a:t>
+            </a:r>
+          </a:p>
+          <a:p>
+            <a:pPr lvl="1"/>
+            <a:r>
+              <a:rPr lang="de-DE" dirty="0" smtClean="0"/>
+              <a:t>Schemafreiheit</a:t>
+            </a:r>
+            <a:endParaRPr lang="de-DE" dirty="0"/>
           </a:p>
           <a:p>
             <a:pPr lvl="1"/>
@@ -9006,16 +11147,6 @@
               <a:rPr lang="de-DE" dirty="0" smtClean="0"/>
               <a:t>Datenmengen</a:t>
             </a:r>
-          </a:p>
-          <a:p>
-            <a:pPr lvl="1"/>
-            <a:r>
-              <a:rPr lang="de-DE" dirty="0" smtClean="0"/>
-              <a:t>Verteilte Systeme</a:t>
-            </a:r>
-          </a:p>
-          <a:p>
-            <a:pPr lvl="1"/>
             <a:endParaRPr lang="de-DE" dirty="0"/>
           </a:p>
           <a:p>
@@ -9095,127 +11226,51 @@
           </a:p>
         </p:txBody>
       </p:sp>
-      <p:sp>
-        <p:nvSpPr>
-          <p:cNvPr id="2" name="Titel 1"/>
-          <p:cNvSpPr>
-            <a:spLocks noGrp="1"/>
-          </p:cNvSpPr>
-          <p:nvPr>
-            <p:ph type="title"/>
-          </p:nvPr>
-        </p:nvSpPr>
-        <p:spPr/>
-        <p:txBody>
-          <a:bodyPr/>
-          <a:lstStyle/>
-          <a:p>
-            <a:r>
-              <a:rPr lang="de-DE" dirty="0" smtClean="0"/>
-              <a:t>Facebook</a:t>
-            </a:r>
-            <a:endParaRPr lang="de-DE" dirty="0"/>
-          </a:p>
-        </p:txBody>
-      </p:sp>
-      <p:sp>
-        <p:nvSpPr>
-          <p:cNvPr id="3" name="Inhaltsplatzhalter 2"/>
-          <p:cNvSpPr>
-            <a:spLocks noGrp="1"/>
-          </p:cNvSpPr>
-          <p:nvPr>
-            <p:ph idx="1"/>
-          </p:nvPr>
-        </p:nvSpPr>
-        <p:spPr/>
-        <p:txBody>
-          <a:bodyPr/>
-          <a:lstStyle/>
-          <a:p>
-            <a:pPr marL="0" indent="0">
-              <a:buNone/>
-            </a:pPr>
-            <a:r>
-              <a:rPr lang="de-DE" u="sng" dirty="0" smtClean="0"/>
-              <a:t>Bericht August 2012:</a:t>
-            </a:r>
-          </a:p>
-          <a:p>
-            <a:r>
-              <a:rPr lang="de-DE" dirty="0" smtClean="0"/>
-              <a:t>500+ Terrabyte an neuen Daten</a:t>
-            </a:r>
-          </a:p>
-          <a:p>
-            <a:r>
-              <a:rPr lang="de-DE" dirty="0" smtClean="0"/>
-              <a:t>2.7 Millionen </a:t>
-            </a:r>
-            <a:r>
-              <a:rPr lang="de-DE" dirty="0" err="1" smtClean="0"/>
-              <a:t>Likes</a:t>
-            </a:r>
-            <a:endParaRPr lang="de-DE" dirty="0" smtClean="0"/>
-          </a:p>
-          <a:p>
-            <a:r>
-              <a:rPr lang="de-DE" dirty="0" smtClean="0"/>
-              <a:t>300 Millionen Fotos</a:t>
-            </a:r>
-          </a:p>
-          <a:p>
-            <a:r>
-              <a:rPr lang="de-DE" dirty="0" smtClean="0"/>
-              <a:t>70000 Suchanfragen</a:t>
-            </a:r>
-          </a:p>
-          <a:p>
-            <a:pPr marL="0" indent="0">
-              <a:buNone/>
-            </a:pPr>
-            <a:r>
-              <a:rPr lang="de-DE" b="1" dirty="0"/>
-              <a:t>	</a:t>
-            </a:r>
-            <a:r>
-              <a:rPr lang="de-DE" b="1" dirty="0" smtClean="0"/>
-              <a:t>			</a:t>
-            </a:r>
-            <a:r>
-              <a:rPr lang="de-DE" b="1" u="sng" dirty="0" smtClean="0"/>
-              <a:t>pro Tag!</a:t>
-            </a:r>
-          </a:p>
-          <a:p>
-            <a:pPr marL="0" indent="0">
-              <a:buNone/>
-            </a:pPr>
-            <a:endParaRPr lang="de-DE" b="1" u="sng" dirty="0"/>
-          </a:p>
-          <a:p>
-            <a:pPr marL="0" indent="0">
-              <a:buNone/>
-            </a:pPr>
-            <a:r>
-              <a:rPr lang="de-DE" dirty="0" smtClean="0"/>
-              <a:t>Mehr als 100 </a:t>
-            </a:r>
-            <a:r>
-              <a:rPr lang="de-DE" dirty="0" err="1" smtClean="0"/>
-              <a:t>Petabytes</a:t>
-            </a:r>
-            <a:r>
-              <a:rPr lang="de-DE" dirty="0" smtClean="0"/>
-              <a:t> in einem Cluster</a:t>
-            </a:r>
-          </a:p>
-        </p:txBody>
-      </p:sp>
+      <p:pic>
+        <p:nvPicPr>
+          <p:cNvPr id="4098" name="Picture 2" descr="C:\Users\TBoonX\Studium\Master\2. Semester\OS-Datenbanken\Abbildungen\Web20en.png"/>
+          <p:cNvPicPr>
+            <a:picLocks noChangeAspect="1" noChangeArrowheads="1"/>
+          </p:cNvPicPr>
+          <p:nvPr/>
+        </p:nvPicPr>
+        <p:blipFill>
+          <a:blip r:embed="rId3">
+            <a:extLst>
+              <a:ext uri="{28A0092B-C50C-407E-A947-70E740481C1C}">
+                <a14:useLocalDpi xmlns:a14="http://schemas.microsoft.com/office/drawing/2010/main" val="0"/>
+              </a:ext>
+            </a:extLst>
+          </a:blip>
+          <a:srcRect/>
+          <a:stretch>
+            <a:fillRect/>
+          </a:stretch>
+        </p:blipFill>
+        <p:spPr bwMode="auto">
+          <a:xfrm>
+            <a:off x="755576" y="1052736"/>
+            <a:ext cx="7621587" cy="5081587"/>
+          </a:xfrm>
+          <a:prstGeom prst="rect">
+            <a:avLst/>
+          </a:prstGeom>
+          <a:noFill/>
+          <a:extLst>
+            <a:ext uri="{909E8E84-426E-40DD-AFC4-6F175D3DCCD1}">
+              <a14:hiddenFill xmlns:a14="http://schemas.microsoft.com/office/drawing/2010/main">
+                <a:solidFill>
+                  <a:srgbClr val="FFFFFF"/>
+                </a:solidFill>
+              </a14:hiddenFill>
+            </a:ext>
+          </a:extLst>
+        </p:spPr>
+      </p:pic>
     </p:spTree>
     <p:extLst>
       <p:ext uri="{BB962C8B-B14F-4D97-AF65-F5344CB8AC3E}">
-        <p14:creationId xmlns:p14="http://schemas.microsoft.com/office/powerpoint/2010/main" val="1255985777"/>
+        <p14:creationId xmlns:p14="http://schemas.microsoft.com/office/powerpoint/2010/main" val="466383732"/>
       </p:ext>
     </p:extLst>
   </p:cSld>

</xml_diff>

<commit_message>
Praesentation beendet. Extended abstract begonnen.
</commit_message>
<xml_diff>
--- a/Praesentation.pptx
+++ b/Praesentation.pptx
@@ -6,7 +6,7 @@
     <p:sldMasterId id="2147483650" r:id="rId2"/>
   </p:sldMasterIdLst>
   <p:notesMasterIdLst>
-    <p:notesMasterId r:id="rId46"/>
+    <p:notesMasterId r:id="rId47"/>
   </p:notesMasterIdLst>
   <p:sldIdLst>
     <p:sldId id="256" r:id="rId3"/>
@@ -52,6 +52,7 @@
     <p:sldId id="297" r:id="rId43"/>
     <p:sldId id="298" r:id="rId44"/>
     <p:sldId id="299" r:id="rId45"/>
+    <p:sldId id="300" r:id="rId46"/>
   </p:sldIdLst>
   <p:sldSz cx="9144000" cy="6858000" type="screen4x3"/>
   <p:notesSz cx="6858000" cy="9144000"/>
@@ -292,7 +293,7 @@
               <a:pPr>
                 <a:defRPr/>
               </a:pPr>
-              <a:t>07.06.2013</a:t>
+              <a:t>09.06.2013</a:t>
             </a:fld>
             <a:endParaRPr lang="de-DE"/>
           </a:p>
@@ -666,21 +667,7 @@
           <a:p>
             <a:r>
               <a:rPr lang="de-DE" dirty="0" smtClean="0"/>
-              <a:t>Quelle: </a:t>
-            </a:r>
-            <a:r>
-              <a:rPr lang="de-DE" dirty="0" err="1" smtClean="0"/>
-              <a:t>No</a:t>
-            </a:r>
-            <a:r>
-              <a:rPr lang="de-DE" dirty="0" smtClean="0"/>
-              <a:t> SQL Buch</a:t>
-            </a:r>
-          </a:p>
-          <a:p>
-            <a:r>
-              <a:rPr lang="de-DE" dirty="0" smtClean="0"/>
-              <a:t>Nicht alles wird eingehalten</a:t>
+              <a:t>Kurze Einführung</a:t>
             </a:r>
             <a:endParaRPr lang="de-DE" dirty="0"/>
           </a:p>
@@ -709,7 +696,7 @@
               <a:pPr>
                 <a:defRPr/>
               </a:pPr>
-              <a:t>5</a:t>
+              <a:t>1</a:t>
             </a:fld>
             <a:endParaRPr lang="de-DE"/>
           </a:p>
@@ -718,7 +705,7 @@
     </p:spTree>
     <p:extLst>
       <p:ext uri="{BB962C8B-B14F-4D97-AF65-F5344CB8AC3E}">
-        <p14:creationId xmlns:p14="http://schemas.microsoft.com/office/powerpoint/2010/main" val="3730581265"/>
+        <p14:creationId xmlns:p14="http://schemas.microsoft.com/office/powerpoint/2010/main" val="1255630744"/>
       </p:ext>
     </p:extLst>
   </p:cSld>
@@ -773,12 +760,100 @@
           <a:lstStyle/>
           <a:p>
             <a:r>
+              <a:rPr lang="de-DE" dirty="0" smtClean="0"/>
+              <a:t>Quelle: </a:t>
+            </a:r>
+          </a:p>
+          <a:p>
+            <a:r>
+              <a:rPr lang="de-DE" dirty="0" smtClean="0"/>
+              <a:t>Nutzt MySQL (</a:t>
+            </a:r>
+            <a:r>
               <a:rPr lang="de-DE" dirty="0" err="1" smtClean="0"/>
-              <a:t>Reduce</a:t>
-            </a:r>
-            <a:r>
-              <a:rPr lang="de-DE" dirty="0" smtClean="0"/>
-              <a:t>: Aggregation (Data Warehouse)</a:t>
+              <a:t>NewSQL</a:t>
+            </a:r>
+            <a:r>
+              <a:rPr lang="de-DE" dirty="0" smtClean="0"/>
+              <a:t>), </a:t>
+            </a:r>
+            <a:r>
+              <a:rPr lang="de-DE" dirty="0" err="1" smtClean="0"/>
+              <a:t>Hadoop</a:t>
+            </a:r>
+            <a:r>
+              <a:rPr lang="de-DE" baseline="0" dirty="0" smtClean="0"/>
+              <a:t> und </a:t>
+            </a:r>
+            <a:r>
+              <a:rPr lang="de-DE" baseline="0" dirty="0" err="1" smtClean="0"/>
+              <a:t>HBase</a:t>
+            </a:r>
+            <a:r>
+              <a:rPr lang="de-DE" baseline="0" dirty="0" smtClean="0"/>
+              <a:t> (2011)</a:t>
+            </a:r>
+          </a:p>
+          <a:p>
+            <a:r>
+              <a:rPr lang="de-DE" baseline="0" dirty="0" err="1" smtClean="0"/>
+              <a:t>Instagramm</a:t>
+            </a:r>
+            <a:r>
+              <a:rPr lang="de-DE" baseline="0" dirty="0" smtClean="0"/>
+              <a:t>, </a:t>
+            </a:r>
+            <a:r>
+              <a:rPr lang="de-DE" baseline="0" dirty="0" err="1" smtClean="0"/>
+              <a:t>Twitter</a:t>
+            </a:r>
+            <a:r>
+              <a:rPr lang="de-DE" baseline="0" dirty="0" smtClean="0"/>
+              <a:t>, </a:t>
+            </a:r>
+            <a:r>
+              <a:rPr lang="de-DE" baseline="0" dirty="0" err="1" smtClean="0"/>
+              <a:t>Tumblr</a:t>
+            </a:r>
+            <a:r>
+              <a:rPr lang="de-DE" baseline="0" dirty="0" smtClean="0"/>
+              <a:t>, Amazon, </a:t>
+            </a:r>
+            <a:r>
+              <a:rPr lang="de-DE" baseline="0" dirty="0" err="1" smtClean="0"/>
+              <a:t>Ebay</a:t>
+            </a:r>
+            <a:r>
+              <a:rPr lang="de-DE" baseline="0" dirty="0" smtClean="0"/>
+              <a:t>, Google, </a:t>
+            </a:r>
+            <a:r>
+              <a:rPr lang="de-DE" baseline="0" dirty="0" err="1" smtClean="0"/>
+              <a:t>Flickr</a:t>
+            </a:r>
+            <a:r>
+              <a:rPr lang="de-DE" baseline="0" dirty="0" smtClean="0"/>
+              <a:t>, </a:t>
+            </a:r>
+            <a:r>
+              <a:rPr lang="de-DE" baseline="0" dirty="0" err="1" smtClean="0"/>
+              <a:t>Cern</a:t>
+            </a:r>
+            <a:r>
+              <a:rPr lang="de-DE" baseline="0" dirty="0" smtClean="0"/>
+              <a:t> </a:t>
+            </a:r>
+            <a:r>
+              <a:rPr lang="de-DE" baseline="0" smtClean="0"/>
+              <a:t>für Teilchenbeschleuniger, </a:t>
+            </a:r>
+            <a:r>
+              <a:rPr lang="de-DE" baseline="0" dirty="0" smtClean="0"/>
+              <a:t>Wikipedia, … nutzen </a:t>
+            </a:r>
+            <a:r>
+              <a:rPr lang="de-DE" baseline="0" dirty="0" err="1" smtClean="0"/>
+              <a:t>NoSQL</a:t>
             </a:r>
             <a:endParaRPr lang="de-DE" dirty="0"/>
           </a:p>
@@ -807,7 +882,7 @@
               <a:pPr>
                 <a:defRPr/>
               </a:pPr>
-              <a:t>16</a:t>
+              <a:t>12</a:t>
             </a:fld>
             <a:endParaRPr lang="de-DE"/>
           </a:p>
@@ -816,7 +891,7 @@
     </p:spTree>
     <p:extLst>
       <p:ext uri="{BB962C8B-B14F-4D97-AF65-F5344CB8AC3E}">
-        <p14:creationId xmlns:p14="http://schemas.microsoft.com/office/powerpoint/2010/main" val="1548140241"/>
+        <p14:creationId xmlns:p14="http://schemas.microsoft.com/office/powerpoint/2010/main" val="828864482"/>
       </p:ext>
     </p:extLst>
   </p:cSld>
@@ -870,6 +945,20 @@
           <a:bodyPr/>
           <a:lstStyle/>
           <a:p>
+            <a:r>
+              <a:rPr lang="de-DE" dirty="0" smtClean="0"/>
+              <a:t>Juni </a:t>
+            </a:r>
+            <a:r>
+              <a:rPr lang="de-DE" dirty="0" smtClean="0"/>
+              <a:t>2011</a:t>
+            </a:r>
+          </a:p>
+          <a:p>
+            <a:r>
+              <a:rPr lang="de-DE" dirty="0" smtClean="0"/>
+              <a:t>Zusammenfassung!</a:t>
+            </a:r>
             <a:endParaRPr lang="de-DE" dirty="0"/>
           </a:p>
         </p:txBody>
@@ -897,7 +986,7 @@
               <a:pPr>
                 <a:defRPr/>
               </a:pPr>
-              <a:t>17</a:t>
+              <a:t>13</a:t>
             </a:fld>
             <a:endParaRPr lang="de-DE"/>
           </a:p>
@@ -906,7 +995,7 @@
     </p:spTree>
     <p:extLst>
       <p:ext uri="{BB962C8B-B14F-4D97-AF65-F5344CB8AC3E}">
-        <p14:creationId xmlns:p14="http://schemas.microsoft.com/office/powerpoint/2010/main" val="1562577663"/>
+        <p14:creationId xmlns:p14="http://schemas.microsoft.com/office/powerpoint/2010/main" val="3029554680"/>
       </p:ext>
     </p:extLst>
   </p:cSld>
@@ -962,17 +1051,17 @@
           <a:p>
             <a:r>
               <a:rPr lang="de-DE" dirty="0" smtClean="0"/>
-              <a:t>Geht über Idee hinaus - &gt; Framework</a:t>
-            </a:r>
-          </a:p>
-          <a:p>
-            <a:r>
-              <a:rPr lang="de-DE" dirty="0" smtClean="0"/>
-              <a:t>Für</a:t>
+              <a:t>Bekannte Konzepte</a:t>
+            </a:r>
+          </a:p>
+          <a:p>
+            <a:r>
+              <a:rPr lang="de-DE" dirty="0" smtClean="0"/>
+              <a:t>Nicht</a:t>
             </a:r>
             <a:r>
               <a:rPr lang="de-DE" baseline="0" dirty="0" smtClean="0"/>
-              <a:t> Standardhardware gedacht</a:t>
+              <a:t> von alles Systemen verwendet</a:t>
             </a:r>
             <a:endParaRPr lang="de-DE" dirty="0"/>
           </a:p>
@@ -1001,7 +1090,7 @@
               <a:pPr>
                 <a:defRPr/>
               </a:pPr>
-              <a:t>19</a:t>
+              <a:t>14</a:t>
             </a:fld>
             <a:endParaRPr lang="de-DE"/>
           </a:p>
@@ -1010,7 +1099,7 @@
     </p:spTree>
     <p:extLst>
       <p:ext uri="{BB962C8B-B14F-4D97-AF65-F5344CB8AC3E}">
-        <p14:creationId xmlns:p14="http://schemas.microsoft.com/office/powerpoint/2010/main" val="443745272"/>
+        <p14:creationId xmlns:p14="http://schemas.microsoft.com/office/powerpoint/2010/main" val="2825982645"/>
       </p:ext>
     </p:extLst>
   </p:cSld>
@@ -1064,36 +1153,6 @@
           <a:bodyPr/>
           <a:lstStyle/>
           <a:p>
-            <a:r>
-              <a:rPr lang="de-DE" dirty="0" smtClean="0"/>
-              <a:t>Neue Anforderungen: verteilt,</a:t>
-            </a:r>
-            <a:r>
-              <a:rPr lang="de-DE" baseline="0" dirty="0" smtClean="0"/>
-              <a:t> verfügbar</a:t>
-            </a:r>
-            <a:endParaRPr lang="de-DE" dirty="0" smtClean="0"/>
-          </a:p>
-          <a:p>
-            <a:endParaRPr lang="de-DE" dirty="0" smtClean="0"/>
-          </a:p>
-          <a:p>
-            <a:r>
-              <a:rPr lang="de-DE" dirty="0" err="1" smtClean="0"/>
-              <a:t>By</a:t>
-            </a:r>
-            <a:r>
-              <a:rPr lang="de-DE" dirty="0" smtClean="0"/>
-              <a:t> Brewer</a:t>
-            </a:r>
-          </a:p>
-          <a:p>
-            <a:r>
-              <a:rPr lang="de-DE" dirty="0" smtClean="0"/>
-              <a:t>Verfügbarkeit und akzeptable Reaktionszeit ist gegeben (auch bei Ausfall einzelner Knoten) mit 100% Datenverfügbarkeit</a:t>
-            </a:r>
-          </a:p>
-          <a:p>
             <a:endParaRPr lang="de-DE" dirty="0"/>
           </a:p>
         </p:txBody>
@@ -1121,7 +1180,7 @@
               <a:pPr>
                 <a:defRPr/>
               </a:pPr>
-              <a:t>20</a:t>
+              <a:t>15</a:t>
             </a:fld>
             <a:endParaRPr lang="de-DE"/>
           </a:p>
@@ -1130,7 +1189,7 @@
     </p:spTree>
     <p:extLst>
       <p:ext uri="{BB962C8B-B14F-4D97-AF65-F5344CB8AC3E}">
-        <p14:creationId xmlns:p14="http://schemas.microsoft.com/office/powerpoint/2010/main" val="1239445446"/>
+        <p14:creationId xmlns:p14="http://schemas.microsoft.com/office/powerpoint/2010/main" val="2020317614"/>
       </p:ext>
     </p:extLst>
   </p:cSld>
@@ -1185,8 +1244,12 @@
           <a:lstStyle/>
           <a:p>
             <a:r>
-              <a:rPr lang="de-DE" dirty="0" smtClean="0"/>
-              <a:t>Nur 2 Eigenschaften gleichzeitig</a:t>
+              <a:rPr lang="de-DE" dirty="0" err="1" smtClean="0"/>
+              <a:t>Reduce</a:t>
+            </a:r>
+            <a:r>
+              <a:rPr lang="de-DE" dirty="0" smtClean="0"/>
+              <a:t>: Aggregation (Data Warehouse)</a:t>
             </a:r>
             <a:endParaRPr lang="de-DE" dirty="0"/>
           </a:p>
@@ -1215,7 +1278,7 @@
               <a:pPr>
                 <a:defRPr/>
               </a:pPr>
-              <a:t>22</a:t>
+              <a:t>16</a:t>
             </a:fld>
             <a:endParaRPr lang="de-DE"/>
           </a:p>
@@ -1224,7 +1287,7 @@
     </p:spTree>
     <p:extLst>
       <p:ext uri="{BB962C8B-B14F-4D97-AF65-F5344CB8AC3E}">
-        <p14:creationId xmlns:p14="http://schemas.microsoft.com/office/powerpoint/2010/main" val="1438683183"/>
+        <p14:creationId xmlns:p14="http://schemas.microsoft.com/office/powerpoint/2010/main" val="1548140241"/>
       </p:ext>
     </p:extLst>
   </p:cSld>
@@ -1278,29 +1341,6 @@
           <a:bodyPr/>
           <a:lstStyle/>
           <a:p>
-            <a:r>
-              <a:rPr lang="de-DE" dirty="0" smtClean="0"/>
-              <a:t>ACID: </a:t>
-            </a:r>
-            <a:r>
-              <a:rPr lang="de-DE" dirty="0" err="1" smtClean="0"/>
-              <a:t>Atomarität</a:t>
-            </a:r>
-            <a:r>
-              <a:rPr lang="de-DE" dirty="0" smtClean="0"/>
-              <a:t>,</a:t>
-            </a:r>
-            <a:r>
-              <a:rPr lang="de-DE" baseline="0" dirty="0" smtClean="0"/>
-              <a:t> Konsistenzerhaltung, Isolation, Dauerhaftigkeit</a:t>
-            </a:r>
-            <a:endParaRPr lang="de-DE" dirty="0" smtClean="0"/>
-          </a:p>
-          <a:p>
-            <a:r>
-              <a:rPr lang="de-DE" dirty="0" smtClean="0"/>
-              <a:t>Optimistischer Ansatz</a:t>
-            </a:r>
             <a:endParaRPr lang="de-DE" dirty="0"/>
           </a:p>
         </p:txBody>
@@ -1328,7 +1368,7 @@
               <a:pPr>
                 <a:defRPr/>
               </a:pPr>
-              <a:t>23</a:t>
+              <a:t>17</a:t>
             </a:fld>
             <a:endParaRPr lang="de-DE"/>
           </a:p>
@@ -1337,7 +1377,7 @@
     </p:spTree>
     <p:extLst>
       <p:ext uri="{BB962C8B-B14F-4D97-AF65-F5344CB8AC3E}">
-        <p14:creationId xmlns:p14="http://schemas.microsoft.com/office/powerpoint/2010/main" val="3160698408"/>
+        <p14:creationId xmlns:p14="http://schemas.microsoft.com/office/powerpoint/2010/main" val="1562577663"/>
       </p:ext>
     </p:extLst>
   </p:cSld>
@@ -1393,7 +1433,17 @@
           <a:p>
             <a:r>
               <a:rPr lang="de-DE" dirty="0" smtClean="0"/>
-              <a:t>Optimistischer Ansatz</a:t>
+              <a:t>Geht über Idee hinaus - &gt; Framework</a:t>
+            </a:r>
+          </a:p>
+          <a:p>
+            <a:r>
+              <a:rPr lang="de-DE" dirty="0" smtClean="0"/>
+              <a:t>Für</a:t>
+            </a:r>
+            <a:r>
+              <a:rPr lang="de-DE" baseline="0" dirty="0" smtClean="0"/>
+              <a:t> Standardhardware gedacht</a:t>
             </a:r>
             <a:endParaRPr lang="de-DE" dirty="0"/>
           </a:p>
@@ -1422,7 +1472,7 @@
               <a:pPr>
                 <a:defRPr/>
               </a:pPr>
-              <a:t>24</a:t>
+              <a:t>19</a:t>
             </a:fld>
             <a:endParaRPr lang="de-DE"/>
           </a:p>
@@ -1431,7 +1481,7 @@
     </p:spTree>
     <p:extLst>
       <p:ext uri="{BB962C8B-B14F-4D97-AF65-F5344CB8AC3E}">
-        <p14:creationId xmlns:p14="http://schemas.microsoft.com/office/powerpoint/2010/main" val="3160698408"/>
+        <p14:creationId xmlns:p14="http://schemas.microsoft.com/office/powerpoint/2010/main" val="443745272"/>
       </p:ext>
     </p:extLst>
   </p:cSld>
@@ -1487,8 +1537,34 @@
           <a:p>
             <a:r>
               <a:rPr lang="de-DE" dirty="0" smtClean="0"/>
-              <a:t>Zuordnung auch über Leistungsfähigkeit möglich</a:t>
-            </a:r>
+              <a:t>Neue Anforderungen: verteilt,</a:t>
+            </a:r>
+            <a:r>
+              <a:rPr lang="de-DE" baseline="0" dirty="0" smtClean="0"/>
+              <a:t> verfügbar</a:t>
+            </a:r>
+            <a:endParaRPr lang="de-DE" dirty="0" smtClean="0"/>
+          </a:p>
+          <a:p>
+            <a:endParaRPr lang="de-DE" dirty="0" smtClean="0"/>
+          </a:p>
+          <a:p>
+            <a:r>
+              <a:rPr lang="de-DE" dirty="0" err="1" smtClean="0"/>
+              <a:t>By</a:t>
+            </a:r>
+            <a:r>
+              <a:rPr lang="de-DE" dirty="0" smtClean="0"/>
+              <a:t> Brewer</a:t>
+            </a:r>
+          </a:p>
+          <a:p>
+            <a:r>
+              <a:rPr lang="de-DE" dirty="0" smtClean="0"/>
+              <a:t>Verfügbarkeit und akzeptable Reaktionszeit ist gegeben (auch bei Ausfall einzelner Knoten) mit 100% Datenverfügbarkeit</a:t>
+            </a:r>
+          </a:p>
+          <a:p>
             <a:endParaRPr lang="de-DE" dirty="0"/>
           </a:p>
         </p:txBody>
@@ -1516,7 +1592,7 @@
               <a:pPr>
                 <a:defRPr/>
               </a:pPr>
-              <a:t>25</a:t>
+              <a:t>20</a:t>
             </a:fld>
             <a:endParaRPr lang="de-DE"/>
           </a:p>
@@ -1525,7 +1601,7 @@
     </p:spTree>
     <p:extLst>
       <p:ext uri="{BB962C8B-B14F-4D97-AF65-F5344CB8AC3E}">
-        <p14:creationId xmlns:p14="http://schemas.microsoft.com/office/powerpoint/2010/main" val="3160698408"/>
+        <p14:creationId xmlns:p14="http://schemas.microsoft.com/office/powerpoint/2010/main" val="1239445446"/>
       </p:ext>
     </p:extLst>
   </p:cSld>
@@ -1581,17 +1657,7 @@
           <a:p>
             <a:r>
               <a:rPr lang="de-DE" dirty="0" smtClean="0"/>
-              <a:t>Hinzufügen/entfernen:</a:t>
-            </a:r>
-            <a:r>
-              <a:rPr lang="de-DE" baseline="0" dirty="0" smtClean="0"/>
-              <a:t> Redundanz vorhanden und automatische Verteilung anhand Hashwerte</a:t>
-            </a:r>
-          </a:p>
-          <a:p>
-            <a:r>
-              <a:rPr lang="de-DE" dirty="0" smtClean="0"/>
-              <a:t>Zugriff über Hashwert der Daten -&gt; Hashwert des Servers</a:t>
+              <a:t>Nur 2 Eigenschaften gleichzeitig</a:t>
             </a:r>
             <a:endParaRPr lang="de-DE" dirty="0"/>
           </a:p>
@@ -1620,7 +1686,7 @@
               <a:pPr>
                 <a:defRPr/>
               </a:pPr>
-              <a:t>27</a:t>
+              <a:t>22</a:t>
             </a:fld>
             <a:endParaRPr lang="de-DE"/>
           </a:p>
@@ -1629,7 +1695,7 @@
     </p:spTree>
     <p:extLst>
       <p:ext uri="{BB962C8B-B14F-4D97-AF65-F5344CB8AC3E}">
-        <p14:creationId xmlns:p14="http://schemas.microsoft.com/office/powerpoint/2010/main" val="3403636299"/>
+        <p14:creationId xmlns:p14="http://schemas.microsoft.com/office/powerpoint/2010/main" val="1438683183"/>
       </p:ext>
     </p:extLst>
   </p:cSld>
@@ -1684,19 +1750,32 @@
           <a:lstStyle/>
           <a:p>
             <a:r>
+              <a:rPr lang="de-DE" dirty="0" smtClean="0"/>
+              <a:t>ACID: </a:t>
+            </a:r>
+            <a:r>
+              <a:rPr lang="de-DE" dirty="0" err="1" smtClean="0"/>
+              <a:t>Atomarität</a:t>
+            </a:r>
+            <a:r>
+              <a:rPr lang="de-DE" dirty="0" smtClean="0"/>
+              <a:t>,</a:t>
+            </a:r>
+            <a:r>
               <a:rPr lang="de-DE" baseline="0" dirty="0" smtClean="0"/>
-              <a:t>Transaktionen müssen nie warten</a:t>
-            </a:r>
-            <a:endParaRPr lang="de-DE" dirty="0" smtClean="0"/>
-          </a:p>
-          <a:p>
-            <a:r>
-              <a:rPr lang="de-DE" dirty="0" smtClean="0"/>
-              <a:t>Änderung</a:t>
-            </a:r>
-            <a:r>
-              <a:rPr lang="de-DE" baseline="0" dirty="0" smtClean="0"/>
-              <a:t> an Zeitstempel erkennbar</a:t>
+              <a:t> Konsistenzerhaltung, Isolation, Dauerhaftigkeit</a:t>
+            </a:r>
+          </a:p>
+          <a:p>
+            <a:r>
+              <a:rPr lang="de-DE" dirty="0" smtClean="0"/>
+              <a:t>Optimistischer Ansatz</a:t>
+            </a:r>
+          </a:p>
+          <a:p>
+            <a:r>
+              <a:rPr lang="de-DE" dirty="0" smtClean="0"/>
+              <a:t>Ohne Sperren</a:t>
             </a:r>
             <a:endParaRPr lang="de-DE" dirty="0"/>
           </a:p>
@@ -1725,7 +1804,7 @@
               <a:pPr>
                 <a:defRPr/>
               </a:pPr>
-              <a:t>28</a:t>
+              <a:t>23</a:t>
             </a:fld>
             <a:endParaRPr lang="de-DE"/>
           </a:p>
@@ -1789,16 +1868,16 @@
           <a:lstStyle/>
           <a:p>
             <a:r>
-              <a:rPr lang="de-DE" dirty="0" smtClean="0"/>
-              <a:t>Evans</a:t>
-            </a:r>
-            <a:r>
-              <a:rPr lang="de-DE" baseline="0" dirty="0" smtClean="0"/>
-              <a:t> ist Softwareentwickler bei der Apache Software </a:t>
-            </a:r>
-            <a:r>
-              <a:rPr lang="de-DE" baseline="0" dirty="0" err="1" smtClean="0"/>
-              <a:t>Foundation</a:t>
+              <a:rPr lang="de-DE" dirty="0" err="1" smtClean="0"/>
+              <a:t>Buzzword</a:t>
+            </a:r>
+            <a:r>
+              <a:rPr lang="de-DE" dirty="0" smtClean="0"/>
+              <a:t> </a:t>
+            </a:r>
+            <a:r>
+              <a:rPr lang="de-DE" dirty="0" err="1" smtClean="0"/>
+              <a:t>NoSQL</a:t>
             </a:r>
             <a:endParaRPr lang="de-DE" dirty="0"/>
           </a:p>
@@ -1827,7 +1906,7 @@
               <a:pPr>
                 <a:defRPr/>
               </a:pPr>
-              <a:t>7</a:t>
+              <a:t>3</a:t>
             </a:fld>
             <a:endParaRPr lang="de-DE"/>
           </a:p>
@@ -1836,7 +1915,7 @@
     </p:spTree>
     <p:extLst>
       <p:ext uri="{BB962C8B-B14F-4D97-AF65-F5344CB8AC3E}">
-        <p14:creationId xmlns:p14="http://schemas.microsoft.com/office/powerpoint/2010/main" val="2017961241"/>
+        <p14:creationId xmlns:p14="http://schemas.microsoft.com/office/powerpoint/2010/main" val="4138233026"/>
       </p:ext>
     </p:extLst>
   </p:cSld>
@@ -1892,11 +1971,7 @@
           <a:p>
             <a:r>
               <a:rPr lang="de-DE" dirty="0" smtClean="0"/>
-              <a:t>Alte Dateiversionen</a:t>
-            </a:r>
-            <a:r>
-              <a:rPr lang="de-DE" baseline="0" dirty="0" smtClean="0"/>
-              <a:t> können gelesen werden</a:t>
+              <a:t>Optimistischer Ansatz</a:t>
             </a:r>
             <a:endParaRPr lang="de-DE" dirty="0"/>
           </a:p>
@@ -1925,7 +2000,7 @@
               <a:pPr>
                 <a:defRPr/>
               </a:pPr>
-              <a:t>29</a:t>
+              <a:t>24</a:t>
             </a:fld>
             <a:endParaRPr lang="de-DE"/>
           </a:p>
@@ -1934,7 +2009,7 @@
     </p:spTree>
     <p:extLst>
       <p:ext uri="{BB962C8B-B14F-4D97-AF65-F5344CB8AC3E}">
-        <p14:creationId xmlns:p14="http://schemas.microsoft.com/office/powerpoint/2010/main" val="3403636299"/>
+        <p14:creationId xmlns:p14="http://schemas.microsoft.com/office/powerpoint/2010/main" val="3160698408"/>
       </p:ext>
     </p:extLst>
   </p:cSld>
@@ -1988,94 +2063,6 @@
           <a:bodyPr/>
           <a:lstStyle/>
           <a:p>
-            <a:r>
-              <a:rPr lang="de-DE" dirty="0" smtClean="0"/>
-              <a:t>GET: lese </a:t>
-            </a:r>
-            <a:r>
-              <a:rPr lang="de-DE" dirty="0" err="1" smtClean="0"/>
-              <a:t>ressource</a:t>
-            </a:r>
-            <a:r>
-              <a:rPr lang="de-DE" dirty="0" smtClean="0"/>
-              <a:t>  - immer gleiche Rückgabe</a:t>
-            </a:r>
-          </a:p>
-          <a:p>
-            <a:r>
-              <a:rPr lang="de-DE" dirty="0" smtClean="0"/>
-              <a:t>HEAD: lese Information zu </a:t>
-            </a:r>
-            <a:r>
-              <a:rPr lang="de-DE" dirty="0" err="1" smtClean="0"/>
-              <a:t>ressourcen</a:t>
-            </a:r>
-            <a:r>
-              <a:rPr lang="de-DE" dirty="0" smtClean="0"/>
-              <a:t> - immer gleiche Rückgabe</a:t>
-            </a:r>
-          </a:p>
-          <a:p>
-            <a:r>
-              <a:rPr lang="de-DE" dirty="0" smtClean="0"/>
-              <a:t>PUT: schreibe </a:t>
-            </a:r>
-            <a:r>
-              <a:rPr lang="de-DE" dirty="0" err="1" smtClean="0"/>
-              <a:t>Resource</a:t>
-            </a:r>
-            <a:r>
-              <a:rPr lang="de-DE" dirty="0" smtClean="0"/>
-              <a:t> - doppelter gleicher PUT hat selben Effekt wie einer</a:t>
-            </a:r>
-          </a:p>
-          <a:p>
-            <a:r>
-              <a:rPr lang="de-DE" dirty="0" smtClean="0"/>
-              <a:t>DELETE: entferne </a:t>
-            </a:r>
-            <a:r>
-              <a:rPr lang="de-DE" dirty="0" err="1" smtClean="0"/>
-              <a:t>Resource</a:t>
-            </a:r>
-            <a:r>
-              <a:rPr lang="de-DE" dirty="0" smtClean="0"/>
-              <a:t> - doppelter </a:t>
-            </a:r>
-            <a:r>
-              <a:rPr lang="de-DE" dirty="0" err="1" smtClean="0"/>
-              <a:t>aufruf</a:t>
-            </a:r>
-            <a:r>
-              <a:rPr lang="de-DE" dirty="0" smtClean="0"/>
-              <a:t> wie einer</a:t>
-            </a:r>
-          </a:p>
-          <a:p>
-            <a:r>
-              <a:rPr lang="de-DE" dirty="0" smtClean="0"/>
-              <a:t>POST: Senden von Informationen um </a:t>
-            </a:r>
-            <a:r>
-              <a:rPr lang="de-DE" dirty="0" err="1" smtClean="0"/>
-              <a:t>resourcen</a:t>
-            </a:r>
-            <a:r>
-              <a:rPr lang="de-DE" dirty="0" smtClean="0"/>
-              <a:t> zu ändern oder zu erzeugen oder ohne </a:t>
-            </a:r>
-            <a:r>
-              <a:rPr lang="de-DE" dirty="0" err="1" smtClean="0"/>
-              <a:t>nebeneffect</a:t>
-            </a:r>
-            <a:r>
-              <a:rPr lang="de-DE" dirty="0" smtClean="0"/>
-              <a:t> - nicht </a:t>
-            </a:r>
-            <a:r>
-              <a:rPr lang="de-DE" dirty="0" err="1" smtClean="0"/>
-              <a:t>idempotent</a:t>
-            </a:r>
             <a:endParaRPr lang="de-DE" dirty="0"/>
           </a:p>
         </p:txBody>
@@ -2103,7 +2090,7 @@
               <a:pPr>
                 <a:defRPr/>
               </a:pPr>
-              <a:t>30</a:t>
+              <a:t>25</a:t>
             </a:fld>
             <a:endParaRPr lang="de-DE"/>
           </a:p>
@@ -2166,6 +2153,29 @@
           <a:bodyPr/>
           <a:lstStyle/>
           <a:p>
+            <a:pPr marL="0" marR="0" indent="0" algn="l" defTabSz="914400" rtl="0" eaLnBrk="1" fontAlgn="base" latinLnBrk="0" hangingPunct="1">
+              <a:lnSpc>
+                <a:spcPct val="100000"/>
+              </a:lnSpc>
+              <a:spcBef>
+                <a:spcPct val="30000"/>
+              </a:spcBef>
+              <a:spcAft>
+                <a:spcPct val="0"/>
+              </a:spcAft>
+              <a:buClrTx/>
+              <a:buSzTx/>
+              <a:buFontTx/>
+              <a:buNone/>
+              <a:tabLst/>
+              <a:defRPr/>
+            </a:pPr>
+            <a:r>
+              <a:rPr lang="de-DE" dirty="0" smtClean="0"/>
+              <a:t>Zuordnung auch über Leistungsfähigkeit möglich</a:t>
+            </a:r>
+          </a:p>
+          <a:p>
             <a:endParaRPr lang="de-DE" dirty="0"/>
           </a:p>
         </p:txBody>
@@ -2193,7 +2203,7 @@
               <a:pPr>
                 <a:defRPr/>
               </a:pPr>
-              <a:t>32</a:t>
+              <a:t>26</a:t>
             </a:fld>
             <a:endParaRPr lang="de-DE"/>
           </a:p>
@@ -2202,7 +2212,7 @@
     </p:spTree>
     <p:extLst>
       <p:ext uri="{BB962C8B-B14F-4D97-AF65-F5344CB8AC3E}">
-        <p14:creationId xmlns:p14="http://schemas.microsoft.com/office/powerpoint/2010/main" val="298209940"/>
+        <p14:creationId xmlns:p14="http://schemas.microsoft.com/office/powerpoint/2010/main" val="4150634901"/>
       </p:ext>
     </p:extLst>
   </p:cSld>
@@ -2258,43 +2268,17 @@
           <a:p>
             <a:r>
               <a:rPr lang="de-DE" dirty="0" smtClean="0"/>
-              <a:t>Beispiele:</a:t>
+              <a:t>Hinzufügen/entfernen:</a:t>
             </a:r>
             <a:r>
               <a:rPr lang="de-DE" baseline="0" dirty="0" smtClean="0"/>
-              <a:t> </a:t>
-            </a:r>
-            <a:r>
-              <a:rPr lang="de-DE" baseline="0" dirty="0" err="1" smtClean="0"/>
-              <a:t>Redis</a:t>
-            </a:r>
-            <a:r>
-              <a:rPr lang="de-DE" baseline="0" dirty="0" smtClean="0"/>
-              <a:t>, </a:t>
-            </a:r>
-            <a:r>
-              <a:rPr lang="de-DE" baseline="0" dirty="0" err="1" smtClean="0"/>
-              <a:t>Chrordless</a:t>
-            </a:r>
-            <a:r>
-              <a:rPr lang="de-DE" baseline="0" dirty="0" smtClean="0"/>
-              <a:t>, </a:t>
-            </a:r>
-            <a:r>
-              <a:rPr lang="de-DE" baseline="0" dirty="0" err="1" smtClean="0"/>
-              <a:t>Riak</a:t>
-            </a:r>
-            <a:r>
-              <a:rPr lang="de-DE" baseline="0" dirty="0" smtClean="0"/>
-              <a:t>, MEMBASE, </a:t>
-            </a:r>
-            <a:r>
-              <a:rPr lang="de-DE" baseline="0" dirty="0" err="1" smtClean="0"/>
-              <a:t>Voldemort</a:t>
-            </a:r>
-            <a:r>
-              <a:rPr lang="de-DE" baseline="0" dirty="0" smtClean="0"/>
-              <a:t>, Amazon Dynamo</a:t>
+              <a:t> Redundanz vorhanden und automatische Verteilung anhand Hashwerte</a:t>
+            </a:r>
+          </a:p>
+          <a:p>
+            <a:r>
+              <a:rPr lang="de-DE" dirty="0" smtClean="0"/>
+              <a:t>Zugriff über Hashwert der Daten -&gt; Hashwert des Servers</a:t>
             </a:r>
             <a:endParaRPr lang="de-DE" dirty="0"/>
           </a:p>
@@ -2323,7 +2307,7 @@
               <a:pPr>
                 <a:defRPr/>
               </a:pPr>
-              <a:t>33</a:t>
+              <a:t>27</a:t>
             </a:fld>
             <a:endParaRPr lang="de-DE"/>
           </a:p>
@@ -2332,7 +2316,7 @@
     </p:spTree>
     <p:extLst>
       <p:ext uri="{BB962C8B-B14F-4D97-AF65-F5344CB8AC3E}">
-        <p14:creationId xmlns:p14="http://schemas.microsoft.com/office/powerpoint/2010/main" val="298209940"/>
+        <p14:creationId xmlns:p14="http://schemas.microsoft.com/office/powerpoint/2010/main" val="3403636299"/>
       </p:ext>
     </p:extLst>
   </p:cSld>
@@ -2387,30 +2371,19 @@
           <a:lstStyle/>
           <a:p>
             <a:r>
-              <a:rPr lang="de-DE" dirty="0" smtClean="0"/>
-              <a:t>Schemaverantwortung wird an Anwendung abgegeben</a:t>
-            </a:r>
-          </a:p>
-          <a:p>
-            <a:r>
-              <a:rPr lang="de-DE" dirty="0" smtClean="0"/>
-              <a:t>Beispiele: </a:t>
-            </a:r>
-            <a:r>
-              <a:rPr lang="de-DE" dirty="0" err="1" smtClean="0"/>
-              <a:t>MongoDB</a:t>
-            </a:r>
-            <a:r>
-              <a:rPr lang="de-DE" dirty="0" smtClean="0"/>
-              <a:t>, </a:t>
-            </a:r>
-            <a:r>
-              <a:rPr lang="de-DE" dirty="0" err="1" smtClean="0"/>
-              <a:t>CouchDB</a:t>
-            </a:r>
-            <a:r>
-              <a:rPr lang="de-DE" dirty="0" smtClean="0"/>
-              <a:t>, Terrastore</a:t>
+              <a:rPr lang="de-DE" baseline="0" dirty="0" smtClean="0"/>
+              <a:t>Transaktionen müssen nie warten</a:t>
+            </a:r>
+            <a:endParaRPr lang="de-DE" dirty="0" smtClean="0"/>
+          </a:p>
+          <a:p>
+            <a:r>
+              <a:rPr lang="de-DE" dirty="0" smtClean="0"/>
+              <a:t>Änderung</a:t>
+            </a:r>
+            <a:r>
+              <a:rPr lang="de-DE" baseline="0" dirty="0" smtClean="0"/>
+              <a:t> an Zeitstempel erkennbar</a:t>
             </a:r>
             <a:endParaRPr lang="de-DE" dirty="0"/>
           </a:p>
@@ -2439,7 +2412,7 @@
               <a:pPr>
                 <a:defRPr/>
               </a:pPr>
-              <a:t>34</a:t>
+              <a:t>28</a:t>
             </a:fld>
             <a:endParaRPr lang="de-DE"/>
           </a:p>
@@ -2448,7 +2421,7 @@
     </p:spTree>
     <p:extLst>
       <p:ext uri="{BB962C8B-B14F-4D97-AF65-F5344CB8AC3E}">
-        <p14:creationId xmlns:p14="http://schemas.microsoft.com/office/powerpoint/2010/main" val="298209940"/>
+        <p14:creationId xmlns:p14="http://schemas.microsoft.com/office/powerpoint/2010/main" val="3160698408"/>
       </p:ext>
     </p:extLst>
   </p:cSld>
@@ -2502,6 +2475,14 @@
           <a:bodyPr/>
           <a:lstStyle/>
           <a:p>
+            <a:r>
+              <a:rPr lang="de-DE" dirty="0" smtClean="0"/>
+              <a:t>Alte Dateiversionen</a:t>
+            </a:r>
+            <a:r>
+              <a:rPr lang="de-DE" baseline="0" dirty="0" smtClean="0"/>
+              <a:t> können gelesen werden</a:t>
+            </a:r>
             <a:endParaRPr lang="de-DE" dirty="0"/>
           </a:p>
         </p:txBody>
@@ -2529,7 +2510,7 @@
               <a:pPr>
                 <a:defRPr/>
               </a:pPr>
-              <a:t>35</a:t>
+              <a:t>29</a:t>
             </a:fld>
             <a:endParaRPr lang="de-DE"/>
           </a:p>
@@ -2538,7 +2519,7 @@
     </p:spTree>
     <p:extLst>
       <p:ext uri="{BB962C8B-B14F-4D97-AF65-F5344CB8AC3E}">
-        <p14:creationId xmlns:p14="http://schemas.microsoft.com/office/powerpoint/2010/main" val="298209940"/>
+        <p14:creationId xmlns:p14="http://schemas.microsoft.com/office/powerpoint/2010/main" val="3403636299"/>
       </p:ext>
     </p:extLst>
   </p:cSld>
@@ -2593,26 +2574,106 @@
           <a:lstStyle/>
           <a:p>
             <a:r>
+              <a:rPr lang="de-DE" dirty="0" smtClean="0"/>
+              <a:t>GET: lese </a:t>
+            </a:r>
+            <a:r>
               <a:rPr lang="de-DE" dirty="0" err="1" smtClean="0"/>
-              <a:t>Sybase</a:t>
-            </a:r>
-            <a:r>
-              <a:rPr lang="de-DE" dirty="0" smtClean="0"/>
-              <a:t> IQ, </a:t>
+              <a:t>ressource</a:t>
+            </a:r>
+            <a:r>
+              <a:rPr lang="de-DE" dirty="0" smtClean="0"/>
+              <a:t>  - immer gleiche Rückgabe</a:t>
+            </a:r>
+          </a:p>
+          <a:p>
+            <a:r>
+              <a:rPr lang="de-DE" dirty="0" smtClean="0"/>
+              <a:t>HEAD: lese Information zu </a:t>
             </a:r>
             <a:r>
               <a:rPr lang="de-DE" dirty="0" err="1" smtClean="0"/>
-              <a:t>FluidDB</a:t>
-            </a:r>
-            <a:r>
-              <a:rPr lang="de-DE" dirty="0" smtClean="0"/>
-              <a:t>, C-Store und </a:t>
+              <a:t>ressourcen</a:t>
+            </a:r>
+            <a:r>
+              <a:rPr lang="de-DE" dirty="0" smtClean="0"/>
+              <a:t> - immer gleiche Rückgabe</a:t>
+            </a:r>
+          </a:p>
+          <a:p>
+            <a:r>
+              <a:rPr lang="de-DE" dirty="0" smtClean="0"/>
+              <a:t>PUT: schreibe </a:t>
             </a:r>
             <a:r>
               <a:rPr lang="de-DE" dirty="0" err="1" smtClean="0"/>
-              <a:t>MonetDB</a:t>
-            </a:r>
-            <a:endParaRPr lang="de-DE" dirty="0"/>
+              <a:t>Resource</a:t>
+            </a:r>
+            <a:r>
+              <a:rPr lang="de-DE" dirty="0" smtClean="0"/>
+              <a:t> - doppelter gleicher PUT hat selben Effekt wie einer</a:t>
+            </a:r>
+          </a:p>
+          <a:p>
+            <a:r>
+              <a:rPr lang="de-DE" dirty="0" smtClean="0"/>
+              <a:t>DELETE: entferne </a:t>
+            </a:r>
+            <a:r>
+              <a:rPr lang="de-DE" dirty="0" err="1" smtClean="0"/>
+              <a:t>Resource</a:t>
+            </a:r>
+            <a:r>
+              <a:rPr lang="de-DE" dirty="0" smtClean="0"/>
+              <a:t> - doppelter </a:t>
+            </a:r>
+            <a:r>
+              <a:rPr lang="de-DE" dirty="0" err="1" smtClean="0"/>
+              <a:t>aufruf</a:t>
+            </a:r>
+            <a:r>
+              <a:rPr lang="de-DE" dirty="0" smtClean="0"/>
+              <a:t> wie einer</a:t>
+            </a:r>
+          </a:p>
+          <a:p>
+            <a:r>
+              <a:rPr lang="de-DE" dirty="0" smtClean="0"/>
+              <a:t>POST: Senden von Informationen um </a:t>
+            </a:r>
+            <a:r>
+              <a:rPr lang="de-DE" dirty="0" err="1" smtClean="0"/>
+              <a:t>resourcen</a:t>
+            </a:r>
+            <a:r>
+              <a:rPr lang="de-DE" dirty="0" smtClean="0"/>
+              <a:t> zu ändern oder zu erzeugen oder ohne </a:t>
+            </a:r>
+            <a:r>
+              <a:rPr lang="de-DE" dirty="0" err="1" smtClean="0"/>
+              <a:t>nebeneffect</a:t>
+            </a:r>
+            <a:r>
+              <a:rPr lang="de-DE" dirty="0" smtClean="0"/>
+              <a:t> - nicht </a:t>
+            </a:r>
+            <a:r>
+              <a:rPr lang="de-DE" dirty="0" err="1" smtClean="0"/>
+              <a:t>idempotent</a:t>
+            </a:r>
+            <a:endParaRPr lang="de-DE" dirty="0" smtClean="0"/>
+          </a:p>
+          <a:p>
+            <a:endParaRPr lang="de-DE" dirty="0" smtClean="0"/>
+          </a:p>
+          <a:p>
+            <a:endParaRPr lang="de-DE" dirty="0" smtClean="0"/>
+          </a:p>
+          <a:p>
+            <a:r>
+              <a:rPr lang="de-DE" dirty="0" smtClean="0"/>
+              <a:t>Zusammenfassung!</a:t>
+            </a:r>
           </a:p>
         </p:txBody>
       </p:sp>
@@ -2639,7 +2700,7 @@
               <a:pPr>
                 <a:defRPr/>
               </a:pPr>
-              <a:t>36</a:t>
+              <a:t>30</a:t>
             </a:fld>
             <a:endParaRPr lang="de-DE"/>
           </a:p>
@@ -2648,7 +2709,7 @@
     </p:spTree>
     <p:extLst>
       <p:ext uri="{BB962C8B-B14F-4D97-AF65-F5344CB8AC3E}">
-        <p14:creationId xmlns:p14="http://schemas.microsoft.com/office/powerpoint/2010/main" val="298209940"/>
+        <p14:creationId xmlns:p14="http://schemas.microsoft.com/office/powerpoint/2010/main" val="3160698408"/>
       </p:ext>
     </p:extLst>
   </p:cSld>
@@ -2702,35 +2763,6 @@
           <a:bodyPr/>
           <a:lstStyle/>
           <a:p>
-            <a:r>
-              <a:rPr lang="de-DE" dirty="0" smtClean="0"/>
-              <a:t>Unterste Ebene sind Key/Value, obere Ebenen besitzen</a:t>
-            </a:r>
-            <a:r>
-              <a:rPr lang="de-DE" baseline="0" dirty="0" smtClean="0"/>
-              <a:t> Gruppierungen</a:t>
-            </a:r>
-          </a:p>
-          <a:p>
-            <a:endParaRPr lang="de-DE" baseline="0" dirty="0" smtClean="0"/>
-          </a:p>
-          <a:p>
-            <a:r>
-              <a:rPr lang="de-DE" baseline="0" dirty="0" smtClean="0"/>
-              <a:t>-&gt; </a:t>
-            </a:r>
-            <a:r>
-              <a:rPr lang="de-DE" baseline="0" dirty="0" err="1" smtClean="0"/>
-              <a:t>HBase</a:t>
-            </a:r>
-            <a:r>
-              <a:rPr lang="de-DE" baseline="0" dirty="0" smtClean="0"/>
-              <a:t>, Cassandra, Amazon </a:t>
-            </a:r>
-            <a:r>
-              <a:rPr lang="de-DE" baseline="0" dirty="0" err="1" smtClean="0"/>
-              <a:t>SimpleDB</a:t>
-            </a:r>
             <a:endParaRPr lang="de-DE" dirty="0"/>
           </a:p>
         </p:txBody>
@@ -2758,7 +2790,7 @@
               <a:pPr>
                 <a:defRPr/>
               </a:pPr>
-              <a:t>37</a:t>
+              <a:t>32</a:t>
             </a:fld>
             <a:endParaRPr lang="de-DE"/>
           </a:p>
@@ -2823,21 +2855,43 @@
           <a:p>
             <a:r>
               <a:rPr lang="de-DE" dirty="0" smtClean="0"/>
-              <a:t>Auch ACID konforme</a:t>
+              <a:t>Beispiele:</a:t>
             </a:r>
             <a:r>
               <a:rPr lang="de-DE" baseline="0" dirty="0" smtClean="0"/>
-              <a:t> DBs</a:t>
-            </a:r>
-          </a:p>
-          <a:p>
+              <a:t> </a:t>
+            </a:r>
+            <a:r>
+              <a:rPr lang="de-DE" baseline="0" dirty="0" err="1" smtClean="0"/>
+              <a:t>Redis</a:t>
+            </a:r>
             <a:r>
               <a:rPr lang="de-DE" baseline="0" dirty="0" smtClean="0"/>
-              <a:t>Neo4J, </a:t>
-            </a:r>
-            <a:r>
-              <a:rPr lang="de-DE" baseline="0" smtClean="0"/>
-              <a:t>FlockDB</a:t>
+              <a:t>, </a:t>
+            </a:r>
+            <a:r>
+              <a:rPr lang="de-DE" baseline="0" dirty="0" err="1" smtClean="0"/>
+              <a:t>Chrordless</a:t>
+            </a:r>
+            <a:r>
+              <a:rPr lang="de-DE" baseline="0" dirty="0" smtClean="0"/>
+              <a:t>, </a:t>
+            </a:r>
+            <a:r>
+              <a:rPr lang="de-DE" baseline="0" dirty="0" err="1" smtClean="0"/>
+              <a:t>Riak</a:t>
+            </a:r>
+            <a:r>
+              <a:rPr lang="de-DE" baseline="0" dirty="0" smtClean="0"/>
+              <a:t>, MEMBASE, </a:t>
+            </a:r>
+            <a:r>
+              <a:rPr lang="de-DE" baseline="0" dirty="0" err="1" smtClean="0"/>
+              <a:t>Voldemort</a:t>
+            </a:r>
+            <a:r>
+              <a:rPr lang="de-DE" baseline="0" dirty="0" smtClean="0"/>
+              <a:t>, Amazon Dynamo</a:t>
             </a:r>
             <a:endParaRPr lang="de-DE" dirty="0"/>
           </a:p>
@@ -2866,7 +2920,7 @@
               <a:pPr>
                 <a:defRPr/>
               </a:pPr>
-              <a:t>38</a:t>
+              <a:t>33</a:t>
             </a:fld>
             <a:endParaRPr lang="de-DE"/>
           </a:p>
@@ -2929,6 +2983,32 @@
           <a:bodyPr/>
           <a:lstStyle/>
           <a:p>
+            <a:r>
+              <a:rPr lang="de-DE" dirty="0" smtClean="0"/>
+              <a:t>Schemaverantwortung wird an Anwendung abgegeben</a:t>
+            </a:r>
+          </a:p>
+          <a:p>
+            <a:r>
+              <a:rPr lang="de-DE" dirty="0" smtClean="0"/>
+              <a:t>Beispiele: </a:t>
+            </a:r>
+            <a:r>
+              <a:rPr lang="de-DE" dirty="0" err="1" smtClean="0"/>
+              <a:t>MongoDB</a:t>
+            </a:r>
+            <a:r>
+              <a:rPr lang="de-DE" dirty="0" smtClean="0"/>
+              <a:t>, </a:t>
+            </a:r>
+            <a:r>
+              <a:rPr lang="de-DE" dirty="0" err="1" smtClean="0"/>
+              <a:t>CouchDB</a:t>
+            </a:r>
+            <a:r>
+              <a:rPr lang="de-DE" dirty="0" smtClean="0"/>
+              <a:t>, Terrastore</a:t>
+            </a:r>
             <a:endParaRPr lang="de-DE" dirty="0"/>
           </a:p>
         </p:txBody>
@@ -2956,7 +3036,7 @@
               <a:pPr>
                 <a:defRPr/>
               </a:pPr>
-              <a:t>39</a:t>
+              <a:t>34</a:t>
             </a:fld>
             <a:endParaRPr lang="de-DE"/>
           </a:p>
@@ -3020,39 +3100,30 @@
           <a:lstStyle/>
           <a:p>
             <a:r>
-              <a:rPr lang="de-DE" dirty="0" smtClean="0"/>
-              <a:t>DBM: Ken </a:t>
-            </a:r>
-            <a:r>
               <a:rPr lang="de-DE" dirty="0" err="1" smtClean="0"/>
-              <a:t>Thompsen</a:t>
-            </a:r>
-            <a:endParaRPr lang="de-DE" dirty="0" smtClean="0"/>
-          </a:p>
-          <a:p>
-            <a:r>
-              <a:rPr lang="de-DE" dirty="0" smtClean="0"/>
-              <a:t>Lotus Notes: dokumentorientiert</a:t>
-            </a:r>
-          </a:p>
-          <a:p>
-            <a:r>
-              <a:rPr lang="de-DE" dirty="0" smtClean="0"/>
-              <a:t>GT.M:</a:t>
+              <a:t>NoSQL</a:t>
+            </a:r>
+            <a:r>
+              <a:rPr lang="de-DE" dirty="0" smtClean="0"/>
+              <a:t> – not </a:t>
+            </a:r>
+            <a:r>
+              <a:rPr lang="de-DE" dirty="0" err="1" smtClean="0"/>
+              <a:t>only</a:t>
+            </a:r>
+            <a:r>
+              <a:rPr lang="de-DE" dirty="0" smtClean="0"/>
+              <a:t> SQL</a:t>
+            </a:r>
+          </a:p>
+          <a:p>
+            <a:r>
+              <a:rPr lang="de-DE" dirty="0" smtClean="0"/>
+              <a:t>Mehr</a:t>
             </a:r>
             <a:r>
               <a:rPr lang="de-DE" baseline="0" dirty="0" smtClean="0"/>
-              <a:t> Key/Value</a:t>
-            </a:r>
-          </a:p>
-          <a:p>
-            <a:r>
-              <a:rPr lang="de-DE" baseline="0" dirty="0" err="1" smtClean="0"/>
-              <a:t>BigTable</a:t>
-            </a:r>
-            <a:r>
-              <a:rPr lang="de-DE" baseline="0" dirty="0" smtClean="0"/>
-              <a:t>: Nur Paper veröffentlicht; siehe Kategorisierung</a:t>
+              <a:t> Bewegung als Konzept</a:t>
             </a:r>
             <a:endParaRPr lang="de-DE" dirty="0"/>
           </a:p>
@@ -3081,7 +3152,7 @@
               <a:pPr>
                 <a:defRPr/>
               </a:pPr>
-              <a:t>8</a:t>
+              <a:t>4</a:t>
             </a:fld>
             <a:endParaRPr lang="de-DE"/>
           </a:p>
@@ -3090,7 +3161,7 @@
     </p:spTree>
     <p:extLst>
       <p:ext uri="{BB962C8B-B14F-4D97-AF65-F5344CB8AC3E}">
-        <p14:creationId xmlns:p14="http://schemas.microsoft.com/office/powerpoint/2010/main" val="634685221"/>
+        <p14:creationId xmlns:p14="http://schemas.microsoft.com/office/powerpoint/2010/main" val="1205780152"/>
       </p:ext>
     </p:extLst>
   </p:cSld>
@@ -3144,9 +3215,533 @@
           <a:bodyPr/>
           <a:lstStyle/>
           <a:p>
-            <a:r>
-              <a:rPr lang="de-DE" dirty="0" smtClean="0"/>
-              <a:t>Wichtigsten Vertreter stammen von großen Firmen</a:t>
+            <a:endParaRPr lang="de-DE" dirty="0"/>
+          </a:p>
+        </p:txBody>
+      </p:sp>
+      <p:sp>
+        <p:nvSpPr>
+          <p:cNvPr id="4" name="Foliennummernplatzhalter 3"/>
+          <p:cNvSpPr>
+            <a:spLocks noGrp="1"/>
+          </p:cNvSpPr>
+          <p:nvPr>
+            <p:ph type="sldNum" sz="quarter" idx="10"/>
+          </p:nvPr>
+        </p:nvSpPr>
+        <p:spPr/>
+        <p:txBody>
+          <a:bodyPr/>
+          <a:lstStyle/>
+          <a:p>
+            <a:pPr>
+              <a:defRPr/>
+            </a:pPr>
+            <a:fld id="{70C331BD-16AB-4BE2-A12B-855C5D76B38C}" type="slidenum">
+              <a:rPr lang="de-DE" smtClean="0"/>
+              <a:pPr>
+                <a:defRPr/>
+              </a:pPr>
+              <a:t>35</a:t>
+            </a:fld>
+            <a:endParaRPr lang="de-DE"/>
+          </a:p>
+        </p:txBody>
+      </p:sp>
+    </p:spTree>
+    <p:extLst>
+      <p:ext uri="{BB962C8B-B14F-4D97-AF65-F5344CB8AC3E}">
+        <p14:creationId xmlns:p14="http://schemas.microsoft.com/office/powerpoint/2010/main" val="298209940"/>
+      </p:ext>
+    </p:extLst>
+  </p:cSld>
+  <p:clrMapOvr>
+    <a:masterClrMapping/>
+  </p:clrMapOvr>
+</p:notes>
+</file>
+
+<file path=ppt/notesSlides/notesSlide31.xml><?xml version="1.0" encoding="utf-8"?>
+<p:notes xmlns:a="http://schemas.openxmlformats.org/drawingml/2006/main" xmlns:r="http://schemas.openxmlformats.org/officeDocument/2006/relationships" xmlns:p="http://schemas.openxmlformats.org/presentationml/2006/main">
+  <p:cSld>
+    <p:spTree>
+      <p:nvGrpSpPr>
+        <p:cNvPr id="1" name=""/>
+        <p:cNvGrpSpPr/>
+        <p:nvPr/>
+      </p:nvGrpSpPr>
+      <p:grpSpPr>
+        <a:xfrm>
+          <a:off x="0" y="0"/>
+          <a:ext cx="0" cy="0"/>
+          <a:chOff x="0" y="0"/>
+          <a:chExt cx="0" cy="0"/>
+        </a:xfrm>
+      </p:grpSpPr>
+      <p:sp>
+        <p:nvSpPr>
+          <p:cNvPr id="2" name="Folienbildplatzhalter 1"/>
+          <p:cNvSpPr>
+            <a:spLocks noGrp="1" noRot="1" noChangeAspect="1"/>
+          </p:cNvSpPr>
+          <p:nvPr>
+            <p:ph type="sldImg"/>
+          </p:nvPr>
+        </p:nvSpPr>
+        <p:spPr/>
+      </p:sp>
+      <p:sp>
+        <p:nvSpPr>
+          <p:cNvPr id="3" name="Notizenplatzhalter 2"/>
+          <p:cNvSpPr>
+            <a:spLocks noGrp="1"/>
+          </p:cNvSpPr>
+          <p:nvPr>
+            <p:ph type="body" idx="1"/>
+          </p:nvPr>
+        </p:nvSpPr>
+        <p:spPr/>
+        <p:txBody>
+          <a:bodyPr/>
+          <a:lstStyle/>
+          <a:p>
+            <a:r>
+              <a:rPr lang="de-DE" dirty="0" err="1" smtClean="0"/>
+              <a:t>Sybase</a:t>
+            </a:r>
+            <a:r>
+              <a:rPr lang="de-DE" dirty="0" smtClean="0"/>
+              <a:t> IQ, </a:t>
+            </a:r>
+            <a:r>
+              <a:rPr lang="de-DE" dirty="0" err="1" smtClean="0"/>
+              <a:t>FluidDB</a:t>
+            </a:r>
+            <a:r>
+              <a:rPr lang="de-DE" dirty="0" smtClean="0"/>
+              <a:t>, C-Store und </a:t>
+            </a:r>
+            <a:r>
+              <a:rPr lang="de-DE" dirty="0" err="1" smtClean="0"/>
+              <a:t>MonetDB</a:t>
+            </a:r>
+            <a:endParaRPr lang="de-DE" dirty="0"/>
+          </a:p>
+        </p:txBody>
+      </p:sp>
+      <p:sp>
+        <p:nvSpPr>
+          <p:cNvPr id="4" name="Foliennummernplatzhalter 3"/>
+          <p:cNvSpPr>
+            <a:spLocks noGrp="1"/>
+          </p:cNvSpPr>
+          <p:nvPr>
+            <p:ph type="sldNum" sz="quarter" idx="10"/>
+          </p:nvPr>
+        </p:nvSpPr>
+        <p:spPr/>
+        <p:txBody>
+          <a:bodyPr/>
+          <a:lstStyle/>
+          <a:p>
+            <a:pPr>
+              <a:defRPr/>
+            </a:pPr>
+            <a:fld id="{70C331BD-16AB-4BE2-A12B-855C5D76B38C}" type="slidenum">
+              <a:rPr lang="de-DE" smtClean="0"/>
+              <a:pPr>
+                <a:defRPr/>
+              </a:pPr>
+              <a:t>36</a:t>
+            </a:fld>
+            <a:endParaRPr lang="de-DE"/>
+          </a:p>
+        </p:txBody>
+      </p:sp>
+    </p:spTree>
+    <p:extLst>
+      <p:ext uri="{BB962C8B-B14F-4D97-AF65-F5344CB8AC3E}">
+        <p14:creationId xmlns:p14="http://schemas.microsoft.com/office/powerpoint/2010/main" val="298209940"/>
+      </p:ext>
+    </p:extLst>
+  </p:cSld>
+  <p:clrMapOvr>
+    <a:masterClrMapping/>
+  </p:clrMapOvr>
+</p:notes>
+</file>
+
+<file path=ppt/notesSlides/notesSlide32.xml><?xml version="1.0" encoding="utf-8"?>
+<p:notes xmlns:a="http://schemas.openxmlformats.org/drawingml/2006/main" xmlns:r="http://schemas.openxmlformats.org/officeDocument/2006/relationships" xmlns:p="http://schemas.openxmlformats.org/presentationml/2006/main">
+  <p:cSld>
+    <p:spTree>
+      <p:nvGrpSpPr>
+        <p:cNvPr id="1" name=""/>
+        <p:cNvGrpSpPr/>
+        <p:nvPr/>
+      </p:nvGrpSpPr>
+      <p:grpSpPr>
+        <a:xfrm>
+          <a:off x="0" y="0"/>
+          <a:ext cx="0" cy="0"/>
+          <a:chOff x="0" y="0"/>
+          <a:chExt cx="0" cy="0"/>
+        </a:xfrm>
+      </p:grpSpPr>
+      <p:sp>
+        <p:nvSpPr>
+          <p:cNvPr id="2" name="Folienbildplatzhalter 1"/>
+          <p:cNvSpPr>
+            <a:spLocks noGrp="1" noRot="1" noChangeAspect="1"/>
+          </p:cNvSpPr>
+          <p:nvPr>
+            <p:ph type="sldImg"/>
+          </p:nvPr>
+        </p:nvSpPr>
+        <p:spPr/>
+      </p:sp>
+      <p:sp>
+        <p:nvSpPr>
+          <p:cNvPr id="3" name="Notizenplatzhalter 2"/>
+          <p:cNvSpPr>
+            <a:spLocks noGrp="1"/>
+          </p:cNvSpPr>
+          <p:nvPr>
+            <p:ph type="body" idx="1"/>
+          </p:nvPr>
+        </p:nvSpPr>
+        <p:spPr/>
+        <p:txBody>
+          <a:bodyPr/>
+          <a:lstStyle/>
+          <a:p>
+            <a:r>
+              <a:rPr lang="de-DE" dirty="0" smtClean="0"/>
+              <a:t>Unterste Ebene sind Key/Value, obere Ebenen besitzen</a:t>
+            </a:r>
+            <a:r>
+              <a:rPr lang="de-DE" baseline="0" dirty="0" smtClean="0"/>
+              <a:t> Gruppierungen</a:t>
+            </a:r>
+          </a:p>
+          <a:p>
+            <a:endParaRPr lang="de-DE" baseline="0" dirty="0" smtClean="0"/>
+          </a:p>
+          <a:p>
+            <a:r>
+              <a:rPr lang="de-DE" baseline="0" dirty="0" smtClean="0"/>
+              <a:t>-&gt; </a:t>
+            </a:r>
+            <a:r>
+              <a:rPr lang="de-DE" baseline="0" dirty="0" err="1" smtClean="0"/>
+              <a:t>HBase</a:t>
+            </a:r>
+            <a:r>
+              <a:rPr lang="de-DE" baseline="0" dirty="0" smtClean="0"/>
+              <a:t>, Cassandra, Amazon </a:t>
+            </a:r>
+            <a:r>
+              <a:rPr lang="de-DE" baseline="0" dirty="0" err="1" smtClean="0"/>
+              <a:t>SimpleDB</a:t>
+            </a:r>
+            <a:endParaRPr lang="de-DE" dirty="0"/>
+          </a:p>
+        </p:txBody>
+      </p:sp>
+      <p:sp>
+        <p:nvSpPr>
+          <p:cNvPr id="4" name="Foliennummernplatzhalter 3"/>
+          <p:cNvSpPr>
+            <a:spLocks noGrp="1"/>
+          </p:cNvSpPr>
+          <p:nvPr>
+            <p:ph type="sldNum" sz="quarter" idx="10"/>
+          </p:nvPr>
+        </p:nvSpPr>
+        <p:spPr/>
+        <p:txBody>
+          <a:bodyPr/>
+          <a:lstStyle/>
+          <a:p>
+            <a:pPr>
+              <a:defRPr/>
+            </a:pPr>
+            <a:fld id="{70C331BD-16AB-4BE2-A12B-855C5D76B38C}" type="slidenum">
+              <a:rPr lang="de-DE" smtClean="0"/>
+              <a:pPr>
+                <a:defRPr/>
+              </a:pPr>
+              <a:t>37</a:t>
+            </a:fld>
+            <a:endParaRPr lang="de-DE"/>
+          </a:p>
+        </p:txBody>
+      </p:sp>
+    </p:spTree>
+    <p:extLst>
+      <p:ext uri="{BB962C8B-B14F-4D97-AF65-F5344CB8AC3E}">
+        <p14:creationId xmlns:p14="http://schemas.microsoft.com/office/powerpoint/2010/main" val="298209940"/>
+      </p:ext>
+    </p:extLst>
+  </p:cSld>
+  <p:clrMapOvr>
+    <a:masterClrMapping/>
+  </p:clrMapOvr>
+</p:notes>
+</file>
+
+<file path=ppt/notesSlides/notesSlide33.xml><?xml version="1.0" encoding="utf-8"?>
+<p:notes xmlns:a="http://schemas.openxmlformats.org/drawingml/2006/main" xmlns:r="http://schemas.openxmlformats.org/officeDocument/2006/relationships" xmlns:p="http://schemas.openxmlformats.org/presentationml/2006/main">
+  <p:cSld>
+    <p:spTree>
+      <p:nvGrpSpPr>
+        <p:cNvPr id="1" name=""/>
+        <p:cNvGrpSpPr/>
+        <p:nvPr/>
+      </p:nvGrpSpPr>
+      <p:grpSpPr>
+        <a:xfrm>
+          <a:off x="0" y="0"/>
+          <a:ext cx="0" cy="0"/>
+          <a:chOff x="0" y="0"/>
+          <a:chExt cx="0" cy="0"/>
+        </a:xfrm>
+      </p:grpSpPr>
+      <p:sp>
+        <p:nvSpPr>
+          <p:cNvPr id="2" name="Folienbildplatzhalter 1"/>
+          <p:cNvSpPr>
+            <a:spLocks noGrp="1" noRot="1" noChangeAspect="1"/>
+          </p:cNvSpPr>
+          <p:nvPr>
+            <p:ph type="sldImg"/>
+          </p:nvPr>
+        </p:nvSpPr>
+        <p:spPr/>
+      </p:sp>
+      <p:sp>
+        <p:nvSpPr>
+          <p:cNvPr id="3" name="Notizenplatzhalter 2"/>
+          <p:cNvSpPr>
+            <a:spLocks noGrp="1"/>
+          </p:cNvSpPr>
+          <p:nvPr>
+            <p:ph type="body" idx="1"/>
+          </p:nvPr>
+        </p:nvSpPr>
+        <p:spPr/>
+        <p:txBody>
+          <a:bodyPr/>
+          <a:lstStyle/>
+          <a:p>
+            <a:r>
+              <a:rPr lang="de-DE" dirty="0" smtClean="0"/>
+              <a:t>Auch ACID konforme</a:t>
+            </a:r>
+            <a:r>
+              <a:rPr lang="de-DE" baseline="0" dirty="0" smtClean="0"/>
+              <a:t> DBs</a:t>
+            </a:r>
+          </a:p>
+        </p:txBody>
+      </p:sp>
+      <p:sp>
+        <p:nvSpPr>
+          <p:cNvPr id="4" name="Foliennummernplatzhalter 3"/>
+          <p:cNvSpPr>
+            <a:spLocks noGrp="1"/>
+          </p:cNvSpPr>
+          <p:nvPr>
+            <p:ph type="sldNum" sz="quarter" idx="10"/>
+          </p:nvPr>
+        </p:nvSpPr>
+        <p:spPr/>
+        <p:txBody>
+          <a:bodyPr/>
+          <a:lstStyle/>
+          <a:p>
+            <a:pPr>
+              <a:defRPr/>
+            </a:pPr>
+            <a:fld id="{70C331BD-16AB-4BE2-A12B-855C5D76B38C}" type="slidenum">
+              <a:rPr lang="de-DE" smtClean="0"/>
+              <a:pPr>
+                <a:defRPr/>
+              </a:pPr>
+              <a:t>38</a:t>
+            </a:fld>
+            <a:endParaRPr lang="de-DE"/>
+          </a:p>
+        </p:txBody>
+      </p:sp>
+    </p:spTree>
+    <p:extLst>
+      <p:ext uri="{BB962C8B-B14F-4D97-AF65-F5344CB8AC3E}">
+        <p14:creationId xmlns:p14="http://schemas.microsoft.com/office/powerpoint/2010/main" val="298209940"/>
+      </p:ext>
+    </p:extLst>
+  </p:cSld>
+  <p:clrMapOvr>
+    <a:masterClrMapping/>
+  </p:clrMapOvr>
+</p:notes>
+</file>
+
+<file path=ppt/notesSlides/notesSlide34.xml><?xml version="1.0" encoding="utf-8"?>
+<p:notes xmlns:a="http://schemas.openxmlformats.org/drawingml/2006/main" xmlns:r="http://schemas.openxmlformats.org/officeDocument/2006/relationships" xmlns:p="http://schemas.openxmlformats.org/presentationml/2006/main">
+  <p:cSld>
+    <p:spTree>
+      <p:nvGrpSpPr>
+        <p:cNvPr id="1" name=""/>
+        <p:cNvGrpSpPr/>
+        <p:nvPr/>
+      </p:nvGrpSpPr>
+      <p:grpSpPr>
+        <a:xfrm>
+          <a:off x="0" y="0"/>
+          <a:ext cx="0" cy="0"/>
+          <a:chOff x="0" y="0"/>
+          <a:chExt cx="0" cy="0"/>
+        </a:xfrm>
+      </p:grpSpPr>
+      <p:sp>
+        <p:nvSpPr>
+          <p:cNvPr id="2" name="Folienbildplatzhalter 1"/>
+          <p:cNvSpPr>
+            <a:spLocks noGrp="1" noRot="1" noChangeAspect="1"/>
+          </p:cNvSpPr>
+          <p:nvPr>
+            <p:ph type="sldImg"/>
+          </p:nvPr>
+        </p:nvSpPr>
+        <p:spPr/>
+      </p:sp>
+      <p:sp>
+        <p:nvSpPr>
+          <p:cNvPr id="3" name="Notizenplatzhalter 2"/>
+          <p:cNvSpPr>
+            <a:spLocks noGrp="1"/>
+          </p:cNvSpPr>
+          <p:nvPr>
+            <p:ph type="body" idx="1"/>
+          </p:nvPr>
+        </p:nvSpPr>
+        <p:spPr/>
+        <p:txBody>
+          <a:bodyPr/>
+          <a:lstStyle/>
+          <a:p>
+            <a:r>
+              <a:rPr lang="de-DE" baseline="0" dirty="0" smtClean="0"/>
+              <a:t>Neo4J, </a:t>
+            </a:r>
+            <a:r>
+              <a:rPr lang="de-DE" baseline="0" dirty="0" err="1" smtClean="0"/>
+              <a:t>FlockDB</a:t>
+            </a:r>
+            <a:endParaRPr lang="de-DE" dirty="0"/>
+          </a:p>
+        </p:txBody>
+      </p:sp>
+      <p:sp>
+        <p:nvSpPr>
+          <p:cNvPr id="4" name="Foliennummernplatzhalter 3"/>
+          <p:cNvSpPr>
+            <a:spLocks noGrp="1"/>
+          </p:cNvSpPr>
+          <p:nvPr>
+            <p:ph type="sldNum" sz="quarter" idx="10"/>
+          </p:nvPr>
+        </p:nvSpPr>
+        <p:spPr/>
+        <p:txBody>
+          <a:bodyPr/>
+          <a:lstStyle/>
+          <a:p>
+            <a:pPr>
+              <a:defRPr/>
+            </a:pPr>
+            <a:fld id="{70C331BD-16AB-4BE2-A12B-855C5D76B38C}" type="slidenum">
+              <a:rPr lang="de-DE" smtClean="0"/>
+              <a:pPr>
+                <a:defRPr/>
+              </a:pPr>
+              <a:t>39</a:t>
+            </a:fld>
+            <a:endParaRPr lang="de-DE"/>
+          </a:p>
+        </p:txBody>
+      </p:sp>
+    </p:spTree>
+    <p:extLst>
+      <p:ext uri="{BB962C8B-B14F-4D97-AF65-F5344CB8AC3E}">
+        <p14:creationId xmlns:p14="http://schemas.microsoft.com/office/powerpoint/2010/main" val="298209940"/>
+      </p:ext>
+    </p:extLst>
+  </p:cSld>
+  <p:clrMapOvr>
+    <a:masterClrMapping/>
+  </p:clrMapOvr>
+</p:notes>
+</file>
+
+<file path=ppt/notesSlides/notesSlide35.xml><?xml version="1.0" encoding="utf-8"?>
+<p:notes xmlns:a="http://schemas.openxmlformats.org/drawingml/2006/main" xmlns:r="http://schemas.openxmlformats.org/officeDocument/2006/relationships" xmlns:p="http://schemas.openxmlformats.org/presentationml/2006/main">
+  <p:cSld>
+    <p:spTree>
+      <p:nvGrpSpPr>
+        <p:cNvPr id="1" name=""/>
+        <p:cNvGrpSpPr/>
+        <p:nvPr/>
+      </p:nvGrpSpPr>
+      <p:grpSpPr>
+        <a:xfrm>
+          <a:off x="0" y="0"/>
+          <a:ext cx="0" cy="0"/>
+          <a:chOff x="0" y="0"/>
+          <a:chExt cx="0" cy="0"/>
+        </a:xfrm>
+      </p:grpSpPr>
+      <p:sp>
+        <p:nvSpPr>
+          <p:cNvPr id="2" name="Folienbildplatzhalter 1"/>
+          <p:cNvSpPr>
+            <a:spLocks noGrp="1" noRot="1" noChangeAspect="1"/>
+          </p:cNvSpPr>
+          <p:nvPr>
+            <p:ph type="sldImg"/>
+          </p:nvPr>
+        </p:nvSpPr>
+        <p:spPr/>
+      </p:sp>
+      <p:sp>
+        <p:nvSpPr>
+          <p:cNvPr id="3" name="Notizenplatzhalter 2"/>
+          <p:cNvSpPr>
+            <a:spLocks noGrp="1"/>
+          </p:cNvSpPr>
+          <p:nvPr>
+            <p:ph type="body" idx="1"/>
+          </p:nvPr>
+        </p:nvSpPr>
+        <p:spPr/>
+        <p:txBody>
+          <a:bodyPr/>
+          <a:lstStyle/>
+          <a:p>
+            <a:r>
+              <a:rPr lang="de-DE" dirty="0" smtClean="0"/>
+              <a:t>Zusammenfassung!</a:t>
+            </a:r>
+          </a:p>
+          <a:p>
+            <a:r>
+              <a:rPr lang="de-DE" dirty="0" smtClean="0"/>
+              <a:t>Wichtigsten </a:t>
+            </a:r>
+            <a:r>
+              <a:rPr lang="de-DE" dirty="0" smtClean="0"/>
+              <a:t>Vertreter stammen von großen Firmen</a:t>
             </a:r>
             <a:endParaRPr lang="de-DE" dirty="0"/>
           </a:p>
@@ -3240,23 +3835,21 @@
           <a:p>
             <a:r>
               <a:rPr lang="de-DE" dirty="0" smtClean="0"/>
-              <a:t>Auch durch Big</a:t>
-            </a:r>
-            <a:r>
-              <a:rPr lang="de-DE" baseline="0" dirty="0" smtClean="0"/>
-              <a:t> Data, Data Mining, </a:t>
-            </a:r>
-            <a:r>
-              <a:rPr lang="de-DE" baseline="0" dirty="0" err="1" smtClean="0"/>
-              <a:t>Social</a:t>
-            </a:r>
-            <a:r>
-              <a:rPr lang="de-DE" baseline="0" dirty="0" smtClean="0"/>
-              <a:t> </a:t>
-            </a:r>
-            <a:r>
-              <a:rPr lang="de-DE" baseline="0" dirty="0" err="1" smtClean="0"/>
-              <a:t>media</a:t>
+              <a:t>Quelle: </a:t>
+            </a:r>
+            <a:r>
+              <a:rPr lang="de-DE" dirty="0" err="1" smtClean="0"/>
+              <a:t>No</a:t>
+            </a:r>
+            <a:r>
+              <a:rPr lang="de-DE" dirty="0" smtClean="0"/>
+              <a:t> SQL Buch</a:t>
+            </a:r>
+          </a:p>
+          <a:p>
+            <a:r>
+              <a:rPr lang="de-DE" dirty="0" smtClean="0"/>
+              <a:t>Nicht alles wird eingehalten</a:t>
             </a:r>
             <a:endParaRPr lang="de-DE" dirty="0"/>
           </a:p>
@@ -3285,7 +3878,7 @@
               <a:pPr>
                 <a:defRPr/>
               </a:pPr>
-              <a:t>10</a:t>
+              <a:t>5</a:t>
             </a:fld>
             <a:endParaRPr lang="de-DE"/>
           </a:p>
@@ -3294,7 +3887,7 @@
     </p:spTree>
     <p:extLst>
       <p:ext uri="{BB962C8B-B14F-4D97-AF65-F5344CB8AC3E}">
-        <p14:creationId xmlns:p14="http://schemas.microsoft.com/office/powerpoint/2010/main" val="1620138720"/>
+        <p14:creationId xmlns:p14="http://schemas.microsoft.com/office/powerpoint/2010/main" val="3730581265"/>
       </p:ext>
     </p:extLst>
   </p:cSld>
@@ -3350,7 +3943,15 @@
           <a:p>
             <a:r>
               <a:rPr lang="de-DE" dirty="0" smtClean="0"/>
-              <a:t>Juni 2011</a:t>
+              <a:t>Evans</a:t>
+            </a:r>
+            <a:r>
+              <a:rPr lang="de-DE" baseline="0" dirty="0" smtClean="0"/>
+              <a:t> ist Softwareentwickler bei der Apache Software </a:t>
+            </a:r>
+            <a:r>
+              <a:rPr lang="de-DE" baseline="0" dirty="0" err="1" smtClean="0"/>
+              <a:t>Foundation</a:t>
             </a:r>
             <a:endParaRPr lang="de-DE" dirty="0"/>
           </a:p>
@@ -3379,7 +3980,7 @@
               <a:pPr>
                 <a:defRPr/>
               </a:pPr>
-              <a:t>11</a:t>
+              <a:t>7</a:t>
             </a:fld>
             <a:endParaRPr lang="de-DE"/>
           </a:p>
@@ -3388,7 +3989,7 @@
     </p:spTree>
     <p:extLst>
       <p:ext uri="{BB962C8B-B14F-4D97-AF65-F5344CB8AC3E}">
-        <p14:creationId xmlns:p14="http://schemas.microsoft.com/office/powerpoint/2010/main" val="3029554680"/>
+        <p14:creationId xmlns:p14="http://schemas.microsoft.com/office/powerpoint/2010/main" val="2017961241"/>
       </p:ext>
     </p:extLst>
   </p:cSld>
@@ -3444,85 +4045,38 @@
           <a:p>
             <a:r>
               <a:rPr lang="de-DE" dirty="0" smtClean="0"/>
-              <a:t>Nutzt MySQL (</a:t>
+              <a:t>DBM: Ken </a:t>
             </a:r>
             <a:r>
               <a:rPr lang="de-DE" dirty="0" err="1" smtClean="0"/>
-              <a:t>NewSQL</a:t>
-            </a:r>
-            <a:r>
-              <a:rPr lang="de-DE" dirty="0" smtClean="0"/>
-              <a:t>), </a:t>
-            </a:r>
-            <a:r>
-              <a:rPr lang="de-DE" dirty="0" err="1" smtClean="0"/>
-              <a:t>Hadoop</a:t>
+              <a:t>Thompsen</a:t>
+            </a:r>
+            <a:endParaRPr lang="de-DE" dirty="0" smtClean="0"/>
+          </a:p>
+          <a:p>
+            <a:r>
+              <a:rPr lang="de-DE" dirty="0" smtClean="0"/>
+              <a:t>Lotus Notes: dokumentorientiert</a:t>
+            </a:r>
+          </a:p>
+          <a:p>
+            <a:r>
+              <a:rPr lang="de-DE" dirty="0" smtClean="0"/>
+              <a:t>GT.M:</a:t>
             </a:r>
             <a:r>
               <a:rPr lang="de-DE" baseline="0" dirty="0" smtClean="0"/>
-              <a:t> und </a:t>
-            </a:r>
+              <a:t> Key/Value</a:t>
+            </a:r>
+          </a:p>
+          <a:p>
             <a:r>
               <a:rPr lang="de-DE" baseline="0" dirty="0" err="1" smtClean="0"/>
-              <a:t>Hbase</a:t>
+              <a:t>BigTable</a:t>
             </a:r>
             <a:r>
               <a:rPr lang="de-DE" baseline="0" dirty="0" smtClean="0"/>
-              <a:t> (2011)</a:t>
-            </a:r>
-          </a:p>
-          <a:p>
-            <a:r>
-              <a:rPr lang="de-DE" baseline="0" dirty="0" err="1" smtClean="0"/>
-              <a:t>Instagramm</a:t>
-            </a:r>
-            <a:r>
-              <a:rPr lang="de-DE" baseline="0" dirty="0" smtClean="0"/>
-              <a:t>, </a:t>
-            </a:r>
-            <a:r>
-              <a:rPr lang="de-DE" baseline="0" dirty="0" err="1" smtClean="0"/>
-              <a:t>Twitter</a:t>
-            </a:r>
-            <a:r>
-              <a:rPr lang="de-DE" baseline="0" dirty="0" smtClean="0"/>
-              <a:t>, </a:t>
-            </a:r>
-            <a:r>
-              <a:rPr lang="de-DE" baseline="0" dirty="0" err="1" smtClean="0"/>
-              <a:t>Tumblr</a:t>
-            </a:r>
-            <a:r>
-              <a:rPr lang="de-DE" baseline="0" dirty="0" smtClean="0"/>
-              <a:t>, Amazon, </a:t>
-            </a:r>
-            <a:r>
-              <a:rPr lang="de-DE" baseline="0" dirty="0" err="1" smtClean="0"/>
-              <a:t>Ebay</a:t>
-            </a:r>
-            <a:r>
-              <a:rPr lang="de-DE" baseline="0" dirty="0" smtClean="0"/>
-              <a:t>, Google, </a:t>
-            </a:r>
-            <a:r>
-              <a:rPr lang="de-DE" baseline="0" dirty="0" err="1" smtClean="0"/>
-              <a:t>Flickr</a:t>
-            </a:r>
-            <a:r>
-              <a:rPr lang="de-DE" baseline="0" dirty="0" smtClean="0"/>
-              <a:t>, </a:t>
-            </a:r>
-            <a:r>
-              <a:rPr lang="de-DE" baseline="0" dirty="0" err="1" smtClean="0"/>
-              <a:t>Cern</a:t>
-            </a:r>
-            <a:r>
-              <a:rPr lang="de-DE" baseline="0" dirty="0" smtClean="0"/>
-              <a:t>, Wikipedia, … nutzen </a:t>
-            </a:r>
-            <a:r>
-              <a:rPr lang="de-DE" baseline="0" dirty="0" err="1" smtClean="0"/>
-              <a:t>NoSQL</a:t>
+              <a:t>: Nur Paper veröffentlicht; siehe Kategorisierung</a:t>
             </a:r>
             <a:endParaRPr lang="de-DE" dirty="0"/>
           </a:p>
@@ -3551,7 +4105,7 @@
               <a:pPr>
                 <a:defRPr/>
               </a:pPr>
-              <a:t>12</a:t>
+              <a:t>8</a:t>
             </a:fld>
             <a:endParaRPr lang="de-DE"/>
           </a:p>
@@ -3560,7 +4114,7 @@
     </p:spTree>
     <p:extLst>
       <p:ext uri="{BB962C8B-B14F-4D97-AF65-F5344CB8AC3E}">
-        <p14:creationId xmlns:p14="http://schemas.microsoft.com/office/powerpoint/2010/main" val="828864482"/>
+        <p14:creationId xmlns:p14="http://schemas.microsoft.com/office/powerpoint/2010/main" val="634685221"/>
       </p:ext>
     </p:extLst>
   </p:cSld>
@@ -3616,7 +4170,7 @@
           <a:p>
             <a:r>
               <a:rPr lang="de-DE" dirty="0" smtClean="0"/>
-              <a:t>Juni 2011</a:t>
+              <a:t>Zusammenfassung!</a:t>
             </a:r>
             <a:endParaRPr lang="de-DE" dirty="0"/>
           </a:p>
@@ -3645,7 +4199,7 @@
               <a:pPr>
                 <a:defRPr/>
               </a:pPr>
-              <a:t>13</a:t>
+              <a:t>9</a:t>
             </a:fld>
             <a:endParaRPr lang="de-DE"/>
           </a:p>
@@ -3654,7 +4208,7 @@
     </p:spTree>
     <p:extLst>
       <p:ext uri="{BB962C8B-B14F-4D97-AF65-F5344CB8AC3E}">
-        <p14:creationId xmlns:p14="http://schemas.microsoft.com/office/powerpoint/2010/main" val="3029554680"/>
+        <p14:creationId xmlns:p14="http://schemas.microsoft.com/office/powerpoint/2010/main" val="1814896345"/>
       </p:ext>
     </p:extLst>
   </p:cSld>
@@ -3710,17 +4264,23 @@
           <a:p>
             <a:r>
               <a:rPr lang="de-DE" dirty="0" smtClean="0"/>
-              <a:t>Bekannte Konzepte</a:t>
-            </a:r>
-          </a:p>
-          <a:p>
-            <a:r>
-              <a:rPr lang="de-DE" dirty="0" smtClean="0"/>
-              <a:t>Nicht</a:t>
+              <a:t>Auch durch Big</a:t>
             </a:r>
             <a:r>
               <a:rPr lang="de-DE" baseline="0" dirty="0" smtClean="0"/>
-              <a:t> von alles Systemen verwendet</a:t>
+              <a:t> Data, Data Mining, </a:t>
+            </a:r>
+            <a:r>
+              <a:rPr lang="de-DE" baseline="0" dirty="0" err="1" smtClean="0"/>
+              <a:t>Social</a:t>
+            </a:r>
+            <a:r>
+              <a:rPr lang="de-DE" baseline="0" dirty="0" smtClean="0"/>
+              <a:t> </a:t>
+            </a:r>
+            <a:r>
+              <a:rPr lang="de-DE" baseline="0" dirty="0" err="1" smtClean="0"/>
+              <a:t>media</a:t>
             </a:r>
             <a:endParaRPr lang="de-DE" dirty="0"/>
           </a:p>
@@ -3749,7 +4309,7 @@
               <a:pPr>
                 <a:defRPr/>
               </a:pPr>
-              <a:t>14</a:t>
+              <a:t>10</a:t>
             </a:fld>
             <a:endParaRPr lang="de-DE"/>
           </a:p>
@@ -3758,7 +4318,7 @@
     </p:spTree>
     <p:extLst>
       <p:ext uri="{BB962C8B-B14F-4D97-AF65-F5344CB8AC3E}">
-        <p14:creationId xmlns:p14="http://schemas.microsoft.com/office/powerpoint/2010/main" val="2825982645"/>
+        <p14:creationId xmlns:p14="http://schemas.microsoft.com/office/powerpoint/2010/main" val="1620138720"/>
       </p:ext>
     </p:extLst>
   </p:cSld>
@@ -3814,7 +4374,19 @@
           <a:p>
             <a:r>
               <a:rPr lang="de-DE" dirty="0" smtClean="0"/>
-              <a:t>Framework</a:t>
+              <a:t>Juni 2011</a:t>
+            </a:r>
+          </a:p>
+          <a:p>
+            <a:r>
+              <a:rPr lang="de-DE" dirty="0" smtClean="0"/>
+              <a:t>Neue Technologien/Frameworks</a:t>
+            </a:r>
+          </a:p>
+          <a:p>
+            <a:r>
+              <a:rPr lang="de-DE" dirty="0" smtClean="0"/>
+              <a:t>Große heterogene Datenmengen</a:t>
             </a:r>
             <a:endParaRPr lang="de-DE" dirty="0"/>
           </a:p>
@@ -3843,7 +4415,7 @@
               <a:pPr>
                 <a:defRPr/>
               </a:pPr>
-              <a:t>15</a:t>
+              <a:t>11</a:t>
             </a:fld>
             <a:endParaRPr lang="de-DE"/>
           </a:p>
@@ -3852,7 +4424,7 @@
     </p:spTree>
     <p:extLst>
       <p:ext uri="{BB962C8B-B14F-4D97-AF65-F5344CB8AC3E}">
-        <p14:creationId xmlns:p14="http://schemas.microsoft.com/office/powerpoint/2010/main" val="2020317614"/>
+        <p14:creationId xmlns:p14="http://schemas.microsoft.com/office/powerpoint/2010/main" val="3029554680"/>
       </p:ext>
     </p:extLst>
   </p:cSld>
@@ -5157,7 +5729,7 @@
                 </a:solidFill>
                 <a:ea typeface="ＭＳ Ｐゴシック" pitchFamily="34" charset="-128"/>
               </a:rPr>
-              <a:t>07.06.2013</a:t>
+              <a:t>09.06.2013</a:t>
             </a:fld>
             <a:endParaRPr lang="de-DE" sz="1000" dirty="0">
               <a:solidFill>
@@ -6662,6 +7234,13 @@
   <p:clrMapOvr>
     <a:masterClrMapping/>
   </p:clrMapOvr>
+  <p:timing>
+    <p:tnLst>
+      <p:par>
+        <p:cTn id="1" dur="indefinite" restart="never" nodeType="tmRoot"/>
+      </p:par>
+    </p:tnLst>
+  </p:timing>
 </p:sld>
 </file>
 
@@ -7063,6 +7642,13 @@
   <p:clrMapOvr>
     <a:masterClrMapping/>
   </p:clrMapOvr>
+  <p:timing>
+    <p:tnLst>
+      <p:par>
+        <p:cTn id="1" dur="indefinite" restart="never" nodeType="tmRoot"/>
+      </p:par>
+    </p:tnLst>
+  </p:timing>
 </p:sld>
 </file>
 
@@ -7241,6 +7827,13 @@
   <p:clrMapOvr>
     <a:masterClrMapping/>
   </p:clrMapOvr>
+  <p:timing>
+    <p:tnLst>
+      <p:par>
+        <p:cTn id="1" dur="indefinite" restart="never" nodeType="tmRoot"/>
+      </p:par>
+    </p:tnLst>
+  </p:timing>
 </p:sld>
 </file>
 
@@ -7314,11 +7907,7 @@
             </a:pPr>
             <a:r>
               <a:rPr lang="de-DE" dirty="0" smtClean="0"/>
-              <a:t>Für </a:t>
-            </a:r>
-            <a:r>
-              <a:rPr lang="de-DE" dirty="0" smtClean="0"/>
-              <a:t>Datenbanksysteme 2004 durch </a:t>
+              <a:t>Für Datenbanksysteme 2004 durch </a:t>
             </a:r>
             <a:r>
               <a:rPr lang="en-US" dirty="0"/>
@@ -7454,6 +8043,13 @@
   <p:clrMapOvr>
     <a:masterClrMapping/>
   </p:clrMapOvr>
+  <p:timing>
+    <p:tnLst>
+      <p:par>
+        <p:cTn id="1" dur="indefinite" restart="never" nodeType="tmRoot"/>
+      </p:par>
+    </p:tnLst>
+  </p:timing>
 </p:sld>
 </file>
 
@@ -7514,7 +8110,7 @@
             </a:r>
             <a:r>
               <a:rPr lang="de-DE" dirty="0" smtClean="0"/>
-              <a:t>große Datenmenge</a:t>
+              <a:t>große Datenmengen</a:t>
             </a:r>
           </a:p>
           <a:p>
@@ -7669,6 +8265,13 @@
   <p:clrMapOvr>
     <a:masterClrMapping/>
   </p:clrMapOvr>
+  <p:timing>
+    <p:tnLst>
+      <p:par>
+        <p:cTn id="1" dur="indefinite" restart="never" nodeType="tmRoot"/>
+      </p:par>
+    </p:tnLst>
+  </p:timing>
 </p:sld>
 </file>
 
@@ -7805,6 +8408,13 @@
   <p:clrMapOvr>
     <a:masterClrMapping/>
   </p:clrMapOvr>
+  <p:timing>
+    <p:tnLst>
+      <p:par>
+        <p:cTn id="1" dur="indefinite" restart="never" nodeType="tmRoot"/>
+      </p:par>
+    </p:tnLst>
+  </p:timing>
 </p:sld>
 </file>
 
@@ -8005,6 +8615,13 @@
   <p:clrMapOvr>
     <a:masterClrMapping/>
   </p:clrMapOvr>
+  <p:timing>
+    <p:tnLst>
+      <p:par>
+        <p:cTn id="1" dur="indefinite" restart="never" nodeType="tmRoot"/>
+      </p:par>
+    </p:tnLst>
+  </p:timing>
 </p:sld>
 </file>
 
@@ -8162,6 +8779,13 @@
   <p:clrMapOvr>
     <a:masterClrMapping/>
   </p:clrMapOvr>
+  <p:timing>
+    <p:tnLst>
+      <p:par>
+        <p:cTn id="1" dur="indefinite" restart="never" nodeType="tmRoot"/>
+      </p:par>
+    </p:tnLst>
+  </p:timing>
 </p:sld>
 </file>
 
@@ -8523,6 +9147,13 @@
   <p:clrMapOvr>
     <a:masterClrMapping/>
   </p:clrMapOvr>
+  <p:timing>
+    <p:tnLst>
+      <p:par>
+        <p:cTn id="1" dur="indefinite" restart="never" nodeType="tmRoot"/>
+      </p:par>
+    </p:tnLst>
+  </p:timing>
 </p:sld>
 </file>
 
@@ -8688,47 +9319,63 @@
           </a:p>
         </p:txBody>
       </p:sp>
-      <p:pic>
-        <p:nvPicPr>
-          <p:cNvPr id="5122" name="Picture 2" descr="C:\Users\TBoonX\Studium\Master\2. Semester\OS-Datenbanken\Abbildungen\CAP.png"/>
-          <p:cNvPicPr>
-            <a:picLocks noChangeAspect="1" noChangeArrowheads="1"/>
-          </p:cNvPicPr>
-          <p:nvPr/>
-        </p:nvPicPr>
-        <p:blipFill>
-          <a:blip r:embed="rId3">
-            <a:extLst>
-              <a:ext uri="{28A0092B-C50C-407E-A947-70E740481C1C}">
-                <a14:useLocalDpi xmlns:a14="http://schemas.microsoft.com/office/drawing/2010/main" val="0"/>
-              </a:ext>
-            </a:extLst>
-          </a:blip>
-          <a:srcRect/>
-          <a:stretch>
-            <a:fillRect/>
-          </a:stretch>
-        </p:blipFill>
-        <p:spPr bwMode="auto">
-          <a:xfrm>
-            <a:off x="2984768" y="1412775"/>
-            <a:ext cx="3600400" cy="3854703"/>
-          </a:xfrm>
-          <a:prstGeom prst="rect">
-            <a:avLst/>
-          </a:prstGeom>
-          <a:noFill/>
-          <a:extLst>
-            <a:ext uri="{909E8E84-426E-40DD-AFC4-6F175D3DCCD1}">
-              <a14:hiddenFill xmlns:a14="http://schemas.microsoft.com/office/drawing/2010/main">
-                <a:solidFill>
-                  <a:srgbClr val="FFFFFF"/>
-                </a:solidFill>
-              </a14:hiddenFill>
-            </a:ext>
-          </a:extLst>
-        </p:spPr>
-      </p:pic>
+      <p:graphicFrame>
+        <p:nvGraphicFramePr>
+          <p:cNvPr id="2" name="Objekt 1"/>
+          <p:cNvGraphicFramePr>
+            <a:graphicFrameLocks noChangeAspect="1"/>
+          </p:cNvGraphicFramePr>
+          <p:nvPr>
+            <p:extLst>
+              <p:ext uri="{D42A27DB-BD31-4B8C-83A1-F6EECF244321}">
+                <p14:modId xmlns:p14="http://schemas.microsoft.com/office/powerpoint/2010/main" val="1383089769"/>
+              </p:ext>
+            </p:extLst>
+          </p:nvPr>
+        </p:nvGraphicFramePr>
+        <p:xfrm>
+          <a:off x="2627784" y="1196752"/>
+          <a:ext cx="4273203" cy="4555988"/>
+        </p:xfrm>
+        <a:graphic>
+          <a:graphicData uri="http://schemas.openxmlformats.org/presentationml/2006/ole">
+            <mc:AlternateContent xmlns:mc="http://schemas.openxmlformats.org/markup-compatibility/2006">
+              <mc:Choice xmlns:v="urn:schemas-microsoft-com:vml" Requires="v">
+                <p:oleObj spid="_x0000_s7190" name="Visio" r:id="rId4" imgW="2590800" imgH="2762340" progId="Visio.Drawing.15">
+                  <p:embed/>
+                </p:oleObj>
+              </mc:Choice>
+              <mc:Fallback>
+                <p:oleObj name="Visio" r:id="rId4" imgW="2590800" imgH="2762340" progId="Visio.Drawing.15">
+                  <p:embed/>
+                  <p:pic>
+                    <p:nvPicPr>
+                      <p:cNvPr id="0" name=""/>
+                      <p:cNvPicPr/>
+                      <p:nvPr/>
+                    </p:nvPicPr>
+                    <p:blipFill>
+                      <a:blip r:embed="rId5"/>
+                      <a:stretch>
+                        <a:fillRect/>
+                      </a:stretch>
+                    </p:blipFill>
+                    <p:spPr>
+                      <a:xfrm>
+                        <a:off x="2627784" y="1196752"/>
+                        <a:ext cx="4273203" cy="4555988"/>
+                      </a:xfrm>
+                      <a:prstGeom prst="rect">
+                        <a:avLst/>
+                      </a:prstGeom>
+                    </p:spPr>
+                  </p:pic>
+                </p:oleObj>
+              </mc:Fallback>
+            </mc:AlternateContent>
+          </a:graphicData>
+        </a:graphic>
+      </p:graphicFrame>
     </p:spTree>
     <p:extLst>
       <p:ext uri="{BB962C8B-B14F-4D97-AF65-F5344CB8AC3E}">
@@ -8914,6 +9561,13 @@
   <p:clrMapOvr>
     <a:masterClrMapping/>
   </p:clrMapOvr>
+  <p:timing>
+    <p:tnLst>
+      <p:par>
+        <p:cTn id="1" dur="indefinite" restart="never" nodeType="tmRoot"/>
+      </p:par>
+    </p:tnLst>
+  </p:timing>
 </p:sld>
 </file>
 
@@ -8979,7 +9633,10 @@
             <a:pPr marL="0" indent="0">
               <a:buNone/>
             </a:pPr>
-            <a:endParaRPr lang="de-DE" dirty="0" smtClean="0"/>
+            <a:r>
+              <a:rPr lang="de-DE" dirty="0" smtClean="0"/>
+              <a:t>BASE:</a:t>
+            </a:r>
           </a:p>
           <a:p>
             <a:pPr marL="0" indent="0">
@@ -8987,24 +9644,48 @@
             </a:pPr>
             <a:r>
               <a:rPr lang="de-DE" dirty="0" smtClean="0"/>
-              <a:t>Lockerer </a:t>
-            </a:r>
-            <a:r>
-              <a:rPr lang="de-DE" dirty="0"/>
-              <a:t>Konsistenzbegriff</a:t>
+              <a:t>Lockerer Konsistenzbegriff</a:t>
             </a:r>
           </a:p>
           <a:p>
             <a:pPr marL="0" indent="0">
               <a:buNone/>
             </a:pPr>
-            <a:endParaRPr lang="de-DE" dirty="0"/>
+            <a:endParaRPr lang="de-DE" dirty="0" smtClean="0"/>
           </a:p>
           <a:p>
             <a:pPr marL="0" indent="0">
               <a:buNone/>
             </a:pPr>
             <a:r>
+              <a:rPr lang="de-DE" dirty="0" smtClean="0"/>
+              <a:t>Gegeben: Verteilte Daten + Synchronisation</a:t>
+            </a:r>
+          </a:p>
+          <a:p>
+            <a:pPr marL="0" indent="0">
+              <a:buNone/>
+            </a:pPr>
+            <a:r>
+              <a:rPr lang="de-DE" dirty="0" smtClean="0"/>
+              <a:t>   →	Nodes besitzen unterschiedliche Daten oder 	</a:t>
+            </a:r>
+            <a:r>
+              <a:rPr lang="de-DE" dirty="0"/>
+              <a:t>Datenversionen</a:t>
+            </a:r>
+          </a:p>
+          <a:p>
+            <a:pPr marL="0" indent="0">
+              <a:buNone/>
+            </a:pPr>
+            <a:endParaRPr lang="de-DE" dirty="0"/>
+          </a:p>
+          <a:p>
+            <a:pPr marL="0" indent="0">
+              <a:buNone/>
+            </a:pPr>
+            <a:r>
               <a:rPr lang="de-DE" dirty="0" err="1"/>
               <a:t>Inconsistence-Window</a:t>
             </a:r>
@@ -9017,31 +9698,6 @@
             <a:pPr marL="0" indent="0">
               <a:buNone/>
             </a:pPr>
-            <a:endParaRPr lang="de-DE" dirty="0" smtClean="0"/>
-          </a:p>
-          <a:p>
-            <a:pPr marL="0" indent="0">
-              <a:buNone/>
-            </a:pPr>
-            <a:endParaRPr lang="de-DE" dirty="0" smtClean="0"/>
-          </a:p>
-          <a:p>
-            <a:pPr marL="0" indent="0">
-              <a:buNone/>
-            </a:pPr>
-            <a:r>
-              <a:rPr lang="de-DE" dirty="0" smtClean="0"/>
-              <a:t>Verteilte Daten + Synchronisation</a:t>
-            </a:r>
-          </a:p>
-          <a:p>
-            <a:pPr marL="0" indent="0">
-              <a:buNone/>
-            </a:pPr>
-            <a:r>
-              <a:rPr lang="de-DE" dirty="0" smtClean="0"/>
-              <a:t>   →	Nodes besitzen unterschiedliche Daten oder 	Datenversionen</a:t>
-            </a:r>
             <a:endParaRPr lang="de-DE" dirty="0"/>
           </a:p>
         </p:txBody>
@@ -9079,6 +9735,13 @@
   <p:clrMapOvr>
     <a:masterClrMapping/>
   </p:clrMapOvr>
+  <p:timing>
+    <p:tnLst>
+      <p:par>
+        <p:cTn id="1" dur="indefinite" restart="never" nodeType="tmRoot"/>
+      </p:par>
+    </p:tnLst>
+  </p:timing>
 </p:sld>
 </file>
 
@@ -9254,6 +9917,13 @@
   <p:clrMapOvr>
     <a:masterClrMapping/>
   </p:clrMapOvr>
+  <p:timing>
+    <p:tnLst>
+      <p:par>
+        <p:cTn id="1" dur="indefinite" restart="never" nodeType="tmRoot"/>
+      </p:par>
+    </p:tnLst>
+  </p:timing>
 </p:sld>
 </file>
 
@@ -9310,7 +9980,7 @@
           <p:nvPr/>
         </p:nvPicPr>
         <p:blipFill>
-          <a:blip r:embed="rId2">
+          <a:blip r:embed="rId3">
             <a:extLst>
               <a:ext uri="{28A0092B-C50C-407E-A947-70E740481C1C}">
                 <a14:useLocalDpi xmlns:a14="http://schemas.microsoft.com/office/drawing/2010/main" val="0"/>
@@ -9381,6 +10051,13 @@
   <p:clrMapOvr>
     <a:masterClrMapping/>
   </p:clrMapOvr>
+  <p:timing>
+    <p:tnLst>
+      <p:par>
+        <p:cTn id="1" dur="indefinite" restart="never" nodeType="tmRoot"/>
+      </p:par>
+    </p:tnLst>
+  </p:timing>
 </p:sld>
 </file>
 
@@ -9495,6 +10172,13 @@
   <p:clrMapOvr>
     <a:masterClrMapping/>
   </p:clrMapOvr>
+  <p:timing>
+    <p:tnLst>
+      <p:par>
+        <p:cTn id="1" dur="indefinite" restart="never" nodeType="tmRoot"/>
+      </p:par>
+    </p:tnLst>
+  </p:timing>
 </p:sld>
 </file>
 
@@ -9648,6 +10332,13 @@
   <p:clrMapOvr>
     <a:masterClrMapping/>
   </p:clrMapOvr>
+  <p:timing>
+    <p:tnLst>
+      <p:par>
+        <p:cTn id="1" dur="indefinite" restart="never" nodeType="tmRoot"/>
+      </p:par>
+    </p:tnLst>
+  </p:timing>
 </p:sld>
 </file>
 
@@ -9784,6 +10475,13 @@
   <p:clrMapOvr>
     <a:masterClrMapping/>
   </p:clrMapOvr>
+  <p:timing>
+    <p:tnLst>
+      <p:par>
+        <p:cTn id="1" dur="indefinite" restart="never" nodeType="tmRoot"/>
+      </p:par>
+    </p:tnLst>
+  </p:timing>
 </p:sld>
 </file>
 
@@ -9854,7 +10552,7 @@
           <p:nvPr/>
         </p:nvPicPr>
         <p:blipFill>
-          <a:blip r:embed="rId2">
+          <a:blip r:embed="rId3">
             <a:extLst>
               <a:ext uri="{28A0092B-C50C-407E-A947-70E740481C1C}">
                 <a14:useLocalDpi xmlns:a14="http://schemas.microsoft.com/office/drawing/2010/main" val="0"/>
@@ -10107,6 +10805,13 @@
   <p:clrMapOvr>
     <a:masterClrMapping/>
   </p:clrMapOvr>
+  <p:timing>
+    <p:tnLst>
+      <p:par>
+        <p:cTn id="1" dur="indefinite" restart="never" nodeType="tmRoot"/>
+      </p:par>
+    </p:tnLst>
+  </p:timing>
 </p:sld>
 </file>
 
@@ -10428,7 +11133,7 @@
           <a:graphicData uri="http://schemas.openxmlformats.org/presentationml/2006/ole">
             <mc:AlternateContent xmlns:mc="http://schemas.openxmlformats.org/markup-compatibility/2006">
               <mc:Choice xmlns:v="urn:schemas-microsoft-com:vml" Requires="v">
-                <p:oleObj spid="_x0000_s4108" name="Visio" r:id="rId4" imgW="1476443" imgH="2819490" progId="Visio.Drawing.15">
+                <p:oleObj spid="_x0000_s4129" name="Visio" r:id="rId4" imgW="1476443" imgH="2819490" progId="Visio.Drawing.15">
                   <p:embed/>
                 </p:oleObj>
               </mc:Choice>
@@ -10790,7 +11495,7 @@
           <a:graphicData uri="http://schemas.openxmlformats.org/presentationml/2006/ole">
             <mc:AlternateContent xmlns:mc="http://schemas.openxmlformats.org/markup-compatibility/2006">
               <mc:Choice xmlns:v="urn:schemas-microsoft-com:vml" Requires="v">
-                <p:oleObj spid="_x0000_s5131" name="Visio" r:id="rId4" imgW="1371600" imgH="2819490" progId="Visio.Drawing.15">
+                <p:oleObj spid="_x0000_s5152" name="Visio" r:id="rId4" imgW="1371600" imgH="2819490" progId="Visio.Drawing.15">
                   <p:embed/>
                 </p:oleObj>
               </mc:Choice>
@@ -10905,22 +11610,56 @@
             </a:pPr>
             <a:r>
               <a:rPr lang="de-DE" dirty="0" smtClean="0"/>
-              <a:t>Attribute werden je in einer eigenen Tabelle hintereinander abgelegt</a:t>
+              <a:t>Attribute werden je in einer eigenen Tabelle hintereinander abgelegt (Anzahl ist beliebig)</a:t>
             </a:r>
           </a:p>
           <a:p>
             <a:pPr marL="0" indent="0">
               <a:buNone/>
             </a:pPr>
-            <a:endParaRPr lang="de-DE" dirty="0"/>
+            <a:endParaRPr lang="de-DE" dirty="0" smtClean="0"/>
           </a:p>
           <a:p>
             <a:pPr marL="0" indent="0">
               <a:buNone/>
             </a:pPr>
             <a:r>
-              <a:rPr lang="de-DE" dirty="0" smtClean="0"/>
+              <a:rPr lang="de-DE" dirty="0"/>
               <a:t>Bsp.:</a:t>
+            </a:r>
+            <a:endParaRPr lang="de-DE" dirty="0" smtClean="0"/>
+          </a:p>
+          <a:p>
+            <a:pPr marL="0" indent="0">
+              <a:buNone/>
+            </a:pPr>
+            <a:r>
+              <a:rPr lang="de-DE" dirty="0" smtClean="0"/>
+              <a:t>Attribute: </a:t>
+            </a:r>
+            <a:r>
+              <a:rPr lang="de-DE" dirty="0" err="1" smtClean="0"/>
+              <a:t>Id</a:t>
+            </a:r>
+            <a:r>
+              <a:rPr lang="de-DE" dirty="0" smtClean="0"/>
+              <a:t>, Name, Alter</a:t>
+            </a:r>
+            <a:endParaRPr lang="de-DE" dirty="0"/>
+          </a:p>
+          <a:p>
+            <a:pPr marL="0" indent="0">
+              <a:buNone/>
+            </a:pPr>
+            <a:endParaRPr lang="de-DE" dirty="0"/>
+          </a:p>
+          <a:p>
+            <a:pPr marL="0" indent="0">
+              <a:buNone/>
+            </a:pPr>
+            <a:r>
+              <a:rPr lang="de-DE" dirty="0" smtClean="0"/>
+              <a:t>Ablage:</a:t>
             </a:r>
             <a:r>
               <a:rPr lang="de-DE" dirty="0"/>
@@ -11635,7 +12374,7 @@
           <a:graphicData uri="http://schemas.openxmlformats.org/presentationml/2006/ole">
             <mc:AlternateContent xmlns:mc="http://schemas.openxmlformats.org/markup-compatibility/2006">
               <mc:Choice xmlns:v="urn:schemas-microsoft-com:vml" Requires="v">
-                <p:oleObj spid="_x0000_s6155" name="Visio" r:id="rId4" imgW="5152957" imgH="3257550" progId="Visio.Drawing.15">
+                <p:oleObj spid="_x0000_s6177" name="Visio" r:id="rId4" imgW="5152957" imgH="3257550" progId="Visio.Drawing.15">
                   <p:embed/>
                 </p:oleObj>
               </mc:Choice>
@@ -11935,7 +12674,7 @@
           <p:nvPr/>
         </p:nvPicPr>
         <p:blipFill>
-          <a:blip r:embed="rId2" cstate="print">
+          <a:blip r:embed="rId3" cstate="print">
             <a:extLst>
               <a:ext uri="{28A0092B-C50C-407E-A947-70E740481C1C}">
                 <a14:useLocalDpi xmlns:a14="http://schemas.microsoft.com/office/drawing/2010/main" val="0"/>
@@ -11976,7 +12715,7 @@
           <p:nvPr/>
         </p:nvPicPr>
         <p:blipFill>
-          <a:blip r:embed="rId3" cstate="print">
+          <a:blip r:embed="rId4" cstate="print">
             <a:extLst>
               <a:ext uri="{28A0092B-C50C-407E-A947-70E740481C1C}">
                 <a14:useLocalDpi xmlns:a14="http://schemas.microsoft.com/office/drawing/2010/main" val="0"/>
@@ -12017,7 +12756,7 @@
           <p:nvPr/>
         </p:nvPicPr>
         <p:blipFill>
-          <a:blip r:embed="rId4">
+          <a:blip r:embed="rId5">
             <a:extLst>
               <a:ext uri="{28A0092B-C50C-407E-A947-70E740481C1C}">
                 <a14:useLocalDpi xmlns:a14="http://schemas.microsoft.com/office/drawing/2010/main" val="0"/>
@@ -12058,7 +12797,7 @@
           <p:nvPr/>
         </p:nvPicPr>
         <p:blipFill>
-          <a:blip r:embed="rId5" cstate="print">
+          <a:blip r:embed="rId6" cstate="print">
             <a:extLst>
               <a:ext uri="{28A0092B-C50C-407E-A947-70E740481C1C}">
                 <a14:useLocalDpi xmlns:a14="http://schemas.microsoft.com/office/drawing/2010/main" val="0"/>
@@ -12099,7 +12838,7 @@
           <p:nvPr/>
         </p:nvPicPr>
         <p:blipFill>
-          <a:blip r:embed="rId6" cstate="print">
+          <a:blip r:embed="rId7" cstate="print">
             <a:extLst>
               <a:ext uri="{28A0092B-C50C-407E-A947-70E740481C1C}">
                 <a14:useLocalDpi xmlns:a14="http://schemas.microsoft.com/office/drawing/2010/main" val="0"/>
@@ -12140,7 +12879,7 @@
           <p:nvPr/>
         </p:nvPicPr>
         <p:blipFill>
-          <a:blip r:embed="rId7" cstate="print">
+          <a:blip r:embed="rId8" cstate="print">
             <a:extLst>
               <a:ext uri="{28A0092B-C50C-407E-A947-70E740481C1C}">
                 <a14:useLocalDpi xmlns:a14="http://schemas.microsoft.com/office/drawing/2010/main" val="0"/>
@@ -12181,7 +12920,7 @@
           <p:nvPr/>
         </p:nvPicPr>
         <p:blipFill>
-          <a:blip r:embed="rId8">
+          <a:blip r:embed="rId9">
             <a:extLst>
               <a:ext uri="{28A0092B-C50C-407E-A947-70E740481C1C}">
                 <a14:useLocalDpi xmlns:a14="http://schemas.microsoft.com/office/drawing/2010/main" val="0"/>
@@ -12222,7 +12961,7 @@
           <p:nvPr/>
         </p:nvPicPr>
         <p:blipFill>
-          <a:blip r:embed="rId9" cstate="print">
+          <a:blip r:embed="rId10" cstate="print">
             <a:extLst>
               <a:ext uri="{28A0092B-C50C-407E-A947-70E740481C1C}">
                 <a14:useLocalDpi xmlns:a14="http://schemas.microsoft.com/office/drawing/2010/main" val="0"/>
@@ -12263,7 +13002,7 @@
           <p:nvPr/>
         </p:nvPicPr>
         <p:blipFill>
-          <a:blip r:embed="rId10" cstate="print">
+          <a:blip r:embed="rId11" cstate="print">
             <a:extLst>
               <a:ext uri="{28A0092B-C50C-407E-A947-70E740481C1C}">
                 <a14:useLocalDpi xmlns:a14="http://schemas.microsoft.com/office/drawing/2010/main" val="0"/>
@@ -12304,7 +13043,7 @@
           <p:nvPr/>
         </p:nvPicPr>
         <p:blipFill>
-          <a:blip r:embed="rId11" cstate="print">
+          <a:blip r:embed="rId12" cstate="print">
             <a:extLst>
               <a:ext uri="{28A0092B-C50C-407E-A947-70E740481C1C}">
                 <a14:useLocalDpi xmlns:a14="http://schemas.microsoft.com/office/drawing/2010/main" val="0"/>
@@ -12345,7 +13084,7 @@
           <p:nvPr/>
         </p:nvPicPr>
         <p:blipFill>
-          <a:blip r:embed="rId12">
+          <a:blip r:embed="rId13">
             <a:extLst>
               <a:ext uri="{28A0092B-C50C-407E-A947-70E740481C1C}">
                 <a14:useLocalDpi xmlns:a14="http://schemas.microsoft.com/office/drawing/2010/main" val="0"/>
@@ -12386,7 +13125,7 @@
           <p:nvPr/>
         </p:nvPicPr>
         <p:blipFill>
-          <a:blip r:embed="rId13" cstate="print">
+          <a:blip r:embed="rId14" cstate="print">
             <a:extLst>
               <a:ext uri="{28A0092B-C50C-407E-A947-70E740481C1C}">
                 <a14:useLocalDpi xmlns:a14="http://schemas.microsoft.com/office/drawing/2010/main" val="0"/>
@@ -12427,7 +13166,7 @@
           <p:nvPr/>
         </p:nvPicPr>
         <p:blipFill>
-          <a:blip r:embed="rId14">
+          <a:blip r:embed="rId15">
             <a:extLst>
               <a:ext uri="{28A0092B-C50C-407E-A947-70E740481C1C}">
                 <a14:useLocalDpi xmlns:a14="http://schemas.microsoft.com/office/drawing/2010/main" val="0"/>
@@ -12705,13 +13444,8 @@
             </a:r>
             <a:r>
               <a:rPr lang="de-DE" dirty="0" smtClean="0"/>
-              <a:t>, </a:t>
-            </a:r>
-            <a:r>
-              <a:rPr lang="de-DE" dirty="0" smtClean="0"/>
-              <a:t>Bachelorarbeit, 2011, Hochschule für Angewandte Wissenschaften Hamburg</a:t>
-            </a:r>
-            <a:endParaRPr lang="de-DE" dirty="0" smtClean="0"/>
+              <a:t>, Bachelorarbeit, 2011, Hochschule für Angewandte Wissenschaften Hamburg</a:t>
+            </a:r>
           </a:p>
           <a:p>
             <a:r>
@@ -12720,15 +13454,7 @@
             </a:r>
             <a:r>
               <a:rPr lang="de-DE" dirty="0" smtClean="0"/>
-              <a:t>-Datenbanken, Philipp Heinze, 2010, </a:t>
-            </a:r>
-            <a:r>
-              <a:rPr lang="de-DE" dirty="0" smtClean="0"/>
-              <a:t>Friedrich-Schiller Universität </a:t>
-            </a:r>
-            <a:r>
-              <a:rPr lang="de-DE" dirty="0" smtClean="0"/>
-              <a:t>Jena</a:t>
+              <a:t>-Datenbanken, Philipp Heinze, 2010, Friedrich-Schiller Universität Jena</a:t>
             </a:r>
           </a:p>
           <a:p>
@@ -12970,13 +13696,8 @@
             </a:r>
             <a:r>
               <a:rPr lang="de-DE" dirty="0" smtClean="0"/>
-              <a:t>, Abruf: </a:t>
-            </a:r>
-            <a:r>
-              <a:rPr lang="de-DE" dirty="0" smtClean="0"/>
-              <a:t>02.06.2013</a:t>
-            </a:r>
-            <a:endParaRPr lang="de-DE" dirty="0" smtClean="0"/>
+              <a:t>, Abruf: 02.06.2013</a:t>
+            </a:r>
           </a:p>
           <a:p>
             <a:endParaRPr lang="de-DE" dirty="0"/>
@@ -13195,6 +13916,131 @@
 </p:sld>
 </file>
 
+<file path=ppt/slides/slide44.xml><?xml version="1.0" encoding="utf-8"?>
+<p:sld xmlns:a="http://schemas.openxmlformats.org/drawingml/2006/main" xmlns:r="http://schemas.openxmlformats.org/officeDocument/2006/relationships" xmlns:p="http://schemas.openxmlformats.org/presentationml/2006/main">
+  <p:cSld>
+    <p:spTree>
+      <p:nvGrpSpPr>
+        <p:cNvPr id="1" name=""/>
+        <p:cNvGrpSpPr/>
+        <p:nvPr/>
+      </p:nvGrpSpPr>
+      <p:grpSpPr>
+        <a:xfrm>
+          <a:off x="0" y="0"/>
+          <a:ext cx="0" cy="0"/>
+          <a:chOff x="0" y="0"/>
+          <a:chExt cx="0" cy="0"/>
+        </a:xfrm>
+      </p:grpSpPr>
+      <p:sp>
+        <p:nvSpPr>
+          <p:cNvPr id="11" name="Inhaltsplatzhalter 10"/>
+          <p:cNvSpPr>
+            <a:spLocks noGrp="1"/>
+          </p:cNvSpPr>
+          <p:nvPr>
+            <p:ph sz="quarter" idx="13"/>
+          </p:nvPr>
+        </p:nvSpPr>
+        <p:spPr/>
+        <p:txBody>
+          <a:bodyPr/>
+          <a:lstStyle/>
+          <a:p>
+            <a:endParaRPr lang="de-DE" dirty="0"/>
+          </a:p>
+        </p:txBody>
+      </p:sp>
+      <p:sp>
+        <p:nvSpPr>
+          <p:cNvPr id="10" name="Titel 9"/>
+          <p:cNvSpPr>
+            <a:spLocks noGrp="1"/>
+          </p:cNvSpPr>
+          <p:nvPr>
+            <p:ph type="title"/>
+          </p:nvPr>
+        </p:nvSpPr>
+        <p:spPr>
+          <a:xfrm>
+            <a:off x="625674" y="5085184"/>
+            <a:ext cx="7920880" cy="652934"/>
+          </a:xfrm>
+        </p:spPr>
+        <p:txBody>
+          <a:bodyPr/>
+          <a:lstStyle/>
+          <a:p>
+            <a:r>
+              <a:rPr lang="de-DE" dirty="0" smtClean="0"/>
+              <a:t>Vielen Dank für Ihre Aufmerksamkeit!</a:t>
+            </a:r>
+            <a:endParaRPr lang="de-DE" dirty="0"/>
+          </a:p>
+        </p:txBody>
+      </p:sp>
+      <p:pic>
+        <p:nvPicPr>
+          <p:cNvPr id="8194" name="Picture 2" descr="C:\Users\TBoonX\Studium\Master\2. Semester\OS-Datenbanken\Abbildungen\NoSQL.png"/>
+          <p:cNvPicPr>
+            <a:picLocks noChangeAspect="1" noChangeArrowheads="1"/>
+          </p:cNvPicPr>
+          <p:nvPr/>
+        </p:nvPicPr>
+        <p:blipFill>
+          <a:blip r:embed="rId2">
+            <a:extLst>
+              <a:ext uri="{28A0092B-C50C-407E-A947-70E740481C1C}">
+                <a14:useLocalDpi xmlns:a14="http://schemas.microsoft.com/office/drawing/2010/main" val="0"/>
+              </a:ext>
+            </a:extLst>
+          </a:blip>
+          <a:srcRect/>
+          <a:stretch>
+            <a:fillRect/>
+          </a:stretch>
+        </p:blipFill>
+        <p:spPr bwMode="auto">
+          <a:xfrm>
+            <a:off x="3347864" y="2782407"/>
+            <a:ext cx="2476500" cy="838200"/>
+          </a:xfrm>
+          <a:prstGeom prst="rect">
+            <a:avLst/>
+          </a:prstGeom>
+          <a:noFill/>
+          <a:extLst>
+            <a:ext uri="{909E8E84-426E-40DD-AFC4-6F175D3DCCD1}">
+              <a14:hiddenFill xmlns:a14="http://schemas.microsoft.com/office/drawing/2010/main">
+                <a:solidFill>
+                  <a:srgbClr val="FFFFFF"/>
+                </a:solidFill>
+              </a14:hiddenFill>
+            </a:ext>
+          </a:extLst>
+        </p:spPr>
+      </p:pic>
+    </p:spTree>
+    <p:extLst>
+      <p:ext uri="{BB962C8B-B14F-4D97-AF65-F5344CB8AC3E}">
+        <p14:creationId xmlns:p14="http://schemas.microsoft.com/office/powerpoint/2010/main" val="3819108364"/>
+      </p:ext>
+    </p:extLst>
+  </p:cSld>
+  <p:clrMapOvr>
+    <a:masterClrMapping/>
+  </p:clrMapOvr>
+  <p:timing>
+    <p:tnLst>
+      <p:par>
+        <p:cTn id="1" dur="indefinite" restart="never" nodeType="tmRoot"/>
+      </p:par>
+    </p:tnLst>
+  </p:timing>
+</p:sld>
+</file>
+
 <file path=ppt/slides/slide5.xml><?xml version="1.0" encoding="utf-8"?>
 <p:sld xmlns:a="http://schemas.openxmlformats.org/drawingml/2006/main" xmlns:r="http://schemas.openxmlformats.org/officeDocument/2006/relationships" xmlns:p="http://schemas.openxmlformats.org/presentationml/2006/main">
   <p:cSld>
@@ -13293,7 +14139,23 @@
             </a:pPr>
             <a:r>
               <a:rPr lang="de-DE" sz="2000" dirty="0"/>
-              <a:t>2. Systeme sind verteilt und skalieren horizontal</a:t>
+              <a:t>2. </a:t>
+            </a:r>
+            <a:r>
+              <a:rPr lang="de-DE" sz="2000" dirty="0" smtClean="0"/>
+              <a:t>System ist verteilt </a:t>
+            </a:r>
+            <a:r>
+              <a:rPr lang="de-DE" sz="2000" dirty="0"/>
+              <a:t>und </a:t>
+            </a:r>
+            <a:r>
+              <a:rPr lang="de-DE" sz="2000" dirty="0" smtClean="0"/>
+              <a:t>skaliert </a:t>
+            </a:r>
+            <a:r>
+              <a:rPr lang="de-DE" sz="2000" dirty="0"/>
+              <a:t>horizontal</a:t>
             </a:r>
           </a:p>
           <a:p>
@@ -13338,8 +14200,12 @@
               <a:buNone/>
             </a:pPr>
             <a:r>
+              <a:rPr lang="de-DE" sz="2000" dirty="0" smtClean="0"/>
+              <a:t>6. System bietet </a:t>
+            </a:r>
+            <a:r>
               <a:rPr lang="de-DE" sz="2000" dirty="0"/>
-              <a:t>6. Das System biete  eine einfache API</a:t>
+              <a:t>eine einfache API</a:t>
             </a:r>
           </a:p>
           <a:p>
@@ -13402,6 +14268,13 @@
   <p:clrMapOvr>
     <a:masterClrMapping/>
   </p:clrMapOvr>
+  <p:timing>
+    <p:tnLst>
+      <p:par>
+        <p:cTn id="1" dur="indefinite" restart="never" nodeType="tmRoot"/>
+      </p:par>
+    </p:tnLst>
+  </p:timing>
 </p:sld>
 </file>
 
@@ -13513,7 +14386,7 @@
         </p:nvSpPr>
         <p:spPr>
           <a:xfrm>
-            <a:off x="2987824" y="6009104"/>
+            <a:off x="2830082" y="5985922"/>
             <a:ext cx="3960440" cy="215444"/>
           </a:xfrm>
           <a:prstGeom prst="rect">
@@ -13544,6 +14417,13 @@
   <p:clrMapOvr>
     <a:masterClrMapping/>
   </p:clrMapOvr>
+  <p:timing>
+    <p:tnLst>
+      <p:par>
+        <p:cTn id="1" dur="indefinite" restart="never" nodeType="tmRoot"/>
+      </p:par>
+    </p:tnLst>
+  </p:timing>
 </p:sld>
 </file>
 
@@ -13608,9 +14488,9 @@
             <a:endParaRPr lang="de-DE" dirty="0" smtClean="0"/>
           </a:p>
           <a:p>
-            <a:endParaRPr lang="de-DE" dirty="0"/>
-          </a:p>
-          <a:p>
+            <a:pPr marL="0" indent="0">
+              <a:buNone/>
+            </a:pPr>
             <a:endParaRPr lang="de-DE" dirty="0"/>
           </a:p>
           <a:p>
@@ -13623,9 +14503,12 @@
               <a:t> oder </a:t>
             </a:r>
             <a:r>
-              <a:rPr lang="de-DE" dirty="0" err="1"/>
+              <a:rPr lang="de-DE" dirty="0" err="1" smtClean="0"/>
               <a:t>NoRel</a:t>
             </a:r>
+            <a:endParaRPr lang="de-DE" dirty="0" smtClean="0"/>
+          </a:p>
+          <a:p>
             <a:endParaRPr lang="de-DE" dirty="0"/>
           </a:p>
           <a:p>
@@ -13681,6 +14564,13 @@
   <p:clrMapOvr>
     <a:masterClrMapping/>
   </p:clrMapOvr>
+  <p:timing>
+    <p:tnLst>
+      <p:par>
+        <p:cTn id="1" dur="indefinite" restart="never" nodeType="tmRoot"/>
+      </p:par>
+    </p:tnLst>
+  </p:timing>
 </p:sld>
 </file>
 
@@ -13895,6 +14785,13 @@
   <p:clrMapOvr>
     <a:masterClrMapping/>
   </p:clrMapOvr>
+  <p:timing>
+    <p:tnLst>
+      <p:par>
+        <p:cTn id="1" dur="indefinite" restart="never" nodeType="tmRoot"/>
+      </p:par>
+    </p:tnLst>
+  </p:timing>
 </p:sld>
 </file>
 
@@ -14062,6 +14959,13 @@
   <p:clrMapOvr>
     <a:masterClrMapping/>
   </p:clrMapOvr>
+  <p:timing>
+    <p:tnLst>
+      <p:par>
+        <p:cTn id="1" dur="indefinite" restart="never" nodeType="tmRoot"/>
+      </p:par>
+    </p:tnLst>
+  </p:timing>
 </p:sld>
 </file>
 

</xml_diff>